<commit_message>
First updates to LDA ppt.
</commit_message>
<xml_diff>
--- a/Jobs Analysis.pptx
+++ b/Jobs Analysis.pptx
@@ -20,10 +20,13 @@
     <p:sldId id="273" r:id="rId14"/>
     <p:sldId id="274" r:id="rId15"/>
     <p:sldId id="275" r:id="rId16"/>
-    <p:sldId id="267" r:id="rId17"/>
-    <p:sldId id="268" r:id="rId18"/>
-    <p:sldId id="269" r:id="rId19"/>
-    <p:sldId id="270" r:id="rId20"/>
+    <p:sldId id="277" r:id="rId17"/>
+    <p:sldId id="278" r:id="rId18"/>
+    <p:sldId id="279" r:id="rId19"/>
+    <p:sldId id="267" r:id="rId20"/>
+    <p:sldId id="268" r:id="rId21"/>
+    <p:sldId id="269" r:id="rId22"/>
+    <p:sldId id="270" r:id="rId23"/>
   </p:sldIdLst>
   <p:sldSz cx="12192000" cy="6858000"/>
   <p:notesSz cx="6858000" cy="9144000"/>
@@ -7484,7 +7487,7 @@
           <p:cNvPr id="2" name="Title 1">
             <a:extLst>
               <a:ext uri="{FF2B5EF4-FFF2-40B4-BE49-F238E27FC236}">
-                <a16:creationId xmlns:a16="http://schemas.microsoft.com/office/drawing/2014/main" id="{69EB7ECF-A088-47A2-9B6D-A520E90F0F1F}"/>
+                <a16:creationId xmlns:a16="http://schemas.microsoft.com/office/drawing/2014/main" id="{998103C1-41F9-4811-9B19-0D43D5268045}"/>
               </a:ext>
             </a:extLst>
           </p:cNvPr>
@@ -7502,7 +7505,7 @@
           <a:p>
             <a:r>
               <a:rPr lang="en-US" dirty="0"/>
-              <a:t>Evaluation</a:t>
+              <a:t>LDA – Topic Modeling</a:t>
             </a:r>
           </a:p>
         </p:txBody>
@@ -7512,7 +7515,7 @@
           <p:cNvPr id="3" name="Content Placeholder 2">
             <a:extLst>
               <a:ext uri="{FF2B5EF4-FFF2-40B4-BE49-F238E27FC236}">
-                <a16:creationId xmlns:a16="http://schemas.microsoft.com/office/drawing/2014/main" id="{76A4FA34-4101-4DB8-BDB1-B2BFA4449A68}"/>
+                <a16:creationId xmlns:a16="http://schemas.microsoft.com/office/drawing/2014/main" id="{1539DAC4-183E-470E-93CF-053EA0491F99}"/>
               </a:ext>
             </a:extLst>
           </p:cNvPr>
@@ -7528,14 +7531,66 @@
           <a:bodyPr/>
           <a:lstStyle/>
           <a:p>
+            <a:r>
+              <a:rPr lang="en-US" dirty="0"/>
+              <a:t>Input Jobs Document Term Matrix (DTM)</a:t>
+            </a:r>
+          </a:p>
+          <a:p>
             <a:endParaRPr lang="en-US" dirty="0"/>
+          </a:p>
+          <a:p>
+            <a:r>
+              <a:rPr lang="en-US" dirty="0"/>
+              <a:t>Ran LDA with k = 5</a:t>
+            </a:r>
+          </a:p>
+          <a:p>
+            <a:pPr lvl="1"/>
+            <a:r>
+              <a:rPr lang="en-US" dirty="0"/>
+              <a:t>jobs.k5.lda &lt;- LDA(</a:t>
+            </a:r>
+            <a:r>
+              <a:rPr lang="en-US" dirty="0" err="1"/>
+              <a:t>jobs.dtm,k</a:t>
+            </a:r>
+            <a:r>
+              <a:rPr lang="en-US" dirty="0"/>
+              <a:t>=5)</a:t>
+            </a:r>
+          </a:p>
+          <a:p>
+            <a:pPr lvl="1"/>
+            <a:endParaRPr lang="en-US" dirty="0"/>
+          </a:p>
+          <a:p>
+            <a:r>
+              <a:rPr lang="en-US" dirty="0"/>
+              <a:t>Ran LDA with k = 50</a:t>
+            </a:r>
+          </a:p>
+          <a:p>
+            <a:pPr lvl="1"/>
+            <a:r>
+              <a:rPr lang="en-US" dirty="0"/>
+              <a:t>jobs.k5.lda &lt;- LDA(</a:t>
+            </a:r>
+            <a:r>
+              <a:rPr lang="en-US" dirty="0" err="1"/>
+              <a:t>jobs.dtm,k</a:t>
+            </a:r>
+            <a:r>
+              <a:rPr lang="en-US" dirty="0"/>
+              <a:t>=50)</a:t>
+            </a:r>
           </a:p>
         </p:txBody>
       </p:sp>
     </p:spTree>
     <p:extLst>
       <p:ext uri="{BB962C8B-B14F-4D97-AF65-F5344CB8AC3E}">
-        <p14:creationId xmlns:p14="http://schemas.microsoft.com/office/powerpoint/2010/main" val="3407193998"/>
+        <p14:creationId xmlns:p14="http://schemas.microsoft.com/office/powerpoint/2010/main" val="4060799970"/>
       </p:ext>
     </p:extLst>
   </p:cSld>
@@ -7567,7 +7622,7 @@
           <p:cNvPr id="2" name="Title 1">
             <a:extLst>
               <a:ext uri="{FF2B5EF4-FFF2-40B4-BE49-F238E27FC236}">
-                <a16:creationId xmlns:a16="http://schemas.microsoft.com/office/drawing/2014/main" id="{83D2FCD0-74AF-46F9-8C29-8DF121006AFD}"/>
+                <a16:creationId xmlns:a16="http://schemas.microsoft.com/office/drawing/2014/main" id="{E8E1B2DF-8C2C-43CD-8BD5-6DADBF613F07}"/>
               </a:ext>
             </a:extLst>
           </p:cNvPr>
@@ -7583,39 +7638,1593 @@
           <a:bodyPr/>
           <a:lstStyle/>
           <a:p>
-            <a:endParaRPr lang="en-US"/>
+            <a:r>
+              <a:rPr lang="en-US" dirty="0"/>
+              <a:t>LDA Top Terms by Topic (k = 5)</a:t>
+            </a:r>
           </a:p>
         </p:txBody>
       </p:sp>
-      <p:sp>
-        <p:nvSpPr>
-          <p:cNvPr id="3" name="Content Placeholder 2">
+      <p:graphicFrame>
+        <p:nvGraphicFramePr>
+          <p:cNvPr id="4" name="Content Placeholder 3">
             <a:extLst>
               <a:ext uri="{FF2B5EF4-FFF2-40B4-BE49-F238E27FC236}">
-                <a16:creationId xmlns:a16="http://schemas.microsoft.com/office/drawing/2014/main" id="{4C70BCF9-73F1-495A-9177-2AB26D26FF91}"/>
+                <a16:creationId xmlns:a16="http://schemas.microsoft.com/office/drawing/2014/main" id="{908340B6-2CC9-4B95-B2DE-D6E6155B8EAC}"/>
               </a:ext>
             </a:extLst>
           </p:cNvPr>
-          <p:cNvSpPr>
-            <a:spLocks noGrp="1"/>
-          </p:cNvSpPr>
+          <p:cNvGraphicFramePr>
+            <a:graphicFrameLocks noGrp="1"/>
+          </p:cNvGraphicFramePr>
           <p:nvPr>
             <p:ph idx="1"/>
+            <p:extLst>
+              <p:ext uri="{D42A27DB-BD31-4B8C-83A1-F6EECF244321}">
+                <p14:modId xmlns:p14="http://schemas.microsoft.com/office/powerpoint/2010/main" val="462073877"/>
+              </p:ext>
+            </p:extLst>
           </p:nvPr>
-        </p:nvSpPr>
-        <p:spPr/>
-        <p:txBody>
-          <a:bodyPr/>
-          <a:lstStyle/>
-          <a:p>
-            <a:endParaRPr lang="en-US"/>
-          </a:p>
-        </p:txBody>
-      </p:sp>
+        </p:nvGraphicFramePr>
+        <p:xfrm>
+          <a:off x="838198" y="1835020"/>
+          <a:ext cx="10515600" cy="4128135"/>
+        </p:xfrm>
+        <a:graphic>
+          <a:graphicData uri="http://schemas.openxmlformats.org/drawingml/2006/table">
+            <a:tbl>
+              <a:tblPr>
+                <a:tableStyleId>{3B4B98B0-60AC-42C2-AFA5-B58CD77FA1E5}</a:tableStyleId>
+              </a:tblPr>
+              <a:tblGrid>
+                <a:gridCol w="2103120">
+                  <a:extLst>
+                    <a:ext uri="{9D8B030D-6E8A-4147-A177-3AD203B41FA5}">
+                      <a16:colId xmlns:a16="http://schemas.microsoft.com/office/drawing/2014/main" val="3731036267"/>
+                    </a:ext>
+                  </a:extLst>
+                </a:gridCol>
+                <a:gridCol w="2103120">
+                  <a:extLst>
+                    <a:ext uri="{9D8B030D-6E8A-4147-A177-3AD203B41FA5}">
+                      <a16:colId xmlns:a16="http://schemas.microsoft.com/office/drawing/2014/main" val="2555341812"/>
+                    </a:ext>
+                  </a:extLst>
+                </a:gridCol>
+                <a:gridCol w="2103120">
+                  <a:extLst>
+                    <a:ext uri="{9D8B030D-6E8A-4147-A177-3AD203B41FA5}">
+                      <a16:colId xmlns:a16="http://schemas.microsoft.com/office/drawing/2014/main" val="1052258667"/>
+                    </a:ext>
+                  </a:extLst>
+                </a:gridCol>
+                <a:gridCol w="2103120">
+                  <a:extLst>
+                    <a:ext uri="{9D8B030D-6E8A-4147-A177-3AD203B41FA5}">
+                      <a16:colId xmlns:a16="http://schemas.microsoft.com/office/drawing/2014/main" val="2132033456"/>
+                    </a:ext>
+                  </a:extLst>
+                </a:gridCol>
+                <a:gridCol w="2103120">
+                  <a:extLst>
+                    <a:ext uri="{9D8B030D-6E8A-4147-A177-3AD203B41FA5}">
+                      <a16:colId xmlns:a16="http://schemas.microsoft.com/office/drawing/2014/main" val="1342537409"/>
+                    </a:ext>
+                  </a:extLst>
+                </a:gridCol>
+              </a:tblGrid>
+              <a:tr h="303634">
+                <a:tc>
+                  <a:txBody>
+                    <a:bodyPr/>
+                    <a:lstStyle/>
+                    <a:p>
+                      <a:pPr algn="l" fontAlgn="b"/>
+                      <a:r>
+                        <a:rPr lang="en-US" sz="2400" b="1" u="none" strike="noStrike" dirty="0">
+                          <a:effectLst/>
+                        </a:rPr>
+                        <a:t>Topic 1</a:t>
+                      </a:r>
+                      <a:endParaRPr lang="en-US" sz="2400" b="1" i="0" u="none" strike="noStrike" dirty="0">
+                        <a:solidFill>
+                          <a:srgbClr val="000000"/>
+                        </a:solidFill>
+                        <a:effectLst/>
+                        <a:latin typeface="Calibri" panose="020F0502020204030204" pitchFamily="34" charset="0"/>
+                      </a:endParaRPr>
+                    </a:p>
+                  </a:txBody>
+                  <a:tcPr marL="9525" marR="9525" marT="9525" marB="0" anchor="b">
+                    <a:lnB w="12700" cap="flat" cmpd="sng" algn="ctr">
+                      <a:solidFill>
+                        <a:schemeClr val="accent1">
+                          <a:lumMod val="60000"/>
+                          <a:lumOff val="40000"/>
+                        </a:schemeClr>
+                      </a:solidFill>
+                      <a:prstDash val="solid"/>
+                      <a:round/>
+                      <a:headEnd type="none" w="med" len="med"/>
+                      <a:tailEnd type="none" w="med" len="med"/>
+                    </a:lnB>
+                  </a:tcPr>
+                </a:tc>
+                <a:tc>
+                  <a:txBody>
+                    <a:bodyPr/>
+                    <a:lstStyle/>
+                    <a:p>
+                      <a:pPr algn="l" fontAlgn="b"/>
+                      <a:r>
+                        <a:rPr lang="en-US" sz="2400" b="1" u="none" strike="noStrike" dirty="0">
+                          <a:effectLst/>
+                        </a:rPr>
+                        <a:t>Topic 2</a:t>
+                      </a:r>
+                      <a:endParaRPr lang="en-US" sz="2400" b="1" i="0" u="none" strike="noStrike" dirty="0">
+                        <a:solidFill>
+                          <a:srgbClr val="000000"/>
+                        </a:solidFill>
+                        <a:effectLst/>
+                        <a:latin typeface="Calibri" panose="020F0502020204030204" pitchFamily="34" charset="0"/>
+                      </a:endParaRPr>
+                    </a:p>
+                  </a:txBody>
+                  <a:tcPr marL="9525" marR="9525" marT="9525" marB="0" anchor="b">
+                    <a:lnB w="12700" cap="flat" cmpd="sng" algn="ctr">
+                      <a:solidFill>
+                        <a:schemeClr val="accent1">
+                          <a:lumMod val="60000"/>
+                          <a:lumOff val="40000"/>
+                        </a:schemeClr>
+                      </a:solidFill>
+                      <a:prstDash val="solid"/>
+                      <a:round/>
+                      <a:headEnd type="none" w="med" len="med"/>
+                      <a:tailEnd type="none" w="med" len="med"/>
+                    </a:lnB>
+                  </a:tcPr>
+                </a:tc>
+                <a:tc>
+                  <a:txBody>
+                    <a:bodyPr/>
+                    <a:lstStyle/>
+                    <a:p>
+                      <a:pPr algn="l" fontAlgn="b"/>
+                      <a:r>
+                        <a:rPr lang="en-US" sz="2400" b="1" u="none" strike="noStrike" dirty="0">
+                          <a:effectLst/>
+                        </a:rPr>
+                        <a:t>Topic 3</a:t>
+                      </a:r>
+                      <a:endParaRPr lang="en-US" sz="2400" b="1" i="0" u="none" strike="noStrike" dirty="0">
+                        <a:solidFill>
+                          <a:srgbClr val="000000"/>
+                        </a:solidFill>
+                        <a:effectLst/>
+                        <a:latin typeface="Calibri" panose="020F0502020204030204" pitchFamily="34" charset="0"/>
+                      </a:endParaRPr>
+                    </a:p>
+                  </a:txBody>
+                  <a:tcPr marL="9525" marR="9525" marT="9525" marB="0" anchor="b">
+                    <a:lnB w="12700" cap="flat" cmpd="sng" algn="ctr">
+                      <a:solidFill>
+                        <a:schemeClr val="accent1">
+                          <a:lumMod val="60000"/>
+                          <a:lumOff val="40000"/>
+                        </a:schemeClr>
+                      </a:solidFill>
+                      <a:prstDash val="solid"/>
+                      <a:round/>
+                      <a:headEnd type="none" w="med" len="med"/>
+                      <a:tailEnd type="none" w="med" len="med"/>
+                    </a:lnB>
+                  </a:tcPr>
+                </a:tc>
+                <a:tc>
+                  <a:txBody>
+                    <a:bodyPr/>
+                    <a:lstStyle/>
+                    <a:p>
+                      <a:pPr algn="l" fontAlgn="b"/>
+                      <a:r>
+                        <a:rPr lang="en-US" sz="2400" b="1" u="none" strike="noStrike" dirty="0">
+                          <a:effectLst/>
+                        </a:rPr>
+                        <a:t>Topic 4</a:t>
+                      </a:r>
+                      <a:endParaRPr lang="en-US" sz="2400" b="1" i="0" u="none" strike="noStrike" dirty="0">
+                        <a:solidFill>
+                          <a:srgbClr val="000000"/>
+                        </a:solidFill>
+                        <a:effectLst/>
+                        <a:latin typeface="Calibri" panose="020F0502020204030204" pitchFamily="34" charset="0"/>
+                      </a:endParaRPr>
+                    </a:p>
+                  </a:txBody>
+                  <a:tcPr marL="9525" marR="9525" marT="9525" marB="0" anchor="b">
+                    <a:lnB w="12700" cap="flat" cmpd="sng" algn="ctr">
+                      <a:solidFill>
+                        <a:schemeClr val="accent1">
+                          <a:lumMod val="60000"/>
+                          <a:lumOff val="40000"/>
+                        </a:schemeClr>
+                      </a:solidFill>
+                      <a:prstDash val="solid"/>
+                      <a:round/>
+                      <a:headEnd type="none" w="med" len="med"/>
+                      <a:tailEnd type="none" w="med" len="med"/>
+                    </a:lnB>
+                  </a:tcPr>
+                </a:tc>
+                <a:tc>
+                  <a:txBody>
+                    <a:bodyPr/>
+                    <a:lstStyle/>
+                    <a:p>
+                      <a:pPr algn="l" fontAlgn="b"/>
+                      <a:r>
+                        <a:rPr lang="en-US" sz="2400" b="1" u="none" strike="noStrike" dirty="0">
+                          <a:effectLst/>
+                        </a:rPr>
+                        <a:t>Topic 5</a:t>
+                      </a:r>
+                      <a:endParaRPr lang="en-US" sz="2400" b="1" i="0" u="none" strike="noStrike" dirty="0">
+                        <a:solidFill>
+                          <a:srgbClr val="000000"/>
+                        </a:solidFill>
+                        <a:effectLst/>
+                        <a:latin typeface="Calibri" panose="020F0502020204030204" pitchFamily="34" charset="0"/>
+                      </a:endParaRPr>
+                    </a:p>
+                  </a:txBody>
+                  <a:tcPr marL="9525" marR="9525" marT="9525" marB="0" anchor="b">
+                    <a:lnB w="12700" cap="flat" cmpd="sng" algn="ctr">
+                      <a:solidFill>
+                        <a:schemeClr val="accent1">
+                          <a:lumMod val="60000"/>
+                          <a:lumOff val="40000"/>
+                        </a:schemeClr>
+                      </a:solidFill>
+                      <a:prstDash val="solid"/>
+                      <a:round/>
+                      <a:headEnd type="none" w="med" len="med"/>
+                      <a:tailEnd type="none" w="med" len="med"/>
+                    </a:lnB>
+                  </a:tcPr>
+                </a:tc>
+                <a:extLst>
+                  <a:ext uri="{0D108BD9-81ED-4DB2-BD59-A6C34878D82A}">
+                    <a16:rowId xmlns:a16="http://schemas.microsoft.com/office/drawing/2014/main" val="2827662962"/>
+                  </a:ext>
+                </a:extLst>
+              </a:tr>
+              <a:tr h="303634">
+                <a:tc>
+                  <a:txBody>
+                    <a:bodyPr/>
+                    <a:lstStyle/>
+                    <a:p>
+                      <a:pPr algn="l" fontAlgn="b"/>
+                      <a:r>
+                        <a:rPr lang="en-US" sz="2400" u="none" strike="noStrike" dirty="0">
+                          <a:effectLst/>
+                        </a:rPr>
+                        <a:t>business</a:t>
+                      </a:r>
+                      <a:endParaRPr lang="en-US" sz="2400" b="0" i="0" u="none" strike="noStrike" dirty="0">
+                        <a:solidFill>
+                          <a:srgbClr val="000000"/>
+                        </a:solidFill>
+                        <a:effectLst/>
+                        <a:latin typeface="Calibri" panose="020F0502020204030204" pitchFamily="34" charset="0"/>
+                      </a:endParaRPr>
+                    </a:p>
+                  </a:txBody>
+                  <a:tcPr marL="9525" marR="9525" marT="9525" marB="0" anchor="b">
+                    <a:lnT w="12700" cap="flat" cmpd="sng" algn="ctr">
+                      <a:solidFill>
+                        <a:schemeClr val="accent1">
+                          <a:lumMod val="60000"/>
+                          <a:lumOff val="40000"/>
+                        </a:schemeClr>
+                      </a:solidFill>
+                      <a:prstDash val="solid"/>
+                      <a:round/>
+                      <a:headEnd type="none" w="med" len="med"/>
+                      <a:tailEnd type="none" w="med" len="med"/>
+                    </a:lnT>
+                  </a:tcPr>
+                </a:tc>
+                <a:tc>
+                  <a:txBody>
+                    <a:bodyPr/>
+                    <a:lstStyle/>
+                    <a:p>
+                      <a:pPr algn="l" fontAlgn="b"/>
+                      <a:r>
+                        <a:rPr lang="en-US" sz="2400" u="none" strike="noStrike" dirty="0">
+                          <a:effectLst/>
+                        </a:rPr>
+                        <a:t>design</a:t>
+                      </a:r>
+                      <a:endParaRPr lang="en-US" sz="2400" b="0" i="0" u="none" strike="noStrike" dirty="0">
+                        <a:solidFill>
+                          <a:srgbClr val="000000"/>
+                        </a:solidFill>
+                        <a:effectLst/>
+                        <a:latin typeface="Calibri" panose="020F0502020204030204" pitchFamily="34" charset="0"/>
+                      </a:endParaRPr>
+                    </a:p>
+                  </a:txBody>
+                  <a:tcPr marL="9525" marR="9525" marT="9525" marB="0" anchor="b">
+                    <a:lnT w="12700" cap="flat" cmpd="sng" algn="ctr">
+                      <a:solidFill>
+                        <a:schemeClr val="accent1">
+                          <a:lumMod val="60000"/>
+                          <a:lumOff val="40000"/>
+                        </a:schemeClr>
+                      </a:solidFill>
+                      <a:prstDash val="solid"/>
+                      <a:round/>
+                      <a:headEnd type="none" w="med" len="med"/>
+                      <a:tailEnd type="none" w="med" len="med"/>
+                    </a:lnT>
+                  </a:tcPr>
+                </a:tc>
+                <a:tc>
+                  <a:txBody>
+                    <a:bodyPr/>
+                    <a:lstStyle/>
+                    <a:p>
+                      <a:pPr algn="l" fontAlgn="b"/>
+                      <a:r>
+                        <a:rPr lang="en-US" sz="2400" u="none" strike="noStrike" dirty="0">
+                          <a:effectLst/>
+                        </a:rPr>
+                        <a:t>technical</a:t>
+                      </a:r>
+                      <a:endParaRPr lang="en-US" sz="2400" b="0" i="0" u="none" strike="noStrike" dirty="0">
+                        <a:solidFill>
+                          <a:srgbClr val="000000"/>
+                        </a:solidFill>
+                        <a:effectLst/>
+                        <a:latin typeface="Calibri" panose="020F0502020204030204" pitchFamily="34" charset="0"/>
+                      </a:endParaRPr>
+                    </a:p>
+                  </a:txBody>
+                  <a:tcPr marL="9525" marR="9525" marT="9525" marB="0" anchor="b">
+                    <a:lnT w="12700" cap="flat" cmpd="sng" algn="ctr">
+                      <a:solidFill>
+                        <a:schemeClr val="accent1">
+                          <a:lumMod val="60000"/>
+                          <a:lumOff val="40000"/>
+                        </a:schemeClr>
+                      </a:solidFill>
+                      <a:prstDash val="solid"/>
+                      <a:round/>
+                      <a:headEnd type="none" w="med" len="med"/>
+                      <a:tailEnd type="none" w="med" len="med"/>
+                    </a:lnT>
+                  </a:tcPr>
+                </a:tc>
+                <a:tc>
+                  <a:txBody>
+                    <a:bodyPr/>
+                    <a:lstStyle/>
+                    <a:p>
+                      <a:pPr algn="l" fontAlgn="b"/>
+                      <a:r>
+                        <a:rPr lang="en-US" sz="2400" u="none" strike="noStrike" dirty="0">
+                          <a:effectLst/>
+                        </a:rPr>
+                        <a:t>team</a:t>
+                      </a:r>
+                      <a:endParaRPr lang="en-US" sz="2400" b="0" i="0" u="none" strike="noStrike" dirty="0">
+                        <a:solidFill>
+                          <a:srgbClr val="000000"/>
+                        </a:solidFill>
+                        <a:effectLst/>
+                        <a:latin typeface="Calibri" panose="020F0502020204030204" pitchFamily="34" charset="0"/>
+                      </a:endParaRPr>
+                    </a:p>
+                  </a:txBody>
+                  <a:tcPr marL="9525" marR="9525" marT="9525" marB="0" anchor="b">
+                    <a:lnT w="12700" cap="flat" cmpd="sng" algn="ctr">
+                      <a:solidFill>
+                        <a:schemeClr val="accent1">
+                          <a:lumMod val="60000"/>
+                          <a:lumOff val="40000"/>
+                        </a:schemeClr>
+                      </a:solidFill>
+                      <a:prstDash val="solid"/>
+                      <a:round/>
+                      <a:headEnd type="none" w="med" len="med"/>
+                      <a:tailEnd type="none" w="med" len="med"/>
+                    </a:lnT>
+                  </a:tcPr>
+                </a:tc>
+                <a:tc>
+                  <a:txBody>
+                    <a:bodyPr/>
+                    <a:lstStyle/>
+                    <a:p>
+                      <a:pPr algn="l" fontAlgn="b"/>
+                      <a:r>
+                        <a:rPr lang="en-US" sz="2400" u="none" strike="noStrike" dirty="0">
+                          <a:effectLst/>
+                        </a:rPr>
+                        <a:t>business</a:t>
+                      </a:r>
+                      <a:endParaRPr lang="en-US" sz="2400" b="0" i="0" u="none" strike="noStrike" dirty="0">
+                        <a:solidFill>
+                          <a:srgbClr val="000000"/>
+                        </a:solidFill>
+                        <a:effectLst/>
+                        <a:latin typeface="Calibri" panose="020F0502020204030204" pitchFamily="34" charset="0"/>
+                      </a:endParaRPr>
+                    </a:p>
+                  </a:txBody>
+                  <a:tcPr marL="9525" marR="9525" marT="9525" marB="0" anchor="b">
+                    <a:lnT w="12700" cap="flat" cmpd="sng" algn="ctr">
+                      <a:solidFill>
+                        <a:schemeClr val="accent1">
+                          <a:lumMod val="60000"/>
+                          <a:lumOff val="40000"/>
+                        </a:schemeClr>
+                      </a:solidFill>
+                      <a:prstDash val="solid"/>
+                      <a:round/>
+                      <a:headEnd type="none" w="med" len="med"/>
+                      <a:tailEnd type="none" w="med" len="med"/>
+                    </a:lnT>
+                  </a:tcPr>
+                </a:tc>
+                <a:extLst>
+                  <a:ext uri="{0D108BD9-81ED-4DB2-BD59-A6C34878D82A}">
+                    <a16:rowId xmlns:a16="http://schemas.microsoft.com/office/drawing/2014/main" val="2894263183"/>
+                  </a:ext>
+                </a:extLst>
+              </a:tr>
+              <a:tr h="303634">
+                <a:tc>
+                  <a:txBody>
+                    <a:bodyPr/>
+                    <a:lstStyle/>
+                    <a:p>
+                      <a:pPr algn="l" fontAlgn="b"/>
+                      <a:r>
+                        <a:rPr lang="en-US" sz="2400" u="none" strike="noStrike" dirty="0">
+                          <a:effectLst/>
+                        </a:rPr>
+                        <a:t>management</a:t>
+                      </a:r>
+                      <a:endParaRPr lang="en-US" sz="2400" b="0" i="0" u="none" strike="noStrike" dirty="0">
+                        <a:solidFill>
+                          <a:srgbClr val="000000"/>
+                        </a:solidFill>
+                        <a:effectLst/>
+                        <a:latin typeface="Calibri" panose="020F0502020204030204" pitchFamily="34" charset="0"/>
+                      </a:endParaRPr>
+                    </a:p>
+                  </a:txBody>
+                  <a:tcPr marL="9525" marR="9525" marT="9525" marB="0" anchor="b"/>
+                </a:tc>
+                <a:tc>
+                  <a:txBody>
+                    <a:bodyPr/>
+                    <a:lstStyle/>
+                    <a:p>
+                      <a:pPr algn="l" fontAlgn="b"/>
+                      <a:r>
+                        <a:rPr lang="en-US" sz="2400" u="none" strike="noStrike">
+                          <a:effectLst/>
+                        </a:rPr>
+                        <a:t>test</a:t>
+                      </a:r>
+                      <a:endParaRPr lang="en-US" sz="2400" b="0" i="0" u="none" strike="noStrike">
+                        <a:solidFill>
+                          <a:srgbClr val="000000"/>
+                        </a:solidFill>
+                        <a:effectLst/>
+                        <a:latin typeface="Calibri" panose="020F0502020204030204" pitchFamily="34" charset="0"/>
+                      </a:endParaRPr>
+                    </a:p>
+                  </a:txBody>
+                  <a:tcPr marL="9525" marR="9525" marT="9525" marB="0" anchor="b"/>
+                </a:tc>
+                <a:tc>
+                  <a:txBody>
+                    <a:bodyPr/>
+                    <a:lstStyle/>
+                    <a:p>
+                      <a:pPr algn="l" fontAlgn="b"/>
+                      <a:r>
+                        <a:rPr lang="en-US" sz="2400" u="none" strike="noStrike" dirty="0">
+                          <a:effectLst/>
+                        </a:rPr>
+                        <a:t>customers</a:t>
+                      </a:r>
+                      <a:endParaRPr lang="en-US" sz="2400" b="0" i="0" u="none" strike="noStrike" dirty="0">
+                        <a:solidFill>
+                          <a:srgbClr val="000000"/>
+                        </a:solidFill>
+                        <a:effectLst/>
+                        <a:latin typeface="Calibri" panose="020F0502020204030204" pitchFamily="34" charset="0"/>
+                      </a:endParaRPr>
+                    </a:p>
+                  </a:txBody>
+                  <a:tcPr marL="9525" marR="9525" marT="9525" marB="0" anchor="b"/>
+                </a:tc>
+                <a:tc>
+                  <a:txBody>
+                    <a:bodyPr/>
+                    <a:lstStyle/>
+                    <a:p>
+                      <a:pPr algn="l" fontAlgn="b"/>
+                      <a:r>
+                        <a:rPr lang="en-US" sz="2400" u="none" strike="noStrike" dirty="0">
+                          <a:effectLst/>
+                        </a:rPr>
+                        <a:t>software</a:t>
+                      </a:r>
+                      <a:endParaRPr lang="en-US" sz="2400" b="0" i="0" u="none" strike="noStrike" dirty="0">
+                        <a:solidFill>
+                          <a:srgbClr val="000000"/>
+                        </a:solidFill>
+                        <a:effectLst/>
+                        <a:latin typeface="Calibri" panose="020F0502020204030204" pitchFamily="34" charset="0"/>
+                      </a:endParaRPr>
+                    </a:p>
+                  </a:txBody>
+                  <a:tcPr marL="9525" marR="9525" marT="9525" marB="0" anchor="b"/>
+                </a:tc>
+                <a:tc>
+                  <a:txBody>
+                    <a:bodyPr/>
+                    <a:lstStyle/>
+                    <a:p>
+                      <a:pPr algn="l" fontAlgn="b"/>
+                      <a:r>
+                        <a:rPr lang="en-US" sz="2400" u="none" strike="noStrike" dirty="0">
+                          <a:effectLst/>
+                        </a:rPr>
+                        <a:t>security</a:t>
+                      </a:r>
+                      <a:endParaRPr lang="en-US" sz="2400" b="0" i="0" u="none" strike="noStrike" dirty="0">
+                        <a:solidFill>
+                          <a:srgbClr val="000000"/>
+                        </a:solidFill>
+                        <a:effectLst/>
+                        <a:latin typeface="Calibri" panose="020F0502020204030204" pitchFamily="34" charset="0"/>
+                      </a:endParaRPr>
+                    </a:p>
+                  </a:txBody>
+                  <a:tcPr marL="9525" marR="9525" marT="9525" marB="0" anchor="b"/>
+                </a:tc>
+                <a:extLst>
+                  <a:ext uri="{0D108BD9-81ED-4DB2-BD59-A6C34878D82A}">
+                    <a16:rowId xmlns:a16="http://schemas.microsoft.com/office/drawing/2014/main" val="2276288165"/>
+                  </a:ext>
+                </a:extLst>
+              </a:tr>
+              <a:tr h="303634">
+                <a:tc>
+                  <a:txBody>
+                    <a:bodyPr/>
+                    <a:lstStyle/>
+                    <a:p>
+                      <a:pPr algn="l" fontAlgn="b"/>
+                      <a:r>
+                        <a:rPr lang="en-US" sz="2400" u="none" strike="noStrike" dirty="0">
+                          <a:effectLst/>
+                        </a:rPr>
+                        <a:t>project</a:t>
+                      </a:r>
+                      <a:endParaRPr lang="en-US" sz="2400" b="0" i="0" u="none" strike="noStrike" dirty="0">
+                        <a:solidFill>
+                          <a:srgbClr val="000000"/>
+                        </a:solidFill>
+                        <a:effectLst/>
+                        <a:latin typeface="Calibri" panose="020F0502020204030204" pitchFamily="34" charset="0"/>
+                      </a:endParaRPr>
+                    </a:p>
+                  </a:txBody>
+                  <a:tcPr marL="9525" marR="9525" marT="9525" marB="0" anchor="b"/>
+                </a:tc>
+                <a:tc>
+                  <a:txBody>
+                    <a:bodyPr/>
+                    <a:lstStyle/>
+                    <a:p>
+                      <a:pPr algn="l" fontAlgn="b"/>
+                      <a:r>
+                        <a:rPr lang="en-US" sz="2400" u="none" strike="noStrike" dirty="0">
+                          <a:effectLst/>
+                        </a:rPr>
+                        <a:t>engineering</a:t>
+                      </a:r>
+                      <a:endParaRPr lang="en-US" sz="2400" b="0" i="0" u="none" strike="noStrike" dirty="0">
+                        <a:solidFill>
+                          <a:srgbClr val="000000"/>
+                        </a:solidFill>
+                        <a:effectLst/>
+                        <a:latin typeface="Calibri" panose="020F0502020204030204" pitchFamily="34" charset="0"/>
+                      </a:endParaRPr>
+                    </a:p>
+                  </a:txBody>
+                  <a:tcPr marL="9525" marR="9525" marT="9525" marB="0" anchor="b"/>
+                </a:tc>
+                <a:tc>
+                  <a:txBody>
+                    <a:bodyPr/>
+                    <a:lstStyle/>
+                    <a:p>
+                      <a:pPr algn="l" fontAlgn="b"/>
+                      <a:r>
+                        <a:rPr lang="en-US" sz="2400" u="none" strike="noStrike" dirty="0">
+                          <a:effectLst/>
+                        </a:rPr>
+                        <a:t>home</a:t>
+                      </a:r>
+                      <a:endParaRPr lang="en-US" sz="2400" b="0" i="0" u="none" strike="noStrike" dirty="0">
+                        <a:solidFill>
+                          <a:srgbClr val="000000"/>
+                        </a:solidFill>
+                        <a:effectLst/>
+                        <a:latin typeface="Calibri" panose="020F0502020204030204" pitchFamily="34" charset="0"/>
+                      </a:endParaRPr>
+                    </a:p>
+                  </a:txBody>
+                  <a:tcPr marL="9525" marR="9525" marT="9525" marB="0" anchor="b"/>
+                </a:tc>
+                <a:tc>
+                  <a:txBody>
+                    <a:bodyPr/>
+                    <a:lstStyle/>
+                    <a:p>
+                      <a:pPr algn="l" fontAlgn="b"/>
+                      <a:r>
+                        <a:rPr lang="en-US" sz="2400" u="none" strike="noStrike" dirty="0">
+                          <a:effectLst/>
+                        </a:rPr>
+                        <a:t>systems</a:t>
+                      </a:r>
+                      <a:endParaRPr lang="en-US" sz="2400" b="0" i="0" u="none" strike="noStrike" dirty="0">
+                        <a:solidFill>
+                          <a:srgbClr val="000000"/>
+                        </a:solidFill>
+                        <a:effectLst/>
+                        <a:latin typeface="Calibri" panose="020F0502020204030204" pitchFamily="34" charset="0"/>
+                      </a:endParaRPr>
+                    </a:p>
+                  </a:txBody>
+                  <a:tcPr marL="9525" marR="9525" marT="9525" marB="0" anchor="b"/>
+                </a:tc>
+                <a:tc>
+                  <a:txBody>
+                    <a:bodyPr/>
+                    <a:lstStyle/>
+                    <a:p>
+                      <a:pPr algn="l" fontAlgn="b"/>
+                      <a:r>
+                        <a:rPr lang="en-US" sz="2400" u="none" strike="noStrike" dirty="0">
+                          <a:effectLst/>
+                        </a:rPr>
+                        <a:t>information</a:t>
+                      </a:r>
+                      <a:endParaRPr lang="en-US" sz="2400" b="0" i="0" u="none" strike="noStrike" dirty="0">
+                        <a:solidFill>
+                          <a:srgbClr val="000000"/>
+                        </a:solidFill>
+                        <a:effectLst/>
+                        <a:latin typeface="Calibri" panose="020F0502020204030204" pitchFamily="34" charset="0"/>
+                      </a:endParaRPr>
+                    </a:p>
+                  </a:txBody>
+                  <a:tcPr marL="9525" marR="9525" marT="9525" marB="0" anchor="b"/>
+                </a:tc>
+                <a:extLst>
+                  <a:ext uri="{0D108BD9-81ED-4DB2-BD59-A6C34878D82A}">
+                    <a16:rowId xmlns:a16="http://schemas.microsoft.com/office/drawing/2014/main" val="1913292412"/>
+                  </a:ext>
+                </a:extLst>
+              </a:tr>
+              <a:tr h="303634">
+                <a:tc>
+                  <a:txBody>
+                    <a:bodyPr/>
+                    <a:lstStyle/>
+                    <a:p>
+                      <a:pPr algn="l" fontAlgn="b"/>
+                      <a:r>
+                        <a:rPr lang="en-US" sz="2400" u="none" strike="noStrike" dirty="0">
+                          <a:effectLst/>
+                        </a:rPr>
+                        <a:t>support</a:t>
+                      </a:r>
+                      <a:endParaRPr lang="en-US" sz="2400" b="0" i="0" u="none" strike="noStrike" dirty="0">
+                        <a:solidFill>
+                          <a:srgbClr val="000000"/>
+                        </a:solidFill>
+                        <a:effectLst/>
+                        <a:latin typeface="Calibri" panose="020F0502020204030204" pitchFamily="34" charset="0"/>
+                      </a:endParaRPr>
+                    </a:p>
+                  </a:txBody>
+                  <a:tcPr marL="9525" marR="9525" marT="9525" marB="0" anchor="b"/>
+                </a:tc>
+                <a:tc>
+                  <a:txBody>
+                    <a:bodyPr/>
+                    <a:lstStyle/>
+                    <a:p>
+                      <a:pPr algn="l" fontAlgn="b"/>
+                      <a:r>
+                        <a:rPr lang="en-US" sz="2400" u="none" strike="noStrike" dirty="0">
+                          <a:effectLst/>
+                        </a:rPr>
+                        <a:t>development</a:t>
+                      </a:r>
+                      <a:endParaRPr lang="en-US" sz="2400" b="0" i="0" u="none" strike="noStrike" dirty="0">
+                        <a:solidFill>
+                          <a:srgbClr val="000000"/>
+                        </a:solidFill>
+                        <a:effectLst/>
+                        <a:latin typeface="Calibri" panose="020F0502020204030204" pitchFamily="34" charset="0"/>
+                      </a:endParaRPr>
+                    </a:p>
+                  </a:txBody>
+                  <a:tcPr marL="9525" marR="9525" marT="9525" marB="0" anchor="b"/>
+                </a:tc>
+                <a:tc>
+                  <a:txBody>
+                    <a:bodyPr/>
+                    <a:lstStyle/>
+                    <a:p>
+                      <a:pPr marL="0" marR="0" lvl="0" indent="0" algn="l" defTabSz="914400" rtl="0" eaLnBrk="1" fontAlgn="auto" latinLnBrk="0" hangingPunct="1">
+                        <a:lnSpc>
+                          <a:spcPct val="100000"/>
+                        </a:lnSpc>
+                        <a:spcBef>
+                          <a:spcPts val="0"/>
+                        </a:spcBef>
+                        <a:spcAft>
+                          <a:spcPts val="0"/>
+                        </a:spcAft>
+                        <a:buClrTx/>
+                        <a:buSzTx/>
+                        <a:buFontTx/>
+                        <a:buNone/>
+                        <a:tabLst/>
+                        <a:defRPr/>
+                      </a:pPr>
+                      <a:r>
+                        <a:rPr lang="en-US" sz="2400" u="none" strike="noStrike" dirty="0">
+                          <a:effectLst/>
+                        </a:rPr>
+                        <a:t>hours</a:t>
+                      </a:r>
+                      <a:endParaRPr lang="en-US" sz="2400" b="0" i="0" u="none" strike="noStrike" dirty="0">
+                        <a:solidFill>
+                          <a:srgbClr val="000000"/>
+                        </a:solidFill>
+                        <a:effectLst/>
+                        <a:latin typeface="Calibri" panose="020F0502020204030204" pitchFamily="34" charset="0"/>
+                      </a:endParaRPr>
+                    </a:p>
+                  </a:txBody>
+                  <a:tcPr marL="9525" marR="9525" marT="9525" marB="0" anchor="b"/>
+                </a:tc>
+                <a:tc>
+                  <a:txBody>
+                    <a:bodyPr/>
+                    <a:lstStyle/>
+                    <a:p>
+                      <a:pPr algn="l" fontAlgn="b"/>
+                      <a:r>
+                        <a:rPr lang="en-US" sz="2400" u="none" strike="noStrike" dirty="0">
+                          <a:effectLst/>
+                        </a:rPr>
+                        <a:t>computer</a:t>
+                      </a:r>
+                      <a:endParaRPr lang="en-US" sz="2400" b="0" i="0" u="none" strike="noStrike" dirty="0">
+                        <a:solidFill>
+                          <a:srgbClr val="000000"/>
+                        </a:solidFill>
+                        <a:effectLst/>
+                        <a:latin typeface="Calibri" panose="020F0502020204030204" pitchFamily="34" charset="0"/>
+                      </a:endParaRPr>
+                    </a:p>
+                  </a:txBody>
+                  <a:tcPr marL="9525" marR="9525" marT="9525" marB="0" anchor="b"/>
+                </a:tc>
+                <a:tc>
+                  <a:txBody>
+                    <a:bodyPr/>
+                    <a:lstStyle/>
+                    <a:p>
+                      <a:pPr algn="l" fontAlgn="b"/>
+                      <a:r>
+                        <a:rPr lang="en-US" sz="2400" u="none" strike="noStrike" dirty="0">
+                          <a:effectLst/>
+                        </a:rPr>
+                        <a:t>analytics</a:t>
+                      </a:r>
+                      <a:endParaRPr lang="en-US" sz="2400" b="0" i="0" u="none" strike="noStrike" dirty="0">
+                        <a:solidFill>
+                          <a:srgbClr val="000000"/>
+                        </a:solidFill>
+                        <a:effectLst/>
+                        <a:latin typeface="Calibri" panose="020F0502020204030204" pitchFamily="34" charset="0"/>
+                      </a:endParaRPr>
+                    </a:p>
+                  </a:txBody>
+                  <a:tcPr marL="9525" marR="9525" marT="9525" marB="0" anchor="b"/>
+                </a:tc>
+                <a:extLst>
+                  <a:ext uri="{0D108BD9-81ED-4DB2-BD59-A6C34878D82A}">
+                    <a16:rowId xmlns:a16="http://schemas.microsoft.com/office/drawing/2014/main" val="330431423"/>
+                  </a:ext>
+                </a:extLst>
+              </a:tr>
+              <a:tr h="303634">
+                <a:tc>
+                  <a:txBody>
+                    <a:bodyPr/>
+                    <a:lstStyle/>
+                    <a:p>
+                      <a:pPr algn="l" fontAlgn="b"/>
+                      <a:r>
+                        <a:rPr lang="en-US" sz="2400" u="none" strike="noStrike" dirty="0">
+                          <a:effectLst/>
+                        </a:rPr>
+                        <a:t>team</a:t>
+                      </a:r>
+                      <a:endParaRPr lang="en-US" sz="2400" b="0" i="0" u="none" strike="noStrike" dirty="0">
+                        <a:solidFill>
+                          <a:srgbClr val="000000"/>
+                        </a:solidFill>
+                        <a:effectLst/>
+                        <a:latin typeface="Calibri" panose="020F0502020204030204" pitchFamily="34" charset="0"/>
+                      </a:endParaRPr>
+                    </a:p>
+                  </a:txBody>
+                  <a:tcPr marL="9525" marR="9525" marT="9525" marB="0" anchor="b"/>
+                </a:tc>
+                <a:tc>
+                  <a:txBody>
+                    <a:bodyPr/>
+                    <a:lstStyle/>
+                    <a:p>
+                      <a:pPr algn="l" fontAlgn="b"/>
+                      <a:r>
+                        <a:rPr lang="en-US" sz="2400" u="none" strike="noStrike" dirty="0">
+                          <a:effectLst/>
+                        </a:rPr>
+                        <a:t>team</a:t>
+                      </a:r>
+                      <a:endParaRPr lang="en-US" sz="2400" b="0" i="0" u="none" strike="noStrike" dirty="0">
+                        <a:solidFill>
+                          <a:srgbClr val="000000"/>
+                        </a:solidFill>
+                        <a:effectLst/>
+                        <a:latin typeface="Calibri" panose="020F0502020204030204" pitchFamily="34" charset="0"/>
+                      </a:endParaRPr>
+                    </a:p>
+                  </a:txBody>
+                  <a:tcPr marL="9525" marR="9525" marT="9525" marB="0" anchor="b"/>
+                </a:tc>
+                <a:tc>
+                  <a:txBody>
+                    <a:bodyPr/>
+                    <a:lstStyle/>
+                    <a:p>
+                      <a:pPr algn="l" fontAlgn="b"/>
+                      <a:r>
+                        <a:rPr lang="en-US" sz="2400" u="none" strike="noStrike" dirty="0">
+                          <a:effectLst/>
+                        </a:rPr>
+                        <a:t>ability</a:t>
+                      </a:r>
+                      <a:endParaRPr lang="en-US" sz="2400" b="0" i="0" u="none" strike="noStrike" dirty="0">
+                        <a:solidFill>
+                          <a:srgbClr val="000000"/>
+                        </a:solidFill>
+                        <a:effectLst/>
+                        <a:latin typeface="Calibri" panose="020F0502020204030204" pitchFamily="34" charset="0"/>
+                      </a:endParaRPr>
+                    </a:p>
+                  </a:txBody>
+                  <a:tcPr marL="9525" marR="9525" marT="9525" marB="0" anchor="b"/>
+                </a:tc>
+                <a:tc>
+                  <a:txBody>
+                    <a:bodyPr/>
+                    <a:lstStyle/>
+                    <a:p>
+                      <a:pPr algn="l" fontAlgn="b"/>
+                      <a:r>
+                        <a:rPr lang="en-US" sz="2400" u="none" strike="noStrike" dirty="0">
+                          <a:effectLst/>
+                        </a:rPr>
+                        <a:t>science</a:t>
+                      </a:r>
+                      <a:endParaRPr lang="en-US" sz="2400" b="0" i="0" u="none" strike="noStrike" dirty="0">
+                        <a:solidFill>
+                          <a:srgbClr val="000000"/>
+                        </a:solidFill>
+                        <a:effectLst/>
+                        <a:latin typeface="Calibri" panose="020F0502020204030204" pitchFamily="34" charset="0"/>
+                      </a:endParaRPr>
+                    </a:p>
+                  </a:txBody>
+                  <a:tcPr marL="9525" marR="9525" marT="9525" marB="0" anchor="b"/>
+                </a:tc>
+                <a:tc>
+                  <a:txBody>
+                    <a:bodyPr/>
+                    <a:lstStyle/>
+                    <a:p>
+                      <a:pPr algn="l" fontAlgn="b"/>
+                      <a:r>
+                        <a:rPr lang="en-US" sz="2400" u="none" strike="noStrike" dirty="0">
+                          <a:effectLst/>
+                        </a:rPr>
+                        <a:t>team</a:t>
+                      </a:r>
+                      <a:endParaRPr lang="en-US" sz="2400" b="0" i="0" u="none" strike="noStrike" dirty="0">
+                        <a:solidFill>
+                          <a:srgbClr val="000000"/>
+                        </a:solidFill>
+                        <a:effectLst/>
+                        <a:latin typeface="Calibri" panose="020F0502020204030204" pitchFamily="34" charset="0"/>
+                      </a:endParaRPr>
+                    </a:p>
+                  </a:txBody>
+                  <a:tcPr marL="9525" marR="9525" marT="9525" marB="0" anchor="b"/>
+                </a:tc>
+                <a:extLst>
+                  <a:ext uri="{0D108BD9-81ED-4DB2-BD59-A6C34878D82A}">
+                    <a16:rowId xmlns:a16="http://schemas.microsoft.com/office/drawing/2014/main" val="2121785788"/>
+                  </a:ext>
+                </a:extLst>
+              </a:tr>
+              <a:tr h="303634">
+                <a:tc>
+                  <a:txBody>
+                    <a:bodyPr/>
+                    <a:lstStyle/>
+                    <a:p>
+                      <a:pPr algn="l" fontAlgn="b"/>
+                      <a:r>
+                        <a:rPr lang="en-US" sz="2400" u="none" strike="noStrike" dirty="0">
+                          <a:effectLst/>
+                        </a:rPr>
+                        <a:t>process</a:t>
+                      </a:r>
+                      <a:endParaRPr lang="en-US" sz="2400" b="0" i="0" u="none" strike="noStrike" dirty="0">
+                        <a:solidFill>
+                          <a:srgbClr val="000000"/>
+                        </a:solidFill>
+                        <a:effectLst/>
+                        <a:latin typeface="Calibri" panose="020F0502020204030204" pitchFamily="34" charset="0"/>
+                      </a:endParaRPr>
+                    </a:p>
+                  </a:txBody>
+                  <a:tcPr marL="9525" marR="9525" marT="9525" marB="0" anchor="b"/>
+                </a:tc>
+                <a:tc>
+                  <a:txBody>
+                    <a:bodyPr/>
+                    <a:lstStyle/>
+                    <a:p>
+                      <a:pPr algn="l" fontAlgn="b"/>
+                      <a:r>
+                        <a:rPr lang="en-US" sz="2400" u="none" strike="noStrike" dirty="0">
+                          <a:effectLst/>
+                        </a:rPr>
+                        <a:t>product</a:t>
+                      </a:r>
+                      <a:endParaRPr lang="en-US" sz="2400" b="0" i="0" u="none" strike="noStrike" dirty="0">
+                        <a:solidFill>
+                          <a:srgbClr val="000000"/>
+                        </a:solidFill>
+                        <a:effectLst/>
+                        <a:latin typeface="Calibri" panose="020F0502020204030204" pitchFamily="34" charset="0"/>
+                      </a:endParaRPr>
+                    </a:p>
+                  </a:txBody>
+                  <a:tcPr marL="9525" marR="9525" marT="9525" marB="0" anchor="b"/>
+                </a:tc>
+                <a:tc>
+                  <a:txBody>
+                    <a:bodyPr/>
+                    <a:lstStyle/>
+                    <a:p>
+                      <a:pPr algn="l" fontAlgn="b"/>
+                      <a:r>
+                        <a:rPr lang="en-US" sz="2400" u="none" strike="noStrike" dirty="0">
+                          <a:effectLst/>
+                        </a:rPr>
+                        <a:t>well</a:t>
+                      </a:r>
+                      <a:endParaRPr lang="en-US" sz="2400" b="0" i="0" u="none" strike="noStrike" dirty="0">
+                        <a:solidFill>
+                          <a:srgbClr val="000000"/>
+                        </a:solidFill>
+                        <a:effectLst/>
+                        <a:latin typeface="Calibri" panose="020F0502020204030204" pitchFamily="34" charset="0"/>
+                      </a:endParaRPr>
+                    </a:p>
+                  </a:txBody>
+                  <a:tcPr marL="9525" marR="9525" marT="9525" marB="0" anchor="b"/>
+                </a:tc>
+                <a:tc>
+                  <a:txBody>
+                    <a:bodyPr/>
+                    <a:lstStyle/>
+                    <a:p>
+                      <a:pPr algn="l" fontAlgn="b"/>
+                      <a:r>
+                        <a:rPr lang="en-US" sz="2400" u="none" strike="noStrike" dirty="0">
+                          <a:effectLst/>
+                        </a:rPr>
+                        <a:t>engineering</a:t>
+                      </a:r>
+                      <a:endParaRPr lang="en-US" sz="2400" b="0" i="0" u="none" strike="noStrike" dirty="0">
+                        <a:solidFill>
+                          <a:srgbClr val="000000"/>
+                        </a:solidFill>
+                        <a:effectLst/>
+                        <a:latin typeface="Calibri" panose="020F0502020204030204" pitchFamily="34" charset="0"/>
+                      </a:endParaRPr>
+                    </a:p>
+                  </a:txBody>
+                  <a:tcPr marL="9525" marR="9525" marT="9525" marB="0" anchor="b"/>
+                </a:tc>
+                <a:tc>
+                  <a:txBody>
+                    <a:bodyPr/>
+                    <a:lstStyle/>
+                    <a:p>
+                      <a:pPr algn="l" fontAlgn="b"/>
+                      <a:r>
+                        <a:rPr lang="en-US" sz="2400" u="none" strike="noStrike" dirty="0">
+                          <a:effectLst/>
+                        </a:rPr>
+                        <a:t>solutions</a:t>
+                      </a:r>
+                      <a:endParaRPr lang="en-US" sz="2400" b="0" i="0" u="none" strike="noStrike" dirty="0">
+                        <a:solidFill>
+                          <a:srgbClr val="000000"/>
+                        </a:solidFill>
+                        <a:effectLst/>
+                        <a:latin typeface="Calibri" panose="020F0502020204030204" pitchFamily="34" charset="0"/>
+                      </a:endParaRPr>
+                    </a:p>
+                  </a:txBody>
+                  <a:tcPr marL="9525" marR="9525" marT="9525" marB="0" anchor="b"/>
+                </a:tc>
+                <a:extLst>
+                  <a:ext uri="{0D108BD9-81ED-4DB2-BD59-A6C34878D82A}">
+                    <a16:rowId xmlns:a16="http://schemas.microsoft.com/office/drawing/2014/main" val="946385162"/>
+                  </a:ext>
+                </a:extLst>
+              </a:tr>
+              <a:tr h="303634">
+                <a:tc>
+                  <a:txBody>
+                    <a:bodyPr/>
+                    <a:lstStyle/>
+                    <a:p>
+                      <a:pPr algn="l" fontAlgn="b"/>
+                      <a:r>
+                        <a:rPr lang="en-US" sz="2400" u="none" strike="noStrike" dirty="0">
+                          <a:effectLst/>
+                        </a:rPr>
+                        <a:t>operations</a:t>
+                      </a:r>
+                      <a:endParaRPr lang="en-US" sz="2400" b="0" i="0" u="none" strike="noStrike" dirty="0">
+                        <a:solidFill>
+                          <a:srgbClr val="000000"/>
+                        </a:solidFill>
+                        <a:effectLst/>
+                        <a:latin typeface="Calibri" panose="020F0502020204030204" pitchFamily="34" charset="0"/>
+                      </a:endParaRPr>
+                    </a:p>
+                  </a:txBody>
+                  <a:tcPr marL="9525" marR="9525" marT="9525" marB="0" anchor="b"/>
+                </a:tc>
+                <a:tc>
+                  <a:txBody>
+                    <a:bodyPr/>
+                    <a:lstStyle/>
+                    <a:p>
+                      <a:pPr algn="l" fontAlgn="b"/>
+                      <a:r>
+                        <a:rPr lang="en-US" sz="2400" u="none" strike="noStrike" dirty="0">
+                          <a:effectLst/>
+                        </a:rPr>
+                        <a:t>system</a:t>
+                      </a:r>
+                      <a:endParaRPr lang="en-US" sz="2400" b="0" i="0" u="none" strike="noStrike" dirty="0">
+                        <a:solidFill>
+                          <a:srgbClr val="000000"/>
+                        </a:solidFill>
+                        <a:effectLst/>
+                        <a:latin typeface="Calibri" panose="020F0502020204030204" pitchFamily="34" charset="0"/>
+                      </a:endParaRPr>
+                    </a:p>
+                  </a:txBody>
+                  <a:tcPr marL="9525" marR="9525" marT="9525" marB="0" anchor="b"/>
+                </a:tc>
+                <a:tc>
+                  <a:txBody>
+                    <a:bodyPr/>
+                    <a:lstStyle/>
+                    <a:p>
+                      <a:pPr algn="l" fontAlgn="b"/>
+                      <a:r>
+                        <a:rPr lang="en-US" sz="2400" u="none" strike="noStrike" dirty="0">
+                          <a:effectLst/>
+                        </a:rPr>
+                        <a:t>training</a:t>
+                      </a:r>
+                      <a:endParaRPr lang="en-US" sz="2400" b="0" i="0" u="none" strike="noStrike" dirty="0">
+                        <a:solidFill>
+                          <a:srgbClr val="000000"/>
+                        </a:solidFill>
+                        <a:effectLst/>
+                        <a:latin typeface="Calibri" panose="020F0502020204030204" pitchFamily="34" charset="0"/>
+                      </a:endParaRPr>
+                    </a:p>
+                  </a:txBody>
+                  <a:tcPr marL="9525" marR="9525" marT="9525" marB="0" anchor="b"/>
+                </a:tc>
+                <a:tc>
+                  <a:txBody>
+                    <a:bodyPr/>
+                    <a:lstStyle/>
+                    <a:p>
+                      <a:pPr algn="l" fontAlgn="b"/>
+                      <a:r>
+                        <a:rPr lang="en-US" sz="2400" u="none" strike="noStrike" dirty="0">
+                          <a:effectLst/>
+                        </a:rPr>
+                        <a:t>services</a:t>
+                      </a:r>
+                      <a:endParaRPr lang="en-US" sz="2400" b="0" i="0" u="none" strike="noStrike" dirty="0">
+                        <a:solidFill>
+                          <a:srgbClr val="000000"/>
+                        </a:solidFill>
+                        <a:effectLst/>
+                        <a:latin typeface="Calibri" panose="020F0502020204030204" pitchFamily="34" charset="0"/>
+                      </a:endParaRPr>
+                    </a:p>
+                  </a:txBody>
+                  <a:tcPr marL="9525" marR="9525" marT="9525" marB="0" anchor="b"/>
+                </a:tc>
+                <a:tc>
+                  <a:txBody>
+                    <a:bodyPr/>
+                    <a:lstStyle/>
+                    <a:p>
+                      <a:pPr algn="l" fontAlgn="b"/>
+                      <a:r>
+                        <a:rPr lang="en-US" sz="2400" u="none" strike="noStrike" dirty="0">
+                          <a:effectLst/>
+                        </a:rPr>
+                        <a:t>services</a:t>
+                      </a:r>
+                      <a:endParaRPr lang="en-US" sz="2400" b="0" i="0" u="none" strike="noStrike" dirty="0">
+                        <a:solidFill>
+                          <a:srgbClr val="000000"/>
+                        </a:solidFill>
+                        <a:effectLst/>
+                        <a:latin typeface="Calibri" panose="020F0502020204030204" pitchFamily="34" charset="0"/>
+                      </a:endParaRPr>
+                    </a:p>
+                  </a:txBody>
+                  <a:tcPr marL="9525" marR="9525" marT="9525" marB="0" anchor="b"/>
+                </a:tc>
+                <a:extLst>
+                  <a:ext uri="{0D108BD9-81ED-4DB2-BD59-A6C34878D82A}">
+                    <a16:rowId xmlns:a16="http://schemas.microsoft.com/office/drawing/2014/main" val="2540218499"/>
+                  </a:ext>
+                </a:extLst>
+              </a:tr>
+              <a:tr h="303634">
+                <a:tc>
+                  <a:txBody>
+                    <a:bodyPr/>
+                    <a:lstStyle/>
+                    <a:p>
+                      <a:pPr algn="l" fontAlgn="b"/>
+                      <a:r>
+                        <a:rPr lang="en-US" sz="2400" u="none" strike="noStrike" dirty="0">
+                          <a:effectLst/>
+                        </a:rPr>
+                        <a:t>ability</a:t>
+                      </a:r>
+                      <a:endParaRPr lang="en-US" sz="2400" b="0" i="0" u="none" strike="noStrike" dirty="0">
+                        <a:solidFill>
+                          <a:srgbClr val="000000"/>
+                        </a:solidFill>
+                        <a:effectLst/>
+                        <a:latin typeface="Calibri" panose="020F0502020204030204" pitchFamily="34" charset="0"/>
+                      </a:endParaRPr>
+                    </a:p>
+                  </a:txBody>
+                  <a:tcPr marL="9525" marR="9525" marT="9525" marB="0" anchor="b"/>
+                </a:tc>
+                <a:tc>
+                  <a:txBody>
+                    <a:bodyPr/>
+                    <a:lstStyle/>
+                    <a:p>
+                      <a:pPr algn="l" fontAlgn="b"/>
+                      <a:r>
+                        <a:rPr lang="en-US" sz="2400" u="none" strike="noStrike" dirty="0">
+                          <a:effectLst/>
+                        </a:rPr>
+                        <a:t>quality</a:t>
+                      </a:r>
+                      <a:endParaRPr lang="en-US" sz="2400" b="0" i="0" u="none" strike="noStrike" dirty="0">
+                        <a:solidFill>
+                          <a:srgbClr val="000000"/>
+                        </a:solidFill>
+                        <a:effectLst/>
+                        <a:latin typeface="Calibri" panose="020F0502020204030204" pitchFamily="34" charset="0"/>
+                      </a:endParaRPr>
+                    </a:p>
+                  </a:txBody>
+                  <a:tcPr marL="9525" marR="9525" marT="9525" marB="0" anchor="b"/>
+                </a:tc>
+                <a:tc>
+                  <a:txBody>
+                    <a:bodyPr/>
+                    <a:lstStyle/>
+                    <a:p>
+                      <a:pPr algn="l" fontAlgn="b"/>
+                      <a:r>
+                        <a:rPr lang="en-US" sz="2400" u="none" strike="noStrike" dirty="0">
+                          <a:effectLst/>
+                        </a:rPr>
+                        <a:t>advisor</a:t>
+                      </a:r>
+                      <a:endParaRPr lang="en-US" sz="2400" b="0" i="0" u="none" strike="noStrike" dirty="0">
+                        <a:solidFill>
+                          <a:srgbClr val="000000"/>
+                        </a:solidFill>
+                        <a:effectLst/>
+                        <a:latin typeface="Calibri" panose="020F0502020204030204" pitchFamily="34" charset="0"/>
+                      </a:endParaRPr>
+                    </a:p>
+                  </a:txBody>
+                  <a:tcPr marL="9525" marR="9525" marT="9525" marB="0" anchor="b"/>
+                </a:tc>
+                <a:tc>
+                  <a:txBody>
+                    <a:bodyPr/>
+                    <a:lstStyle/>
+                    <a:p>
+                      <a:pPr algn="l" fontAlgn="b"/>
+                      <a:r>
+                        <a:rPr lang="en-US" sz="2400" u="none" strike="noStrike" dirty="0">
+                          <a:effectLst/>
+                        </a:rPr>
+                        <a:t>design</a:t>
+                      </a:r>
+                      <a:endParaRPr lang="en-US" sz="2400" b="0" i="0" u="none" strike="noStrike" dirty="0">
+                        <a:solidFill>
+                          <a:srgbClr val="000000"/>
+                        </a:solidFill>
+                        <a:effectLst/>
+                        <a:latin typeface="Calibri" panose="020F0502020204030204" pitchFamily="34" charset="0"/>
+                      </a:endParaRPr>
+                    </a:p>
+                  </a:txBody>
+                  <a:tcPr marL="9525" marR="9525" marT="9525" marB="0" anchor="b"/>
+                </a:tc>
+                <a:tc>
+                  <a:txBody>
+                    <a:bodyPr/>
+                    <a:lstStyle/>
+                    <a:p>
+                      <a:pPr algn="l" fontAlgn="b"/>
+                      <a:r>
+                        <a:rPr lang="en-US" sz="2400" u="none" strike="noStrike" dirty="0">
+                          <a:effectLst/>
+                        </a:rPr>
+                        <a:t>product</a:t>
+                      </a:r>
+                      <a:endParaRPr lang="en-US" sz="2400" b="0" i="0" u="none" strike="noStrike" dirty="0">
+                        <a:solidFill>
+                          <a:srgbClr val="000000"/>
+                        </a:solidFill>
+                        <a:effectLst/>
+                        <a:latin typeface="Calibri" panose="020F0502020204030204" pitchFamily="34" charset="0"/>
+                      </a:endParaRPr>
+                    </a:p>
+                  </a:txBody>
+                  <a:tcPr marL="9525" marR="9525" marT="9525" marB="0" anchor="b"/>
+                </a:tc>
+                <a:extLst>
+                  <a:ext uri="{0D108BD9-81ED-4DB2-BD59-A6C34878D82A}">
+                    <a16:rowId xmlns:a16="http://schemas.microsoft.com/office/drawing/2014/main" val="3238101484"/>
+                  </a:ext>
+                </a:extLst>
+              </a:tr>
+              <a:tr h="303634">
+                <a:tc>
+                  <a:txBody>
+                    <a:bodyPr/>
+                    <a:lstStyle/>
+                    <a:p>
+                      <a:pPr algn="l" fontAlgn="b"/>
+                      <a:r>
+                        <a:rPr lang="en-US" sz="2400" u="none" strike="noStrike" dirty="0">
+                          <a:effectLst/>
+                        </a:rPr>
+                        <a:t>manage</a:t>
+                      </a:r>
+                      <a:endParaRPr lang="en-US" sz="2400" b="0" i="0" u="none" strike="noStrike" dirty="0">
+                        <a:solidFill>
+                          <a:srgbClr val="000000"/>
+                        </a:solidFill>
+                        <a:effectLst/>
+                        <a:latin typeface="Calibri" panose="020F0502020204030204" pitchFamily="34" charset="0"/>
+                      </a:endParaRPr>
+                    </a:p>
+                  </a:txBody>
+                  <a:tcPr marL="9525" marR="9525" marT="9525" marB="0" anchor="b"/>
+                </a:tc>
+                <a:tc>
+                  <a:txBody>
+                    <a:bodyPr/>
+                    <a:lstStyle/>
+                    <a:p>
+                      <a:pPr algn="l" fontAlgn="b"/>
+                      <a:r>
+                        <a:rPr lang="en-US" sz="2400" u="none" strike="noStrike" dirty="0">
+                          <a:effectLst/>
+                        </a:rPr>
+                        <a:t>new</a:t>
+                      </a:r>
+                      <a:endParaRPr lang="en-US" sz="2400" b="0" i="0" u="none" strike="noStrike" dirty="0">
+                        <a:solidFill>
+                          <a:srgbClr val="000000"/>
+                        </a:solidFill>
+                        <a:effectLst/>
+                        <a:latin typeface="Calibri" panose="020F0502020204030204" pitchFamily="34" charset="0"/>
+                      </a:endParaRPr>
+                    </a:p>
+                  </a:txBody>
+                  <a:tcPr marL="9525" marR="9525" marT="9525" marB="0" anchor="b"/>
+                </a:tc>
+                <a:tc>
+                  <a:txBody>
+                    <a:bodyPr/>
+                    <a:lstStyle/>
+                    <a:p>
+                      <a:pPr algn="l" fontAlgn="b"/>
+                      <a:r>
+                        <a:rPr lang="en-US" sz="2400" u="none" strike="noStrike" dirty="0">
+                          <a:effectLst/>
+                        </a:rPr>
+                        <a:t>world</a:t>
+                      </a:r>
+                      <a:endParaRPr lang="en-US" sz="2400" b="0" i="0" u="none" strike="noStrike" dirty="0">
+                        <a:solidFill>
+                          <a:srgbClr val="000000"/>
+                        </a:solidFill>
+                        <a:effectLst/>
+                        <a:latin typeface="Calibri" panose="020F0502020204030204" pitchFamily="34" charset="0"/>
+                      </a:endParaRPr>
+                    </a:p>
+                  </a:txBody>
+                  <a:tcPr marL="9525" marR="9525" marT="9525" marB="0" anchor="b"/>
+                </a:tc>
+                <a:tc>
+                  <a:txBody>
+                    <a:bodyPr/>
+                    <a:lstStyle/>
+                    <a:p>
+                      <a:pPr algn="l" fontAlgn="b"/>
+                      <a:r>
+                        <a:rPr lang="en-US" sz="2400" u="none" strike="noStrike" dirty="0">
+                          <a:effectLst/>
+                        </a:rPr>
+                        <a:t>products</a:t>
+                      </a:r>
+                      <a:endParaRPr lang="en-US" sz="2400" b="0" i="0" u="none" strike="noStrike" dirty="0">
+                        <a:solidFill>
+                          <a:srgbClr val="000000"/>
+                        </a:solidFill>
+                        <a:effectLst/>
+                        <a:latin typeface="Calibri" panose="020F0502020204030204" pitchFamily="34" charset="0"/>
+                      </a:endParaRPr>
+                    </a:p>
+                  </a:txBody>
+                  <a:tcPr marL="9525" marR="9525" marT="9525" marB="0" anchor="b"/>
+                </a:tc>
+                <a:tc>
+                  <a:txBody>
+                    <a:bodyPr/>
+                    <a:lstStyle/>
+                    <a:p>
+                      <a:pPr algn="l" fontAlgn="b"/>
+                      <a:r>
+                        <a:rPr lang="en-US" sz="2400" u="none" strike="noStrike" dirty="0">
+                          <a:effectLst/>
+                        </a:rPr>
+                        <a:t>analysis</a:t>
+                      </a:r>
+                      <a:endParaRPr lang="en-US" sz="2400" b="0" i="0" u="none" strike="noStrike" dirty="0">
+                        <a:solidFill>
+                          <a:srgbClr val="000000"/>
+                        </a:solidFill>
+                        <a:effectLst/>
+                        <a:latin typeface="Calibri" panose="020F0502020204030204" pitchFamily="34" charset="0"/>
+                      </a:endParaRPr>
+                    </a:p>
+                  </a:txBody>
+                  <a:tcPr marL="9525" marR="9525" marT="9525" marB="0" anchor="b"/>
+                </a:tc>
+                <a:extLst>
+                  <a:ext uri="{0D108BD9-81ED-4DB2-BD59-A6C34878D82A}">
+                    <a16:rowId xmlns:a16="http://schemas.microsoft.com/office/drawing/2014/main" val="3424389576"/>
+                  </a:ext>
+                </a:extLst>
+              </a:tr>
+              <a:tr h="303634">
+                <a:tc>
+                  <a:txBody>
+                    <a:bodyPr/>
+                    <a:lstStyle/>
+                    <a:p>
+                      <a:pPr algn="l" fontAlgn="b"/>
+                      <a:r>
+                        <a:rPr lang="en-US" sz="2400" u="none" strike="noStrike" dirty="0">
+                          <a:effectLst/>
+                        </a:rPr>
+                        <a:t>skills</a:t>
+                      </a:r>
+                      <a:endParaRPr lang="en-US" sz="2400" b="0" i="0" u="none" strike="noStrike" dirty="0">
+                        <a:solidFill>
+                          <a:srgbClr val="000000"/>
+                        </a:solidFill>
+                        <a:effectLst/>
+                        <a:latin typeface="Calibri" panose="020F0502020204030204" pitchFamily="34" charset="0"/>
+                      </a:endParaRPr>
+                    </a:p>
+                  </a:txBody>
+                  <a:tcPr marL="9525" marR="9525" marT="9525" marB="0" anchor="b"/>
+                </a:tc>
+                <a:tc>
+                  <a:txBody>
+                    <a:bodyPr/>
+                    <a:lstStyle/>
+                    <a:p>
+                      <a:pPr algn="l" fontAlgn="b"/>
+                      <a:r>
+                        <a:rPr lang="en-US" sz="2400" u="none" strike="noStrike" dirty="0">
+                          <a:effectLst/>
+                        </a:rPr>
+                        <a:t>develop</a:t>
+                      </a:r>
+                      <a:endParaRPr lang="en-US" sz="2400" b="0" i="0" u="none" strike="noStrike" dirty="0">
+                        <a:solidFill>
+                          <a:srgbClr val="000000"/>
+                        </a:solidFill>
+                        <a:effectLst/>
+                        <a:latin typeface="Calibri" panose="020F0502020204030204" pitchFamily="34" charset="0"/>
+                      </a:endParaRPr>
+                    </a:p>
+                  </a:txBody>
+                  <a:tcPr marL="9525" marR="9525" marT="9525" marB="0" anchor="b"/>
+                </a:tc>
+                <a:tc>
+                  <a:txBody>
+                    <a:bodyPr/>
+                    <a:lstStyle/>
+                    <a:p>
+                      <a:pPr marL="0" marR="0" lvl="0" indent="0" algn="l" defTabSz="914400" rtl="0" eaLnBrk="1" fontAlgn="b" latinLnBrk="0" hangingPunct="1">
+                        <a:lnSpc>
+                          <a:spcPct val="100000"/>
+                        </a:lnSpc>
+                        <a:spcBef>
+                          <a:spcPts val="0"/>
+                        </a:spcBef>
+                        <a:spcAft>
+                          <a:spcPts val="0"/>
+                        </a:spcAft>
+                        <a:buClrTx/>
+                        <a:buSzTx/>
+                        <a:buFontTx/>
+                        <a:buNone/>
+                        <a:tabLst/>
+                        <a:defRPr/>
+                      </a:pPr>
+                      <a:r>
+                        <a:rPr lang="en-US" sz="2400" u="none" strike="noStrike" dirty="0">
+                          <a:effectLst/>
+                        </a:rPr>
+                        <a:t>support</a:t>
+                      </a:r>
+                      <a:endParaRPr lang="en-US" sz="2400" b="0" i="0" u="none" strike="noStrike" dirty="0">
+                        <a:solidFill>
+                          <a:srgbClr val="000000"/>
+                        </a:solidFill>
+                        <a:effectLst/>
+                        <a:latin typeface="Calibri" panose="020F0502020204030204" pitchFamily="34" charset="0"/>
+                      </a:endParaRPr>
+                    </a:p>
+                  </a:txBody>
+                  <a:tcPr marL="9525" marR="9525" marT="9525" marB="0" anchor="b"/>
+                </a:tc>
+                <a:tc>
+                  <a:txBody>
+                    <a:bodyPr/>
+                    <a:lstStyle/>
+                    <a:p>
+                      <a:pPr algn="l" fontAlgn="b"/>
+                      <a:r>
+                        <a:rPr lang="en-US" sz="2400" u="none" strike="noStrike" dirty="0">
+                          <a:effectLst/>
+                        </a:rPr>
+                        <a:t>new</a:t>
+                      </a:r>
+                      <a:endParaRPr lang="en-US" sz="2400" b="0" i="0" u="none" strike="noStrike" dirty="0">
+                        <a:solidFill>
+                          <a:srgbClr val="000000"/>
+                        </a:solidFill>
+                        <a:effectLst/>
+                        <a:latin typeface="Calibri" panose="020F0502020204030204" pitchFamily="34" charset="0"/>
+                      </a:endParaRPr>
+                    </a:p>
+                  </a:txBody>
+                  <a:tcPr marL="9525" marR="9525" marT="9525" marB="0" anchor="b"/>
+                </a:tc>
+                <a:tc>
+                  <a:txBody>
+                    <a:bodyPr/>
+                    <a:lstStyle/>
+                    <a:p>
+                      <a:pPr algn="l" fontAlgn="b"/>
+                      <a:r>
+                        <a:rPr lang="en-US" sz="2400" u="none" strike="noStrike" dirty="0">
+                          <a:effectLst/>
+                        </a:rPr>
+                        <a:t>technical</a:t>
+                      </a:r>
+                      <a:endParaRPr lang="en-US" sz="2400" b="0" i="0" u="none" strike="noStrike" dirty="0">
+                        <a:solidFill>
+                          <a:srgbClr val="000000"/>
+                        </a:solidFill>
+                        <a:effectLst/>
+                        <a:latin typeface="Calibri" panose="020F0502020204030204" pitchFamily="34" charset="0"/>
+                      </a:endParaRPr>
+                    </a:p>
+                  </a:txBody>
+                  <a:tcPr marL="9525" marR="9525" marT="9525" marB="0" anchor="b"/>
+                </a:tc>
+                <a:extLst>
+                  <a:ext uri="{0D108BD9-81ED-4DB2-BD59-A6C34878D82A}">
+                    <a16:rowId xmlns:a16="http://schemas.microsoft.com/office/drawing/2014/main" val="3544599095"/>
+                  </a:ext>
+                </a:extLst>
+              </a:tr>
+            </a:tbl>
+          </a:graphicData>
+        </a:graphic>
+      </p:graphicFrame>
     </p:spTree>
     <p:extLst>
       <p:ext uri="{BB962C8B-B14F-4D97-AF65-F5344CB8AC3E}">
-        <p14:creationId xmlns:p14="http://schemas.microsoft.com/office/powerpoint/2010/main" val="4033900076"/>
+        <p14:creationId xmlns:p14="http://schemas.microsoft.com/office/powerpoint/2010/main" val="508303959"/>
       </p:ext>
     </p:extLst>
   </p:cSld>
@@ -7647,7 +9256,7 @@
           <p:cNvPr id="2" name="Title 1">
             <a:extLst>
               <a:ext uri="{FF2B5EF4-FFF2-40B4-BE49-F238E27FC236}">
-                <a16:creationId xmlns:a16="http://schemas.microsoft.com/office/drawing/2014/main" id="{F20945F2-8D92-420A-815D-2D60176E6A01}"/>
+                <a16:creationId xmlns:a16="http://schemas.microsoft.com/office/drawing/2014/main" id="{B8D8FF8A-96C9-49D8-BA5C-977B947079A0}"/>
               </a:ext>
             </a:extLst>
           </p:cNvPr>
@@ -7665,40 +9274,1715 @@
           <a:p>
             <a:r>
               <a:rPr lang="en-US" dirty="0"/>
-              <a:t>Next Steps…</a:t>
-            </a:r>
+              <a:t>LDA </a:t>
+            </a:r>
+            <a:r>
+              <a:rPr lang="en-US"/>
+              <a:t>Resume Categorization (k = 5)</a:t>
+            </a:r>
+            <a:endParaRPr lang="en-US" dirty="0"/>
           </a:p>
         </p:txBody>
       </p:sp>
-      <p:sp>
-        <p:nvSpPr>
-          <p:cNvPr id="3" name="Content Placeholder 2">
+      <p:graphicFrame>
+        <p:nvGraphicFramePr>
+          <p:cNvPr id="4" name="Content Placeholder 3">
             <a:extLst>
               <a:ext uri="{FF2B5EF4-FFF2-40B4-BE49-F238E27FC236}">
-                <a16:creationId xmlns:a16="http://schemas.microsoft.com/office/drawing/2014/main" id="{BB5CE37B-29D2-4734-B33A-DA1505DC83B8}"/>
+                <a16:creationId xmlns:a16="http://schemas.microsoft.com/office/drawing/2014/main" id="{5054AF7E-388E-4846-8137-09F6956DAA90}"/>
               </a:ext>
             </a:extLst>
           </p:cNvPr>
-          <p:cNvSpPr>
-            <a:spLocks noGrp="1"/>
-          </p:cNvSpPr>
+          <p:cNvGraphicFramePr>
+            <a:graphicFrameLocks noGrp="1"/>
+          </p:cNvGraphicFramePr>
           <p:nvPr>
             <p:ph idx="1"/>
+            <p:extLst>
+              <p:ext uri="{D42A27DB-BD31-4B8C-83A1-F6EECF244321}">
+                <p14:modId xmlns:p14="http://schemas.microsoft.com/office/powerpoint/2010/main" val="86984699"/>
+              </p:ext>
+            </p:extLst>
           </p:nvPr>
+        </p:nvGraphicFramePr>
+        <p:xfrm>
+          <a:off x="838200" y="1690688"/>
+          <a:ext cx="10515603" cy="3739729"/>
+        </p:xfrm>
+        <a:graphic>
+          <a:graphicData uri="http://schemas.openxmlformats.org/drawingml/2006/table">
+            <a:tbl>
+              <a:tblPr>
+                <a:tableStyleId>{3B4B98B0-60AC-42C2-AFA5-B58CD77FA1E5}</a:tableStyleId>
+              </a:tblPr>
+              <a:tblGrid>
+                <a:gridCol w="2925393">
+                  <a:extLst>
+                    <a:ext uri="{9D8B030D-6E8A-4147-A177-3AD203B41FA5}">
+                      <a16:colId xmlns:a16="http://schemas.microsoft.com/office/drawing/2014/main" val="394654090"/>
+                    </a:ext>
+                  </a:extLst>
+                </a:gridCol>
+                <a:gridCol w="1265035">
+                  <a:extLst>
+                    <a:ext uri="{9D8B030D-6E8A-4147-A177-3AD203B41FA5}">
+                      <a16:colId xmlns:a16="http://schemas.microsoft.com/office/drawing/2014/main" val="831524205"/>
+                    </a:ext>
+                  </a:extLst>
+                </a:gridCol>
+                <a:gridCol w="1265035">
+                  <a:extLst>
+                    <a:ext uri="{9D8B030D-6E8A-4147-A177-3AD203B41FA5}">
+                      <a16:colId xmlns:a16="http://schemas.microsoft.com/office/drawing/2014/main" val="162282696"/>
+                    </a:ext>
+                  </a:extLst>
+                </a:gridCol>
+                <a:gridCol w="1265035">
+                  <a:extLst>
+                    <a:ext uri="{9D8B030D-6E8A-4147-A177-3AD203B41FA5}">
+                      <a16:colId xmlns:a16="http://schemas.microsoft.com/office/drawing/2014/main" val="1948352023"/>
+                    </a:ext>
+                  </a:extLst>
+                </a:gridCol>
+                <a:gridCol w="1265035">
+                  <a:extLst>
+                    <a:ext uri="{9D8B030D-6E8A-4147-A177-3AD203B41FA5}">
+                      <a16:colId xmlns:a16="http://schemas.microsoft.com/office/drawing/2014/main" val="1012470258"/>
+                    </a:ext>
+                  </a:extLst>
+                </a:gridCol>
+                <a:gridCol w="1265035">
+                  <a:extLst>
+                    <a:ext uri="{9D8B030D-6E8A-4147-A177-3AD203B41FA5}">
+                      <a16:colId xmlns:a16="http://schemas.microsoft.com/office/drawing/2014/main" val="2944731519"/>
+                    </a:ext>
+                  </a:extLst>
+                </a:gridCol>
+                <a:gridCol w="1265035">
+                  <a:extLst>
+                    <a:ext uri="{9D8B030D-6E8A-4147-A177-3AD203B41FA5}">
+                      <a16:colId xmlns:a16="http://schemas.microsoft.com/office/drawing/2014/main" val="306164675"/>
+                    </a:ext>
+                  </a:extLst>
+                </a:gridCol>
+              </a:tblGrid>
+              <a:tr h="534247">
+                <a:tc>
+                  <a:txBody>
+                    <a:bodyPr/>
+                    <a:lstStyle/>
+                    <a:p>
+                      <a:pPr algn="l" fontAlgn="b"/>
+                      <a:endParaRPr lang="en-US" sz="2400" b="0" i="0" u="none" strike="noStrike" dirty="0">
+                        <a:solidFill>
+                          <a:srgbClr val="000000"/>
+                        </a:solidFill>
+                        <a:effectLst/>
+                        <a:latin typeface="Calibri" panose="020F0502020204030204" pitchFamily="34" charset="0"/>
+                      </a:endParaRPr>
+                    </a:p>
+                  </a:txBody>
+                  <a:tcPr marL="9525" marR="9525" marT="9525" marB="0" anchor="b">
+                    <a:lnB w="12700" cap="flat" cmpd="sng" algn="ctr">
+                      <a:solidFill>
+                        <a:schemeClr val="accent1"/>
+                      </a:solidFill>
+                      <a:prstDash val="solid"/>
+                      <a:round/>
+                      <a:headEnd type="none" w="med" len="med"/>
+                      <a:tailEnd type="none" w="med" len="med"/>
+                    </a:lnB>
+                  </a:tcPr>
+                </a:tc>
+                <a:tc>
+                  <a:txBody>
+                    <a:bodyPr/>
+                    <a:lstStyle/>
+                    <a:p>
+                      <a:pPr algn="ctr" fontAlgn="b"/>
+                      <a:r>
+                        <a:rPr lang="en-US" sz="2400" u="none" strike="noStrike" dirty="0">
+                          <a:effectLst/>
+                        </a:rPr>
+                        <a:t>Topic 1</a:t>
+                      </a:r>
+                      <a:endParaRPr lang="en-US" sz="2400" b="0" i="0" u="none" strike="noStrike" dirty="0">
+                        <a:solidFill>
+                          <a:srgbClr val="000000"/>
+                        </a:solidFill>
+                        <a:effectLst/>
+                        <a:latin typeface="Calibri" panose="020F0502020204030204" pitchFamily="34" charset="0"/>
+                      </a:endParaRPr>
+                    </a:p>
+                  </a:txBody>
+                  <a:tcPr marL="9525" marR="9525" marT="9525" marB="0" anchor="b">
+                    <a:lnB w="12700" cap="flat" cmpd="sng" algn="ctr">
+                      <a:solidFill>
+                        <a:schemeClr val="accent1"/>
+                      </a:solidFill>
+                      <a:prstDash val="solid"/>
+                      <a:round/>
+                      <a:headEnd type="none" w="med" len="med"/>
+                      <a:tailEnd type="none" w="med" len="med"/>
+                    </a:lnB>
+                  </a:tcPr>
+                </a:tc>
+                <a:tc>
+                  <a:txBody>
+                    <a:bodyPr/>
+                    <a:lstStyle/>
+                    <a:p>
+                      <a:pPr algn="ctr" fontAlgn="b"/>
+                      <a:r>
+                        <a:rPr lang="en-US" sz="2400" u="none" strike="noStrike" dirty="0">
+                          <a:effectLst/>
+                        </a:rPr>
+                        <a:t>Topic 2</a:t>
+                      </a:r>
+                      <a:endParaRPr lang="en-US" sz="2400" b="0" i="0" u="none" strike="noStrike" dirty="0">
+                        <a:solidFill>
+                          <a:srgbClr val="000000"/>
+                        </a:solidFill>
+                        <a:effectLst/>
+                        <a:latin typeface="Calibri" panose="020F0502020204030204" pitchFamily="34" charset="0"/>
+                      </a:endParaRPr>
+                    </a:p>
+                  </a:txBody>
+                  <a:tcPr marL="9525" marR="9525" marT="9525" marB="0" anchor="b">
+                    <a:lnB w="12700" cap="flat" cmpd="sng" algn="ctr">
+                      <a:solidFill>
+                        <a:schemeClr val="accent1"/>
+                      </a:solidFill>
+                      <a:prstDash val="solid"/>
+                      <a:round/>
+                      <a:headEnd type="none" w="med" len="med"/>
+                      <a:tailEnd type="none" w="med" len="med"/>
+                    </a:lnB>
+                  </a:tcPr>
+                </a:tc>
+                <a:tc>
+                  <a:txBody>
+                    <a:bodyPr/>
+                    <a:lstStyle/>
+                    <a:p>
+                      <a:pPr algn="ctr" fontAlgn="b"/>
+                      <a:r>
+                        <a:rPr lang="en-US" sz="2400" u="none" strike="noStrike" dirty="0">
+                          <a:effectLst/>
+                        </a:rPr>
+                        <a:t>Topic 3</a:t>
+                      </a:r>
+                      <a:endParaRPr lang="en-US" sz="2400" b="0" i="0" u="none" strike="noStrike" dirty="0">
+                        <a:solidFill>
+                          <a:srgbClr val="000000"/>
+                        </a:solidFill>
+                        <a:effectLst/>
+                        <a:latin typeface="Calibri" panose="020F0502020204030204" pitchFamily="34" charset="0"/>
+                      </a:endParaRPr>
+                    </a:p>
+                  </a:txBody>
+                  <a:tcPr marL="9525" marR="9525" marT="9525" marB="0" anchor="b">
+                    <a:lnB w="12700" cap="flat" cmpd="sng" algn="ctr">
+                      <a:solidFill>
+                        <a:schemeClr val="accent1"/>
+                      </a:solidFill>
+                      <a:prstDash val="solid"/>
+                      <a:round/>
+                      <a:headEnd type="none" w="med" len="med"/>
+                      <a:tailEnd type="none" w="med" len="med"/>
+                    </a:lnB>
+                  </a:tcPr>
+                </a:tc>
+                <a:tc>
+                  <a:txBody>
+                    <a:bodyPr/>
+                    <a:lstStyle/>
+                    <a:p>
+                      <a:pPr algn="ctr" fontAlgn="b"/>
+                      <a:r>
+                        <a:rPr lang="en-US" sz="2400" u="none" strike="noStrike" dirty="0">
+                          <a:effectLst/>
+                        </a:rPr>
+                        <a:t>Topic 4</a:t>
+                      </a:r>
+                      <a:endParaRPr lang="en-US" sz="2400" b="0" i="0" u="none" strike="noStrike" dirty="0">
+                        <a:solidFill>
+                          <a:srgbClr val="000000"/>
+                        </a:solidFill>
+                        <a:effectLst/>
+                        <a:latin typeface="Calibri" panose="020F0502020204030204" pitchFamily="34" charset="0"/>
+                      </a:endParaRPr>
+                    </a:p>
+                  </a:txBody>
+                  <a:tcPr marL="9525" marR="9525" marT="9525" marB="0" anchor="b">
+                    <a:lnB w="12700" cap="flat" cmpd="sng" algn="ctr">
+                      <a:solidFill>
+                        <a:schemeClr val="accent1"/>
+                      </a:solidFill>
+                      <a:prstDash val="solid"/>
+                      <a:round/>
+                      <a:headEnd type="none" w="med" len="med"/>
+                      <a:tailEnd type="none" w="med" len="med"/>
+                    </a:lnB>
+                  </a:tcPr>
+                </a:tc>
+                <a:tc>
+                  <a:txBody>
+                    <a:bodyPr/>
+                    <a:lstStyle/>
+                    <a:p>
+                      <a:pPr algn="ctr" fontAlgn="b"/>
+                      <a:r>
+                        <a:rPr lang="en-US" sz="2400" u="none" strike="noStrike" dirty="0">
+                          <a:effectLst/>
+                        </a:rPr>
+                        <a:t>Topic 5</a:t>
+                      </a:r>
+                      <a:endParaRPr lang="en-US" sz="2400" b="0" i="0" u="none" strike="noStrike" dirty="0">
+                        <a:solidFill>
+                          <a:srgbClr val="000000"/>
+                        </a:solidFill>
+                        <a:effectLst/>
+                        <a:latin typeface="Calibri" panose="020F0502020204030204" pitchFamily="34" charset="0"/>
+                      </a:endParaRPr>
+                    </a:p>
+                  </a:txBody>
+                  <a:tcPr marL="9525" marR="9525" marT="9525" marB="0" anchor="b">
+                    <a:lnB w="12700" cap="flat" cmpd="sng" algn="ctr">
+                      <a:solidFill>
+                        <a:schemeClr val="accent1"/>
+                      </a:solidFill>
+                      <a:prstDash val="solid"/>
+                      <a:round/>
+                      <a:headEnd type="none" w="med" len="med"/>
+                      <a:tailEnd type="none" w="med" len="med"/>
+                    </a:lnB>
+                  </a:tcPr>
+                </a:tc>
+                <a:tc>
+                  <a:txBody>
+                    <a:bodyPr/>
+                    <a:lstStyle/>
+                    <a:p>
+                      <a:pPr algn="r" fontAlgn="b"/>
+                      <a:r>
+                        <a:rPr lang="en-US" sz="2400" u="none" strike="noStrike" dirty="0">
+                          <a:effectLst/>
+                        </a:rPr>
+                        <a:t>Row Sum</a:t>
+                      </a:r>
+                      <a:endParaRPr lang="en-US" sz="2400" b="0" i="0" u="none" strike="noStrike" dirty="0">
+                        <a:solidFill>
+                          <a:srgbClr val="000000"/>
+                        </a:solidFill>
+                        <a:effectLst/>
+                        <a:latin typeface="Calibri" panose="020F0502020204030204" pitchFamily="34" charset="0"/>
+                      </a:endParaRPr>
+                    </a:p>
+                  </a:txBody>
+                  <a:tcPr marL="9525" marR="9525" marT="9525" marB="0" anchor="b">
+                    <a:lnB w="12700" cap="flat" cmpd="sng" algn="ctr">
+                      <a:solidFill>
+                        <a:schemeClr val="accent1"/>
+                      </a:solidFill>
+                      <a:prstDash val="solid"/>
+                      <a:round/>
+                      <a:headEnd type="none" w="med" len="med"/>
+                      <a:tailEnd type="none" w="med" len="med"/>
+                    </a:lnB>
+                  </a:tcPr>
+                </a:tc>
+                <a:extLst>
+                  <a:ext uri="{0D108BD9-81ED-4DB2-BD59-A6C34878D82A}">
+                    <a16:rowId xmlns:a16="http://schemas.microsoft.com/office/drawing/2014/main" val="2957844277"/>
+                  </a:ext>
+                </a:extLst>
+              </a:tr>
+              <a:tr h="534247">
+                <a:tc>
+                  <a:txBody>
+                    <a:bodyPr/>
+                    <a:lstStyle/>
+                    <a:p>
+                      <a:pPr algn="l" fontAlgn="b"/>
+                      <a:r>
+                        <a:rPr lang="en-US" sz="2400" u="none" strike="noStrike" dirty="0">
+                          <a:effectLst/>
+                        </a:rPr>
+                        <a:t>Jack</a:t>
+                      </a:r>
+                      <a:endParaRPr lang="en-US" sz="2400" b="0" i="0" u="none" strike="noStrike" dirty="0">
+                        <a:solidFill>
+                          <a:srgbClr val="000000"/>
+                        </a:solidFill>
+                        <a:effectLst/>
+                        <a:latin typeface="Calibri" panose="020F0502020204030204" pitchFamily="34" charset="0"/>
+                      </a:endParaRPr>
+                    </a:p>
+                  </a:txBody>
+                  <a:tcPr marL="9525" marR="9525" marT="9525" marB="0" anchor="b">
+                    <a:lnR w="12700" cap="flat" cmpd="sng" algn="ctr">
+                      <a:solidFill>
+                        <a:schemeClr val="accent1"/>
+                      </a:solidFill>
+                      <a:prstDash val="solid"/>
+                      <a:round/>
+                      <a:headEnd type="none" w="med" len="med"/>
+                      <a:tailEnd type="none" w="med" len="med"/>
+                    </a:lnR>
+                    <a:lnT w="12700" cap="flat" cmpd="sng" algn="ctr">
+                      <a:solidFill>
+                        <a:schemeClr val="accent1"/>
+                      </a:solidFill>
+                      <a:prstDash val="solid"/>
+                      <a:round/>
+                      <a:headEnd type="none" w="med" len="med"/>
+                      <a:tailEnd type="none" w="med" len="med"/>
+                    </a:lnT>
+                  </a:tcPr>
+                </a:tc>
+                <a:tc>
+                  <a:txBody>
+                    <a:bodyPr/>
+                    <a:lstStyle/>
+                    <a:p>
+                      <a:pPr algn="ctr" fontAlgn="b"/>
+                      <a:r>
+                        <a:rPr lang="en-US" sz="2400" u="none" strike="noStrike" dirty="0">
+                          <a:effectLst/>
+                        </a:rPr>
+                        <a:t>0.518</a:t>
+                      </a:r>
+                      <a:endParaRPr lang="en-US" sz="2400" b="0" i="0" u="none" strike="noStrike" dirty="0">
+                        <a:solidFill>
+                          <a:srgbClr val="000000"/>
+                        </a:solidFill>
+                        <a:effectLst/>
+                        <a:latin typeface="Calibri" panose="020F0502020204030204" pitchFamily="34" charset="0"/>
+                      </a:endParaRPr>
+                    </a:p>
+                  </a:txBody>
+                  <a:tcPr marL="9525" marR="9525" marT="9525" marB="0" anchor="b">
+                    <a:lnL w="12700" cap="flat" cmpd="sng" algn="ctr">
+                      <a:solidFill>
+                        <a:schemeClr val="accent1"/>
+                      </a:solidFill>
+                      <a:prstDash val="solid"/>
+                      <a:round/>
+                      <a:headEnd type="none" w="med" len="med"/>
+                      <a:tailEnd type="none" w="med" len="med"/>
+                    </a:lnL>
+                    <a:lnT w="12700" cap="flat" cmpd="sng" algn="ctr">
+                      <a:solidFill>
+                        <a:schemeClr val="accent1"/>
+                      </a:solidFill>
+                      <a:prstDash val="solid"/>
+                      <a:round/>
+                      <a:headEnd type="none" w="med" len="med"/>
+                      <a:tailEnd type="none" w="med" len="med"/>
+                    </a:lnT>
+                  </a:tcPr>
+                </a:tc>
+                <a:tc>
+                  <a:txBody>
+                    <a:bodyPr/>
+                    <a:lstStyle/>
+                    <a:p>
+                      <a:pPr algn="ctr" fontAlgn="b"/>
+                      <a:r>
+                        <a:rPr lang="en-US" sz="2400" u="none" strike="noStrike" dirty="0">
+                          <a:effectLst/>
+                        </a:rPr>
+                        <a:t>0.021</a:t>
+                      </a:r>
+                      <a:endParaRPr lang="en-US" sz="2400" b="0" i="0" u="none" strike="noStrike" dirty="0">
+                        <a:solidFill>
+                          <a:srgbClr val="000000"/>
+                        </a:solidFill>
+                        <a:effectLst/>
+                        <a:latin typeface="Calibri" panose="020F0502020204030204" pitchFamily="34" charset="0"/>
+                      </a:endParaRPr>
+                    </a:p>
+                  </a:txBody>
+                  <a:tcPr marL="9525" marR="9525" marT="9525" marB="0" anchor="b">
+                    <a:lnT w="12700" cap="flat" cmpd="sng" algn="ctr">
+                      <a:solidFill>
+                        <a:schemeClr val="accent1"/>
+                      </a:solidFill>
+                      <a:prstDash val="solid"/>
+                      <a:round/>
+                      <a:headEnd type="none" w="med" len="med"/>
+                      <a:tailEnd type="none" w="med" len="med"/>
+                    </a:lnT>
+                  </a:tcPr>
+                </a:tc>
+                <a:tc>
+                  <a:txBody>
+                    <a:bodyPr/>
+                    <a:lstStyle/>
+                    <a:p>
+                      <a:pPr algn="ctr" fontAlgn="b"/>
+                      <a:r>
+                        <a:rPr lang="en-US" sz="2400" u="none" strike="noStrike" dirty="0">
+                          <a:effectLst/>
+                        </a:rPr>
+                        <a:t>0.021</a:t>
+                      </a:r>
+                      <a:endParaRPr lang="en-US" sz="2400" b="0" i="0" u="none" strike="noStrike" dirty="0">
+                        <a:solidFill>
+                          <a:srgbClr val="000000"/>
+                        </a:solidFill>
+                        <a:effectLst/>
+                        <a:latin typeface="Calibri" panose="020F0502020204030204" pitchFamily="34" charset="0"/>
+                      </a:endParaRPr>
+                    </a:p>
+                  </a:txBody>
+                  <a:tcPr marL="9525" marR="9525" marT="9525" marB="0" anchor="b">
+                    <a:lnT w="12700" cap="flat" cmpd="sng" algn="ctr">
+                      <a:solidFill>
+                        <a:schemeClr val="accent1"/>
+                      </a:solidFill>
+                      <a:prstDash val="solid"/>
+                      <a:round/>
+                      <a:headEnd type="none" w="med" len="med"/>
+                      <a:tailEnd type="none" w="med" len="med"/>
+                    </a:lnT>
+                  </a:tcPr>
+                </a:tc>
+                <a:tc>
+                  <a:txBody>
+                    <a:bodyPr/>
+                    <a:lstStyle/>
+                    <a:p>
+                      <a:pPr algn="ctr" fontAlgn="b"/>
+                      <a:r>
+                        <a:rPr lang="en-US" sz="2400" u="none" strike="noStrike" dirty="0">
+                          <a:effectLst/>
+                        </a:rPr>
+                        <a:t>0.058</a:t>
+                      </a:r>
+                      <a:endParaRPr lang="en-US" sz="2400" b="0" i="0" u="none" strike="noStrike" dirty="0">
+                        <a:solidFill>
+                          <a:srgbClr val="000000"/>
+                        </a:solidFill>
+                        <a:effectLst/>
+                        <a:latin typeface="Calibri" panose="020F0502020204030204" pitchFamily="34" charset="0"/>
+                      </a:endParaRPr>
+                    </a:p>
+                  </a:txBody>
+                  <a:tcPr marL="9525" marR="9525" marT="9525" marB="0" anchor="b">
+                    <a:lnT w="12700" cap="flat" cmpd="sng" algn="ctr">
+                      <a:solidFill>
+                        <a:schemeClr val="accent1"/>
+                      </a:solidFill>
+                      <a:prstDash val="solid"/>
+                      <a:round/>
+                      <a:headEnd type="none" w="med" len="med"/>
+                      <a:tailEnd type="none" w="med" len="med"/>
+                    </a:lnT>
+                  </a:tcPr>
+                </a:tc>
+                <a:tc>
+                  <a:txBody>
+                    <a:bodyPr/>
+                    <a:lstStyle/>
+                    <a:p>
+                      <a:pPr algn="ctr" fontAlgn="b"/>
+                      <a:r>
+                        <a:rPr lang="en-US" sz="2400" u="none" strike="noStrike" dirty="0">
+                          <a:effectLst/>
+                        </a:rPr>
+                        <a:t>0.383</a:t>
+                      </a:r>
+                      <a:endParaRPr lang="en-US" sz="2400" b="0" i="0" u="none" strike="noStrike" dirty="0">
+                        <a:solidFill>
+                          <a:srgbClr val="000000"/>
+                        </a:solidFill>
+                        <a:effectLst/>
+                        <a:latin typeface="Calibri" panose="020F0502020204030204" pitchFamily="34" charset="0"/>
+                      </a:endParaRPr>
+                    </a:p>
+                  </a:txBody>
+                  <a:tcPr marL="9525" marR="9525" marT="9525" marB="0" anchor="b">
+                    <a:lnR w="12700" cap="flat" cmpd="sng" algn="ctr">
+                      <a:solidFill>
+                        <a:schemeClr val="accent1"/>
+                      </a:solidFill>
+                      <a:prstDash val="solid"/>
+                      <a:round/>
+                      <a:headEnd type="none" w="med" len="med"/>
+                      <a:tailEnd type="none" w="med" len="med"/>
+                    </a:lnR>
+                    <a:lnT w="12700" cap="flat" cmpd="sng" algn="ctr">
+                      <a:solidFill>
+                        <a:schemeClr val="accent1"/>
+                      </a:solidFill>
+                      <a:prstDash val="solid"/>
+                      <a:round/>
+                      <a:headEnd type="none" w="med" len="med"/>
+                      <a:tailEnd type="none" w="med" len="med"/>
+                    </a:lnT>
+                  </a:tcPr>
+                </a:tc>
+                <a:tc>
+                  <a:txBody>
+                    <a:bodyPr/>
+                    <a:lstStyle/>
+                    <a:p>
+                      <a:pPr algn="r" fontAlgn="b"/>
+                      <a:r>
+                        <a:rPr lang="en-US" sz="2400" u="none" strike="noStrike">
+                          <a:effectLst/>
+                        </a:rPr>
+                        <a:t>1.000</a:t>
+                      </a:r>
+                      <a:endParaRPr lang="en-US" sz="2400" b="0" i="0" u="none" strike="noStrike">
+                        <a:solidFill>
+                          <a:srgbClr val="000000"/>
+                        </a:solidFill>
+                        <a:effectLst/>
+                        <a:latin typeface="Calibri" panose="020F0502020204030204" pitchFamily="34" charset="0"/>
+                      </a:endParaRPr>
+                    </a:p>
+                  </a:txBody>
+                  <a:tcPr marL="9525" marR="9525" marT="9525" marB="0" anchor="b">
+                    <a:lnL w="12700" cap="flat" cmpd="sng" algn="ctr">
+                      <a:solidFill>
+                        <a:schemeClr val="accent1"/>
+                      </a:solidFill>
+                      <a:prstDash val="solid"/>
+                      <a:round/>
+                      <a:headEnd type="none" w="med" len="med"/>
+                      <a:tailEnd type="none" w="med" len="med"/>
+                    </a:lnL>
+                    <a:lnT w="12700" cap="flat" cmpd="sng" algn="ctr">
+                      <a:solidFill>
+                        <a:schemeClr val="accent1"/>
+                      </a:solidFill>
+                      <a:prstDash val="solid"/>
+                      <a:round/>
+                      <a:headEnd type="none" w="med" len="med"/>
+                      <a:tailEnd type="none" w="med" len="med"/>
+                    </a:lnT>
+                  </a:tcPr>
+                </a:tc>
+                <a:extLst>
+                  <a:ext uri="{0D108BD9-81ED-4DB2-BD59-A6C34878D82A}">
+                    <a16:rowId xmlns:a16="http://schemas.microsoft.com/office/drawing/2014/main" val="1916757250"/>
+                  </a:ext>
+                </a:extLst>
+              </a:tr>
+              <a:tr h="534247">
+                <a:tc>
+                  <a:txBody>
+                    <a:bodyPr/>
+                    <a:lstStyle/>
+                    <a:p>
+                      <a:pPr algn="l" fontAlgn="b"/>
+                      <a:r>
+                        <a:rPr lang="en-US" sz="2400" u="none" strike="noStrike" dirty="0">
+                          <a:effectLst/>
+                        </a:rPr>
+                        <a:t>Nathan</a:t>
+                      </a:r>
+                      <a:endParaRPr lang="en-US" sz="2400" b="0" i="0" u="none" strike="noStrike" dirty="0">
+                        <a:solidFill>
+                          <a:srgbClr val="000000"/>
+                        </a:solidFill>
+                        <a:effectLst/>
+                        <a:latin typeface="Calibri" panose="020F0502020204030204" pitchFamily="34" charset="0"/>
+                      </a:endParaRPr>
+                    </a:p>
+                  </a:txBody>
+                  <a:tcPr marL="9525" marR="9525" marT="9525" marB="0" anchor="b">
+                    <a:lnR w="12700" cap="flat" cmpd="sng" algn="ctr">
+                      <a:solidFill>
+                        <a:schemeClr val="accent1"/>
+                      </a:solidFill>
+                      <a:prstDash val="solid"/>
+                      <a:round/>
+                      <a:headEnd type="none" w="med" len="med"/>
+                      <a:tailEnd type="none" w="med" len="med"/>
+                    </a:lnR>
+                  </a:tcPr>
+                </a:tc>
+                <a:tc>
+                  <a:txBody>
+                    <a:bodyPr/>
+                    <a:lstStyle/>
+                    <a:p>
+                      <a:pPr algn="ctr" fontAlgn="b"/>
+                      <a:r>
+                        <a:rPr lang="en-US" sz="2400" u="none" strike="noStrike" dirty="0">
+                          <a:effectLst/>
+                        </a:rPr>
+                        <a:t>0.632</a:t>
+                      </a:r>
+                      <a:endParaRPr lang="en-US" sz="2400" b="0" i="0" u="none" strike="noStrike" dirty="0">
+                        <a:solidFill>
+                          <a:srgbClr val="000000"/>
+                        </a:solidFill>
+                        <a:effectLst/>
+                        <a:latin typeface="Calibri" panose="020F0502020204030204" pitchFamily="34" charset="0"/>
+                      </a:endParaRPr>
+                    </a:p>
+                  </a:txBody>
+                  <a:tcPr marL="9525" marR="9525" marT="9525" marB="0" anchor="b">
+                    <a:lnL w="12700" cap="flat" cmpd="sng" algn="ctr">
+                      <a:solidFill>
+                        <a:schemeClr val="accent1"/>
+                      </a:solidFill>
+                      <a:prstDash val="solid"/>
+                      <a:round/>
+                      <a:headEnd type="none" w="med" len="med"/>
+                      <a:tailEnd type="none" w="med" len="med"/>
+                    </a:lnL>
+                  </a:tcPr>
+                </a:tc>
+                <a:tc>
+                  <a:txBody>
+                    <a:bodyPr/>
+                    <a:lstStyle/>
+                    <a:p>
+                      <a:pPr algn="ctr" fontAlgn="b"/>
+                      <a:r>
+                        <a:rPr lang="en-US" sz="2400" u="none" strike="noStrike" dirty="0">
+                          <a:effectLst/>
+                        </a:rPr>
+                        <a:t>0.034</a:t>
+                      </a:r>
+                      <a:endParaRPr lang="en-US" sz="2400" b="0" i="0" u="none" strike="noStrike" dirty="0">
+                        <a:solidFill>
+                          <a:srgbClr val="000000"/>
+                        </a:solidFill>
+                        <a:effectLst/>
+                        <a:latin typeface="Calibri" panose="020F0502020204030204" pitchFamily="34" charset="0"/>
+                      </a:endParaRPr>
+                    </a:p>
+                  </a:txBody>
+                  <a:tcPr marL="9525" marR="9525" marT="9525" marB="0" anchor="b"/>
+                </a:tc>
+                <a:tc>
+                  <a:txBody>
+                    <a:bodyPr/>
+                    <a:lstStyle/>
+                    <a:p>
+                      <a:pPr algn="ctr" fontAlgn="b"/>
+                      <a:r>
+                        <a:rPr lang="en-US" sz="2400" u="none" strike="noStrike" dirty="0">
+                          <a:effectLst/>
+                        </a:rPr>
+                        <a:t>0.024</a:t>
+                      </a:r>
+                      <a:endParaRPr lang="en-US" sz="2400" b="0" i="0" u="none" strike="noStrike" dirty="0">
+                        <a:solidFill>
+                          <a:srgbClr val="000000"/>
+                        </a:solidFill>
+                        <a:effectLst/>
+                        <a:latin typeface="Calibri" panose="020F0502020204030204" pitchFamily="34" charset="0"/>
+                      </a:endParaRPr>
+                    </a:p>
+                  </a:txBody>
+                  <a:tcPr marL="9525" marR="9525" marT="9525" marB="0" anchor="b"/>
+                </a:tc>
+                <a:tc>
+                  <a:txBody>
+                    <a:bodyPr/>
+                    <a:lstStyle/>
+                    <a:p>
+                      <a:pPr algn="ctr" fontAlgn="b"/>
+                      <a:r>
+                        <a:rPr lang="en-US" sz="2400" u="none" strike="noStrike" dirty="0">
+                          <a:effectLst/>
+                        </a:rPr>
+                        <a:t>0.049</a:t>
+                      </a:r>
+                      <a:endParaRPr lang="en-US" sz="2400" b="0" i="0" u="none" strike="noStrike" dirty="0">
+                        <a:solidFill>
+                          <a:srgbClr val="000000"/>
+                        </a:solidFill>
+                        <a:effectLst/>
+                        <a:latin typeface="Calibri" panose="020F0502020204030204" pitchFamily="34" charset="0"/>
+                      </a:endParaRPr>
+                    </a:p>
+                  </a:txBody>
+                  <a:tcPr marL="9525" marR="9525" marT="9525" marB="0" anchor="b"/>
+                </a:tc>
+                <a:tc>
+                  <a:txBody>
+                    <a:bodyPr/>
+                    <a:lstStyle/>
+                    <a:p>
+                      <a:pPr algn="ctr" fontAlgn="b"/>
+                      <a:r>
+                        <a:rPr lang="en-US" sz="2400" u="none" strike="noStrike" dirty="0">
+                          <a:effectLst/>
+                        </a:rPr>
+                        <a:t>0.262</a:t>
+                      </a:r>
+                      <a:endParaRPr lang="en-US" sz="2400" b="0" i="0" u="none" strike="noStrike" dirty="0">
+                        <a:solidFill>
+                          <a:srgbClr val="000000"/>
+                        </a:solidFill>
+                        <a:effectLst/>
+                        <a:latin typeface="Calibri" panose="020F0502020204030204" pitchFamily="34" charset="0"/>
+                      </a:endParaRPr>
+                    </a:p>
+                  </a:txBody>
+                  <a:tcPr marL="9525" marR="9525" marT="9525" marB="0" anchor="b">
+                    <a:lnR w="12700" cap="flat" cmpd="sng" algn="ctr">
+                      <a:solidFill>
+                        <a:schemeClr val="accent1"/>
+                      </a:solidFill>
+                      <a:prstDash val="solid"/>
+                      <a:round/>
+                      <a:headEnd type="none" w="med" len="med"/>
+                      <a:tailEnd type="none" w="med" len="med"/>
+                    </a:lnR>
+                  </a:tcPr>
+                </a:tc>
+                <a:tc>
+                  <a:txBody>
+                    <a:bodyPr/>
+                    <a:lstStyle/>
+                    <a:p>
+                      <a:pPr algn="r" fontAlgn="b"/>
+                      <a:r>
+                        <a:rPr lang="en-US" sz="2400" u="none" strike="noStrike">
+                          <a:effectLst/>
+                        </a:rPr>
+                        <a:t>1.000</a:t>
+                      </a:r>
+                      <a:endParaRPr lang="en-US" sz="2400" b="0" i="0" u="none" strike="noStrike">
+                        <a:solidFill>
+                          <a:srgbClr val="000000"/>
+                        </a:solidFill>
+                        <a:effectLst/>
+                        <a:latin typeface="Calibri" panose="020F0502020204030204" pitchFamily="34" charset="0"/>
+                      </a:endParaRPr>
+                    </a:p>
+                  </a:txBody>
+                  <a:tcPr marL="9525" marR="9525" marT="9525" marB="0" anchor="b">
+                    <a:lnL w="12700" cap="flat" cmpd="sng" algn="ctr">
+                      <a:solidFill>
+                        <a:schemeClr val="accent1"/>
+                      </a:solidFill>
+                      <a:prstDash val="solid"/>
+                      <a:round/>
+                      <a:headEnd type="none" w="med" len="med"/>
+                      <a:tailEnd type="none" w="med" len="med"/>
+                    </a:lnL>
+                  </a:tcPr>
+                </a:tc>
+                <a:extLst>
+                  <a:ext uri="{0D108BD9-81ED-4DB2-BD59-A6C34878D82A}">
+                    <a16:rowId xmlns:a16="http://schemas.microsoft.com/office/drawing/2014/main" val="2510245828"/>
+                  </a:ext>
+                </a:extLst>
+              </a:tr>
+              <a:tr h="534247">
+                <a:tc>
+                  <a:txBody>
+                    <a:bodyPr/>
+                    <a:lstStyle/>
+                    <a:p>
+                      <a:pPr algn="l" fontAlgn="b"/>
+                      <a:r>
+                        <a:rPr lang="en-US" sz="2400" u="none" strike="noStrike" dirty="0">
+                          <a:effectLst/>
+                        </a:rPr>
+                        <a:t>Adam</a:t>
+                      </a:r>
+                      <a:endParaRPr lang="en-US" sz="2400" b="0" i="0" u="none" strike="noStrike" dirty="0">
+                        <a:solidFill>
+                          <a:srgbClr val="000000"/>
+                        </a:solidFill>
+                        <a:effectLst/>
+                        <a:latin typeface="Calibri" panose="020F0502020204030204" pitchFamily="34" charset="0"/>
+                      </a:endParaRPr>
+                    </a:p>
+                  </a:txBody>
+                  <a:tcPr marL="9525" marR="9525" marT="9525" marB="0" anchor="b">
+                    <a:lnR w="12700" cap="flat" cmpd="sng" algn="ctr">
+                      <a:solidFill>
+                        <a:schemeClr val="accent1"/>
+                      </a:solidFill>
+                      <a:prstDash val="solid"/>
+                      <a:round/>
+                      <a:headEnd type="none" w="med" len="med"/>
+                      <a:tailEnd type="none" w="med" len="med"/>
+                    </a:lnR>
+                  </a:tcPr>
+                </a:tc>
+                <a:tc>
+                  <a:txBody>
+                    <a:bodyPr/>
+                    <a:lstStyle/>
+                    <a:p>
+                      <a:pPr algn="ctr" fontAlgn="b"/>
+                      <a:r>
+                        <a:rPr lang="en-US" sz="2400" u="none" strike="noStrike" dirty="0">
+                          <a:effectLst/>
+                        </a:rPr>
+                        <a:t>0.253</a:t>
+                      </a:r>
+                      <a:endParaRPr lang="en-US" sz="2400" b="0" i="0" u="none" strike="noStrike" dirty="0">
+                        <a:solidFill>
+                          <a:srgbClr val="000000"/>
+                        </a:solidFill>
+                        <a:effectLst/>
+                        <a:latin typeface="Calibri" panose="020F0502020204030204" pitchFamily="34" charset="0"/>
+                      </a:endParaRPr>
+                    </a:p>
+                  </a:txBody>
+                  <a:tcPr marL="9525" marR="9525" marT="9525" marB="0" anchor="b">
+                    <a:lnL w="12700" cap="flat" cmpd="sng" algn="ctr">
+                      <a:solidFill>
+                        <a:schemeClr val="accent1"/>
+                      </a:solidFill>
+                      <a:prstDash val="solid"/>
+                      <a:round/>
+                      <a:headEnd type="none" w="med" len="med"/>
+                      <a:tailEnd type="none" w="med" len="med"/>
+                    </a:lnL>
+                  </a:tcPr>
+                </a:tc>
+                <a:tc>
+                  <a:txBody>
+                    <a:bodyPr/>
+                    <a:lstStyle/>
+                    <a:p>
+                      <a:pPr algn="ctr" fontAlgn="b"/>
+                      <a:r>
+                        <a:rPr lang="en-US" sz="2400" u="none" strike="noStrike" dirty="0">
+                          <a:effectLst/>
+                        </a:rPr>
+                        <a:t>0.319</a:t>
+                      </a:r>
+                      <a:endParaRPr lang="en-US" sz="2400" b="0" i="0" u="none" strike="noStrike" dirty="0">
+                        <a:solidFill>
+                          <a:srgbClr val="000000"/>
+                        </a:solidFill>
+                        <a:effectLst/>
+                        <a:latin typeface="Calibri" panose="020F0502020204030204" pitchFamily="34" charset="0"/>
+                      </a:endParaRPr>
+                    </a:p>
+                  </a:txBody>
+                  <a:tcPr marL="9525" marR="9525" marT="9525" marB="0" anchor="b"/>
+                </a:tc>
+                <a:tc>
+                  <a:txBody>
+                    <a:bodyPr/>
+                    <a:lstStyle/>
+                    <a:p>
+                      <a:pPr algn="ctr" fontAlgn="b"/>
+                      <a:r>
+                        <a:rPr lang="en-US" sz="2400" u="none" strike="noStrike">
+                          <a:effectLst/>
+                        </a:rPr>
+                        <a:t>0.032</a:t>
+                      </a:r>
+                      <a:endParaRPr lang="en-US" sz="2400" b="0" i="0" u="none" strike="noStrike">
+                        <a:solidFill>
+                          <a:srgbClr val="000000"/>
+                        </a:solidFill>
+                        <a:effectLst/>
+                        <a:latin typeface="Calibri" panose="020F0502020204030204" pitchFamily="34" charset="0"/>
+                      </a:endParaRPr>
+                    </a:p>
+                  </a:txBody>
+                  <a:tcPr marL="9525" marR="9525" marT="9525" marB="0" anchor="b"/>
+                </a:tc>
+                <a:tc>
+                  <a:txBody>
+                    <a:bodyPr/>
+                    <a:lstStyle/>
+                    <a:p>
+                      <a:pPr algn="ctr" fontAlgn="b"/>
+                      <a:r>
+                        <a:rPr lang="en-US" sz="2400" u="none" strike="noStrike" dirty="0">
+                          <a:effectLst/>
+                        </a:rPr>
+                        <a:t>0.041</a:t>
+                      </a:r>
+                      <a:endParaRPr lang="en-US" sz="2400" b="0" i="0" u="none" strike="noStrike" dirty="0">
+                        <a:solidFill>
+                          <a:srgbClr val="000000"/>
+                        </a:solidFill>
+                        <a:effectLst/>
+                        <a:latin typeface="Calibri" panose="020F0502020204030204" pitchFamily="34" charset="0"/>
+                      </a:endParaRPr>
+                    </a:p>
+                  </a:txBody>
+                  <a:tcPr marL="9525" marR="9525" marT="9525" marB="0" anchor="b"/>
+                </a:tc>
+                <a:tc>
+                  <a:txBody>
+                    <a:bodyPr/>
+                    <a:lstStyle/>
+                    <a:p>
+                      <a:pPr algn="ctr" fontAlgn="b"/>
+                      <a:r>
+                        <a:rPr lang="en-US" sz="2400" u="none" strike="noStrike" dirty="0">
+                          <a:effectLst/>
+                        </a:rPr>
+                        <a:t>0.355</a:t>
+                      </a:r>
+                      <a:endParaRPr lang="en-US" sz="2400" b="0" i="0" u="none" strike="noStrike" dirty="0">
+                        <a:solidFill>
+                          <a:srgbClr val="000000"/>
+                        </a:solidFill>
+                        <a:effectLst/>
+                        <a:latin typeface="Calibri" panose="020F0502020204030204" pitchFamily="34" charset="0"/>
+                      </a:endParaRPr>
+                    </a:p>
+                  </a:txBody>
+                  <a:tcPr marL="9525" marR="9525" marT="9525" marB="0" anchor="b">
+                    <a:lnR w="12700" cap="flat" cmpd="sng" algn="ctr">
+                      <a:solidFill>
+                        <a:schemeClr val="accent1"/>
+                      </a:solidFill>
+                      <a:prstDash val="solid"/>
+                      <a:round/>
+                      <a:headEnd type="none" w="med" len="med"/>
+                      <a:tailEnd type="none" w="med" len="med"/>
+                    </a:lnR>
+                  </a:tcPr>
+                </a:tc>
+                <a:tc>
+                  <a:txBody>
+                    <a:bodyPr/>
+                    <a:lstStyle/>
+                    <a:p>
+                      <a:pPr algn="r" fontAlgn="b"/>
+                      <a:r>
+                        <a:rPr lang="en-US" sz="2400" u="none" strike="noStrike">
+                          <a:effectLst/>
+                        </a:rPr>
+                        <a:t>1.000</a:t>
+                      </a:r>
+                      <a:endParaRPr lang="en-US" sz="2400" b="0" i="0" u="none" strike="noStrike">
+                        <a:solidFill>
+                          <a:srgbClr val="000000"/>
+                        </a:solidFill>
+                        <a:effectLst/>
+                        <a:latin typeface="Calibri" panose="020F0502020204030204" pitchFamily="34" charset="0"/>
+                      </a:endParaRPr>
+                    </a:p>
+                  </a:txBody>
+                  <a:tcPr marL="9525" marR="9525" marT="9525" marB="0" anchor="b">
+                    <a:lnL w="12700" cap="flat" cmpd="sng" algn="ctr">
+                      <a:solidFill>
+                        <a:schemeClr val="accent1"/>
+                      </a:solidFill>
+                      <a:prstDash val="solid"/>
+                      <a:round/>
+                      <a:headEnd type="none" w="med" len="med"/>
+                      <a:tailEnd type="none" w="med" len="med"/>
+                    </a:lnL>
+                  </a:tcPr>
+                </a:tc>
+                <a:extLst>
+                  <a:ext uri="{0D108BD9-81ED-4DB2-BD59-A6C34878D82A}">
+                    <a16:rowId xmlns:a16="http://schemas.microsoft.com/office/drawing/2014/main" val="3580974823"/>
+                  </a:ext>
+                </a:extLst>
+              </a:tr>
+              <a:tr h="534247">
+                <a:tc>
+                  <a:txBody>
+                    <a:bodyPr/>
+                    <a:lstStyle/>
+                    <a:p>
+                      <a:pPr algn="l" fontAlgn="b"/>
+                      <a:r>
+                        <a:rPr lang="en-US" sz="2400" u="none" strike="noStrike" dirty="0" err="1">
+                          <a:effectLst/>
+                        </a:rPr>
+                        <a:t>Sample_Art</a:t>
+                      </a:r>
+                      <a:endParaRPr lang="en-US" sz="2400" b="0" i="0" u="none" strike="noStrike" dirty="0">
+                        <a:solidFill>
+                          <a:srgbClr val="000000"/>
+                        </a:solidFill>
+                        <a:effectLst/>
+                        <a:latin typeface="Calibri" panose="020F0502020204030204" pitchFamily="34" charset="0"/>
+                      </a:endParaRPr>
+                    </a:p>
+                  </a:txBody>
+                  <a:tcPr marL="9525" marR="9525" marT="9525" marB="0" anchor="b">
+                    <a:lnR w="12700" cap="flat" cmpd="sng" algn="ctr">
+                      <a:solidFill>
+                        <a:schemeClr val="accent1"/>
+                      </a:solidFill>
+                      <a:prstDash val="solid"/>
+                      <a:round/>
+                      <a:headEnd type="none" w="med" len="med"/>
+                      <a:tailEnd type="none" w="med" len="med"/>
+                    </a:lnR>
+                  </a:tcPr>
+                </a:tc>
+                <a:tc>
+                  <a:txBody>
+                    <a:bodyPr/>
+                    <a:lstStyle/>
+                    <a:p>
+                      <a:pPr algn="ctr" fontAlgn="b"/>
+                      <a:r>
+                        <a:rPr lang="en-US" sz="2400" u="none" strike="noStrike">
+                          <a:effectLst/>
+                        </a:rPr>
+                        <a:t>0.209</a:t>
+                      </a:r>
+                      <a:endParaRPr lang="en-US" sz="2400" b="0" i="0" u="none" strike="noStrike">
+                        <a:solidFill>
+                          <a:srgbClr val="000000"/>
+                        </a:solidFill>
+                        <a:effectLst/>
+                        <a:latin typeface="Calibri" panose="020F0502020204030204" pitchFamily="34" charset="0"/>
+                      </a:endParaRPr>
+                    </a:p>
+                  </a:txBody>
+                  <a:tcPr marL="9525" marR="9525" marT="9525" marB="0" anchor="b">
+                    <a:lnL w="12700" cap="flat" cmpd="sng" algn="ctr">
+                      <a:solidFill>
+                        <a:schemeClr val="accent1"/>
+                      </a:solidFill>
+                      <a:prstDash val="solid"/>
+                      <a:round/>
+                      <a:headEnd type="none" w="med" len="med"/>
+                      <a:tailEnd type="none" w="med" len="med"/>
+                    </a:lnL>
+                  </a:tcPr>
+                </a:tc>
+                <a:tc>
+                  <a:txBody>
+                    <a:bodyPr/>
+                    <a:lstStyle/>
+                    <a:p>
+                      <a:pPr algn="ctr" fontAlgn="b"/>
+                      <a:r>
+                        <a:rPr lang="en-US" sz="2400" u="none" strike="noStrike" dirty="0">
+                          <a:effectLst/>
+                        </a:rPr>
+                        <a:t>0.063</a:t>
+                      </a:r>
+                      <a:endParaRPr lang="en-US" sz="2400" b="0" i="0" u="none" strike="noStrike" dirty="0">
+                        <a:solidFill>
+                          <a:srgbClr val="000000"/>
+                        </a:solidFill>
+                        <a:effectLst/>
+                        <a:latin typeface="Calibri" panose="020F0502020204030204" pitchFamily="34" charset="0"/>
+                      </a:endParaRPr>
+                    </a:p>
+                  </a:txBody>
+                  <a:tcPr marL="9525" marR="9525" marT="9525" marB="0" anchor="b"/>
+                </a:tc>
+                <a:tc>
+                  <a:txBody>
+                    <a:bodyPr/>
+                    <a:lstStyle/>
+                    <a:p>
+                      <a:pPr algn="ctr" fontAlgn="b"/>
+                      <a:r>
+                        <a:rPr lang="en-US" sz="2400" u="none" strike="noStrike" dirty="0">
+                          <a:effectLst/>
+                        </a:rPr>
+                        <a:t>0.071</a:t>
+                      </a:r>
+                      <a:endParaRPr lang="en-US" sz="2400" b="0" i="0" u="none" strike="noStrike" dirty="0">
+                        <a:solidFill>
+                          <a:srgbClr val="000000"/>
+                        </a:solidFill>
+                        <a:effectLst/>
+                        <a:latin typeface="Calibri" panose="020F0502020204030204" pitchFamily="34" charset="0"/>
+                      </a:endParaRPr>
+                    </a:p>
+                  </a:txBody>
+                  <a:tcPr marL="9525" marR="9525" marT="9525" marB="0" anchor="b"/>
+                </a:tc>
+                <a:tc>
+                  <a:txBody>
+                    <a:bodyPr/>
+                    <a:lstStyle/>
+                    <a:p>
+                      <a:pPr algn="ctr" fontAlgn="b"/>
+                      <a:r>
+                        <a:rPr lang="en-US" sz="2400" u="none" strike="noStrike" dirty="0">
+                          <a:effectLst/>
+                        </a:rPr>
+                        <a:t>0.200</a:t>
+                      </a:r>
+                      <a:endParaRPr lang="en-US" sz="2400" b="0" i="0" u="none" strike="noStrike" dirty="0">
+                        <a:solidFill>
+                          <a:srgbClr val="000000"/>
+                        </a:solidFill>
+                        <a:effectLst/>
+                        <a:latin typeface="Calibri" panose="020F0502020204030204" pitchFamily="34" charset="0"/>
+                      </a:endParaRPr>
+                    </a:p>
+                  </a:txBody>
+                  <a:tcPr marL="9525" marR="9525" marT="9525" marB="0" anchor="b"/>
+                </a:tc>
+                <a:tc>
+                  <a:txBody>
+                    <a:bodyPr/>
+                    <a:lstStyle/>
+                    <a:p>
+                      <a:pPr algn="ctr" fontAlgn="b"/>
+                      <a:r>
+                        <a:rPr lang="en-US" sz="2400" u="none" strike="noStrike" dirty="0">
+                          <a:effectLst/>
+                        </a:rPr>
+                        <a:t>0.458</a:t>
+                      </a:r>
+                      <a:endParaRPr lang="en-US" sz="2400" b="0" i="0" u="none" strike="noStrike" dirty="0">
+                        <a:solidFill>
+                          <a:srgbClr val="000000"/>
+                        </a:solidFill>
+                        <a:effectLst/>
+                        <a:latin typeface="Calibri" panose="020F0502020204030204" pitchFamily="34" charset="0"/>
+                      </a:endParaRPr>
+                    </a:p>
+                  </a:txBody>
+                  <a:tcPr marL="9525" marR="9525" marT="9525" marB="0" anchor="b">
+                    <a:lnR w="12700" cap="flat" cmpd="sng" algn="ctr">
+                      <a:solidFill>
+                        <a:schemeClr val="accent1"/>
+                      </a:solidFill>
+                      <a:prstDash val="solid"/>
+                      <a:round/>
+                      <a:headEnd type="none" w="med" len="med"/>
+                      <a:tailEnd type="none" w="med" len="med"/>
+                    </a:lnR>
+                  </a:tcPr>
+                </a:tc>
+                <a:tc>
+                  <a:txBody>
+                    <a:bodyPr/>
+                    <a:lstStyle/>
+                    <a:p>
+                      <a:pPr algn="r" fontAlgn="b"/>
+                      <a:r>
+                        <a:rPr lang="en-US" sz="2400" u="none" strike="noStrike">
+                          <a:effectLst/>
+                        </a:rPr>
+                        <a:t>1.000</a:t>
+                      </a:r>
+                      <a:endParaRPr lang="en-US" sz="2400" b="0" i="0" u="none" strike="noStrike">
+                        <a:solidFill>
+                          <a:srgbClr val="000000"/>
+                        </a:solidFill>
+                        <a:effectLst/>
+                        <a:latin typeface="Calibri" panose="020F0502020204030204" pitchFamily="34" charset="0"/>
+                      </a:endParaRPr>
+                    </a:p>
+                  </a:txBody>
+                  <a:tcPr marL="9525" marR="9525" marT="9525" marB="0" anchor="b">
+                    <a:lnL w="12700" cap="flat" cmpd="sng" algn="ctr">
+                      <a:solidFill>
+                        <a:schemeClr val="accent1"/>
+                      </a:solidFill>
+                      <a:prstDash val="solid"/>
+                      <a:round/>
+                      <a:headEnd type="none" w="med" len="med"/>
+                      <a:tailEnd type="none" w="med" len="med"/>
+                    </a:lnL>
+                  </a:tcPr>
+                </a:tc>
+                <a:extLst>
+                  <a:ext uri="{0D108BD9-81ED-4DB2-BD59-A6C34878D82A}">
+                    <a16:rowId xmlns:a16="http://schemas.microsoft.com/office/drawing/2014/main" val="2056058032"/>
+                  </a:ext>
+                </a:extLst>
+              </a:tr>
+              <a:tr h="534247">
+                <a:tc>
+                  <a:txBody>
+                    <a:bodyPr/>
+                    <a:lstStyle/>
+                    <a:p>
+                      <a:pPr algn="l" fontAlgn="b"/>
+                      <a:r>
+                        <a:rPr lang="en-US" sz="2400" u="none" strike="noStrike" dirty="0" err="1">
+                          <a:effectLst/>
+                        </a:rPr>
+                        <a:t>Sample_Housekeeper</a:t>
+                      </a:r>
+                      <a:endParaRPr lang="en-US" sz="2400" b="0" i="0" u="none" strike="noStrike" dirty="0">
+                        <a:solidFill>
+                          <a:srgbClr val="000000"/>
+                        </a:solidFill>
+                        <a:effectLst/>
+                        <a:latin typeface="Calibri" panose="020F0502020204030204" pitchFamily="34" charset="0"/>
+                      </a:endParaRPr>
+                    </a:p>
+                  </a:txBody>
+                  <a:tcPr marL="9525" marR="9525" marT="9525" marB="0" anchor="b">
+                    <a:lnR w="12700" cap="flat" cmpd="sng" algn="ctr">
+                      <a:solidFill>
+                        <a:schemeClr val="accent1"/>
+                      </a:solidFill>
+                      <a:prstDash val="solid"/>
+                      <a:round/>
+                      <a:headEnd type="none" w="med" len="med"/>
+                      <a:tailEnd type="none" w="med" len="med"/>
+                    </a:lnR>
+                  </a:tcPr>
+                </a:tc>
+                <a:tc>
+                  <a:txBody>
+                    <a:bodyPr/>
+                    <a:lstStyle/>
+                    <a:p>
+                      <a:pPr algn="ctr" fontAlgn="b"/>
+                      <a:r>
+                        <a:rPr lang="en-US" sz="2400" u="none" strike="noStrike">
+                          <a:effectLst/>
+                        </a:rPr>
+                        <a:t>0.461</a:t>
+                      </a:r>
+                      <a:endParaRPr lang="en-US" sz="2400" b="0" i="0" u="none" strike="noStrike">
+                        <a:solidFill>
+                          <a:srgbClr val="000000"/>
+                        </a:solidFill>
+                        <a:effectLst/>
+                        <a:latin typeface="Calibri" panose="020F0502020204030204" pitchFamily="34" charset="0"/>
+                      </a:endParaRPr>
+                    </a:p>
+                  </a:txBody>
+                  <a:tcPr marL="9525" marR="9525" marT="9525" marB="0" anchor="b">
+                    <a:lnL w="12700" cap="flat" cmpd="sng" algn="ctr">
+                      <a:solidFill>
+                        <a:schemeClr val="accent1"/>
+                      </a:solidFill>
+                      <a:prstDash val="solid"/>
+                      <a:round/>
+                      <a:headEnd type="none" w="med" len="med"/>
+                      <a:tailEnd type="none" w="med" len="med"/>
+                    </a:lnL>
+                  </a:tcPr>
+                </a:tc>
+                <a:tc>
+                  <a:txBody>
+                    <a:bodyPr/>
+                    <a:lstStyle/>
+                    <a:p>
+                      <a:pPr algn="ctr" fontAlgn="b"/>
+                      <a:r>
+                        <a:rPr lang="en-US" sz="2400" u="none" strike="noStrike">
+                          <a:effectLst/>
+                        </a:rPr>
+                        <a:t>0.114</a:t>
+                      </a:r>
+                      <a:endParaRPr lang="en-US" sz="2400" b="0" i="0" u="none" strike="noStrike">
+                        <a:solidFill>
+                          <a:srgbClr val="000000"/>
+                        </a:solidFill>
+                        <a:effectLst/>
+                        <a:latin typeface="Calibri" panose="020F0502020204030204" pitchFamily="34" charset="0"/>
+                      </a:endParaRPr>
+                    </a:p>
+                  </a:txBody>
+                  <a:tcPr marL="9525" marR="9525" marT="9525" marB="0" anchor="b"/>
+                </a:tc>
+                <a:tc>
+                  <a:txBody>
+                    <a:bodyPr/>
+                    <a:lstStyle/>
+                    <a:p>
+                      <a:pPr algn="ctr" fontAlgn="b"/>
+                      <a:r>
+                        <a:rPr lang="en-US" sz="2400" u="none" strike="noStrike" dirty="0">
+                          <a:effectLst/>
+                        </a:rPr>
+                        <a:t>0.084</a:t>
+                      </a:r>
+                      <a:endParaRPr lang="en-US" sz="2400" b="0" i="0" u="none" strike="noStrike" dirty="0">
+                        <a:solidFill>
+                          <a:srgbClr val="000000"/>
+                        </a:solidFill>
+                        <a:effectLst/>
+                        <a:latin typeface="Calibri" panose="020F0502020204030204" pitchFamily="34" charset="0"/>
+                      </a:endParaRPr>
+                    </a:p>
+                  </a:txBody>
+                  <a:tcPr marL="9525" marR="9525" marT="9525" marB="0" anchor="b"/>
+                </a:tc>
+                <a:tc>
+                  <a:txBody>
+                    <a:bodyPr/>
+                    <a:lstStyle/>
+                    <a:p>
+                      <a:pPr algn="ctr" fontAlgn="b"/>
+                      <a:r>
+                        <a:rPr lang="en-US" sz="2400" u="none" strike="noStrike" dirty="0">
+                          <a:effectLst/>
+                        </a:rPr>
+                        <a:t>0.067</a:t>
+                      </a:r>
+                      <a:endParaRPr lang="en-US" sz="2400" b="0" i="0" u="none" strike="noStrike" dirty="0">
+                        <a:solidFill>
+                          <a:srgbClr val="000000"/>
+                        </a:solidFill>
+                        <a:effectLst/>
+                        <a:latin typeface="Calibri" panose="020F0502020204030204" pitchFamily="34" charset="0"/>
+                      </a:endParaRPr>
+                    </a:p>
+                  </a:txBody>
+                  <a:tcPr marL="9525" marR="9525" marT="9525" marB="0" anchor="b"/>
+                </a:tc>
+                <a:tc>
+                  <a:txBody>
+                    <a:bodyPr/>
+                    <a:lstStyle/>
+                    <a:p>
+                      <a:pPr algn="ctr" fontAlgn="b"/>
+                      <a:r>
+                        <a:rPr lang="en-US" sz="2400" u="none" strike="noStrike" dirty="0">
+                          <a:effectLst/>
+                        </a:rPr>
+                        <a:t>0.274</a:t>
+                      </a:r>
+                      <a:endParaRPr lang="en-US" sz="2400" b="0" i="0" u="none" strike="noStrike" dirty="0">
+                        <a:solidFill>
+                          <a:srgbClr val="000000"/>
+                        </a:solidFill>
+                        <a:effectLst/>
+                        <a:latin typeface="Calibri" panose="020F0502020204030204" pitchFamily="34" charset="0"/>
+                      </a:endParaRPr>
+                    </a:p>
+                  </a:txBody>
+                  <a:tcPr marL="9525" marR="9525" marT="9525" marB="0" anchor="b">
+                    <a:lnR w="12700" cap="flat" cmpd="sng" algn="ctr">
+                      <a:solidFill>
+                        <a:schemeClr val="accent1"/>
+                      </a:solidFill>
+                      <a:prstDash val="solid"/>
+                      <a:round/>
+                      <a:headEnd type="none" w="med" len="med"/>
+                      <a:tailEnd type="none" w="med" len="med"/>
+                    </a:lnR>
+                  </a:tcPr>
+                </a:tc>
+                <a:tc>
+                  <a:txBody>
+                    <a:bodyPr/>
+                    <a:lstStyle/>
+                    <a:p>
+                      <a:pPr algn="r" fontAlgn="b"/>
+                      <a:r>
+                        <a:rPr lang="en-US" sz="2400" u="none" strike="noStrike">
+                          <a:effectLst/>
+                        </a:rPr>
+                        <a:t>1.000</a:t>
+                      </a:r>
+                      <a:endParaRPr lang="en-US" sz="2400" b="0" i="0" u="none" strike="noStrike">
+                        <a:solidFill>
+                          <a:srgbClr val="000000"/>
+                        </a:solidFill>
+                        <a:effectLst/>
+                        <a:latin typeface="Calibri" panose="020F0502020204030204" pitchFamily="34" charset="0"/>
+                      </a:endParaRPr>
+                    </a:p>
+                  </a:txBody>
+                  <a:tcPr marL="9525" marR="9525" marT="9525" marB="0" anchor="b">
+                    <a:lnL w="12700" cap="flat" cmpd="sng" algn="ctr">
+                      <a:solidFill>
+                        <a:schemeClr val="accent1"/>
+                      </a:solidFill>
+                      <a:prstDash val="solid"/>
+                      <a:round/>
+                      <a:headEnd type="none" w="med" len="med"/>
+                      <a:tailEnd type="none" w="med" len="med"/>
+                    </a:lnL>
+                  </a:tcPr>
+                </a:tc>
+                <a:extLst>
+                  <a:ext uri="{0D108BD9-81ED-4DB2-BD59-A6C34878D82A}">
+                    <a16:rowId xmlns:a16="http://schemas.microsoft.com/office/drawing/2014/main" val="3962275300"/>
+                  </a:ext>
+                </a:extLst>
+              </a:tr>
+              <a:tr h="534247">
+                <a:tc>
+                  <a:txBody>
+                    <a:bodyPr/>
+                    <a:lstStyle/>
+                    <a:p>
+                      <a:pPr algn="l" fontAlgn="b"/>
+                      <a:r>
+                        <a:rPr lang="en-US" sz="2400" u="none" strike="noStrike" dirty="0" err="1">
+                          <a:effectLst/>
+                        </a:rPr>
+                        <a:t>Sample_Sales</a:t>
+                      </a:r>
+                      <a:endParaRPr lang="en-US" sz="2400" b="0" i="0" u="none" strike="noStrike" dirty="0">
+                        <a:solidFill>
+                          <a:srgbClr val="000000"/>
+                        </a:solidFill>
+                        <a:effectLst/>
+                        <a:latin typeface="Calibri" panose="020F0502020204030204" pitchFamily="34" charset="0"/>
+                      </a:endParaRPr>
+                    </a:p>
+                  </a:txBody>
+                  <a:tcPr marL="9525" marR="9525" marT="9525" marB="0" anchor="b">
+                    <a:lnR w="12700" cap="flat" cmpd="sng" algn="ctr">
+                      <a:solidFill>
+                        <a:schemeClr val="accent1"/>
+                      </a:solidFill>
+                      <a:prstDash val="solid"/>
+                      <a:round/>
+                      <a:headEnd type="none" w="med" len="med"/>
+                      <a:tailEnd type="none" w="med" len="med"/>
+                    </a:lnR>
+                  </a:tcPr>
+                </a:tc>
+                <a:tc>
+                  <a:txBody>
+                    <a:bodyPr/>
+                    <a:lstStyle/>
+                    <a:p>
+                      <a:pPr algn="ctr" fontAlgn="b"/>
+                      <a:r>
+                        <a:rPr lang="en-US" sz="2400" u="none" strike="noStrike">
+                          <a:effectLst/>
+                        </a:rPr>
+                        <a:t>0.507</a:t>
+                      </a:r>
+                      <a:endParaRPr lang="en-US" sz="2400" b="0" i="0" u="none" strike="noStrike">
+                        <a:solidFill>
+                          <a:srgbClr val="000000"/>
+                        </a:solidFill>
+                        <a:effectLst/>
+                        <a:latin typeface="Calibri" panose="020F0502020204030204" pitchFamily="34" charset="0"/>
+                      </a:endParaRPr>
+                    </a:p>
+                  </a:txBody>
+                  <a:tcPr marL="9525" marR="9525" marT="9525" marB="0" anchor="b">
+                    <a:lnL w="12700" cap="flat" cmpd="sng" algn="ctr">
+                      <a:solidFill>
+                        <a:schemeClr val="accent1"/>
+                      </a:solidFill>
+                      <a:prstDash val="solid"/>
+                      <a:round/>
+                      <a:headEnd type="none" w="med" len="med"/>
+                      <a:tailEnd type="none" w="med" len="med"/>
+                    </a:lnL>
+                  </a:tcPr>
+                </a:tc>
+                <a:tc>
+                  <a:txBody>
+                    <a:bodyPr/>
+                    <a:lstStyle/>
+                    <a:p>
+                      <a:pPr algn="ctr" fontAlgn="b"/>
+                      <a:r>
+                        <a:rPr lang="en-US" sz="2400" u="none" strike="noStrike">
+                          <a:effectLst/>
+                        </a:rPr>
+                        <a:t>0.000</a:t>
+                      </a:r>
+                      <a:endParaRPr lang="en-US" sz="2400" b="0" i="0" u="none" strike="noStrike">
+                        <a:solidFill>
+                          <a:srgbClr val="000000"/>
+                        </a:solidFill>
+                        <a:effectLst/>
+                        <a:latin typeface="Calibri" panose="020F0502020204030204" pitchFamily="34" charset="0"/>
+                      </a:endParaRPr>
+                    </a:p>
+                  </a:txBody>
+                  <a:tcPr marL="9525" marR="9525" marT="9525" marB="0" anchor="b"/>
+                </a:tc>
+                <a:tc>
+                  <a:txBody>
+                    <a:bodyPr/>
+                    <a:lstStyle/>
+                    <a:p>
+                      <a:pPr algn="ctr" fontAlgn="b"/>
+                      <a:r>
+                        <a:rPr lang="en-US" sz="2400" u="none" strike="noStrike">
+                          <a:effectLst/>
+                        </a:rPr>
+                        <a:t>0.030</a:t>
+                      </a:r>
+                      <a:endParaRPr lang="en-US" sz="2400" b="0" i="0" u="none" strike="noStrike">
+                        <a:solidFill>
+                          <a:srgbClr val="000000"/>
+                        </a:solidFill>
+                        <a:effectLst/>
+                        <a:latin typeface="Calibri" panose="020F0502020204030204" pitchFamily="34" charset="0"/>
+                      </a:endParaRPr>
+                    </a:p>
+                  </a:txBody>
+                  <a:tcPr marL="9525" marR="9525" marT="9525" marB="0" anchor="b"/>
+                </a:tc>
+                <a:tc>
+                  <a:txBody>
+                    <a:bodyPr/>
+                    <a:lstStyle/>
+                    <a:p>
+                      <a:pPr algn="ctr" fontAlgn="b"/>
+                      <a:r>
+                        <a:rPr lang="en-US" sz="2400" u="none" strike="noStrike" dirty="0">
+                          <a:effectLst/>
+                        </a:rPr>
+                        <a:t>0.026</a:t>
+                      </a:r>
+                      <a:endParaRPr lang="en-US" sz="2400" b="0" i="0" u="none" strike="noStrike" dirty="0">
+                        <a:solidFill>
+                          <a:srgbClr val="000000"/>
+                        </a:solidFill>
+                        <a:effectLst/>
+                        <a:latin typeface="Calibri" panose="020F0502020204030204" pitchFamily="34" charset="0"/>
+                      </a:endParaRPr>
+                    </a:p>
+                  </a:txBody>
+                  <a:tcPr marL="9525" marR="9525" marT="9525" marB="0" anchor="b"/>
+                </a:tc>
+                <a:tc>
+                  <a:txBody>
+                    <a:bodyPr/>
+                    <a:lstStyle/>
+                    <a:p>
+                      <a:pPr algn="ctr" fontAlgn="b"/>
+                      <a:r>
+                        <a:rPr lang="en-US" sz="2400" u="none" strike="noStrike" dirty="0">
+                          <a:effectLst/>
+                        </a:rPr>
+                        <a:t>0.437</a:t>
+                      </a:r>
+                      <a:endParaRPr lang="en-US" sz="2400" b="0" i="0" u="none" strike="noStrike" dirty="0">
+                        <a:solidFill>
+                          <a:srgbClr val="000000"/>
+                        </a:solidFill>
+                        <a:effectLst/>
+                        <a:latin typeface="Calibri" panose="020F0502020204030204" pitchFamily="34" charset="0"/>
+                      </a:endParaRPr>
+                    </a:p>
+                  </a:txBody>
+                  <a:tcPr marL="9525" marR="9525" marT="9525" marB="0" anchor="b">
+                    <a:lnR w="12700" cap="flat" cmpd="sng" algn="ctr">
+                      <a:solidFill>
+                        <a:schemeClr val="accent1"/>
+                      </a:solidFill>
+                      <a:prstDash val="solid"/>
+                      <a:round/>
+                      <a:headEnd type="none" w="med" len="med"/>
+                      <a:tailEnd type="none" w="med" len="med"/>
+                    </a:lnR>
+                  </a:tcPr>
+                </a:tc>
+                <a:tc>
+                  <a:txBody>
+                    <a:bodyPr/>
+                    <a:lstStyle/>
+                    <a:p>
+                      <a:pPr algn="r" fontAlgn="b"/>
+                      <a:r>
+                        <a:rPr lang="en-US" sz="2400" u="none" strike="noStrike" dirty="0">
+                          <a:effectLst/>
+                        </a:rPr>
+                        <a:t>1.000</a:t>
+                      </a:r>
+                      <a:endParaRPr lang="en-US" sz="2400" b="0" i="0" u="none" strike="noStrike" dirty="0">
+                        <a:solidFill>
+                          <a:srgbClr val="000000"/>
+                        </a:solidFill>
+                        <a:effectLst/>
+                        <a:latin typeface="Calibri" panose="020F0502020204030204" pitchFamily="34" charset="0"/>
+                      </a:endParaRPr>
+                    </a:p>
+                  </a:txBody>
+                  <a:tcPr marL="9525" marR="9525" marT="9525" marB="0" anchor="b">
+                    <a:lnL w="12700" cap="flat" cmpd="sng" algn="ctr">
+                      <a:solidFill>
+                        <a:schemeClr val="accent1"/>
+                      </a:solidFill>
+                      <a:prstDash val="solid"/>
+                      <a:round/>
+                      <a:headEnd type="none" w="med" len="med"/>
+                      <a:tailEnd type="none" w="med" len="med"/>
+                    </a:lnL>
+                  </a:tcPr>
+                </a:tc>
+                <a:extLst>
+                  <a:ext uri="{0D108BD9-81ED-4DB2-BD59-A6C34878D82A}">
+                    <a16:rowId xmlns:a16="http://schemas.microsoft.com/office/drawing/2014/main" val="2661826604"/>
+                  </a:ext>
+                </a:extLst>
+              </a:tr>
+            </a:tbl>
+          </a:graphicData>
+        </a:graphic>
+      </p:graphicFrame>
+      <p:sp>
+        <p:nvSpPr>
+          <p:cNvPr id="5" name="Rectangle 4">
+            <a:extLst>
+              <a:ext uri="{FF2B5EF4-FFF2-40B4-BE49-F238E27FC236}">
+                <a16:creationId xmlns:a16="http://schemas.microsoft.com/office/drawing/2014/main" id="{7BF45E85-3EAC-4ED2-ABF1-ACF130FE897C}"/>
+              </a:ext>
+            </a:extLst>
+          </p:cNvPr>
+          <p:cNvSpPr/>
+          <p:nvPr/>
         </p:nvSpPr>
-        <p:spPr/>
+        <p:spPr>
+          <a:xfrm>
+            <a:off x="838200" y="5905020"/>
+            <a:ext cx="10515600" cy="461665"/>
+          </a:xfrm>
+          <a:prstGeom prst="rect">
+            <a:avLst/>
+          </a:prstGeom>
+        </p:spPr>
         <p:txBody>
-          <a:bodyPr/>
+          <a:bodyPr wrap="square">
+            <a:spAutoFit/>
+          </a:bodyPr>
           <a:lstStyle/>
           <a:p>
-            <a:endParaRPr lang="en-US"/>
+            <a:pPr algn="ctr"/>
+            <a:r>
+              <a:rPr lang="en-US" sz="2400" dirty="0" err="1"/>
+              <a:t>resume.topics</a:t>
+            </a:r>
+            <a:r>
+              <a:rPr lang="en-US" sz="2400" dirty="0"/>
+              <a:t> &lt;- </a:t>
+            </a:r>
+            <a:r>
+              <a:rPr lang="en-US" sz="2400" dirty="0" err="1"/>
+              <a:t>topicmodels</a:t>
+            </a:r>
+            <a:r>
+              <a:rPr lang="en-US" sz="2400" dirty="0"/>
+              <a:t>::posterior(</a:t>
+            </a:r>
+            <a:r>
+              <a:rPr lang="en-US" sz="2400" dirty="0" err="1"/>
+              <a:t>jobs.lda,newdata</a:t>
+            </a:r>
+            <a:r>
+              <a:rPr lang="en-US" sz="2400" dirty="0"/>
+              <a:t> = </a:t>
+            </a:r>
+            <a:r>
+              <a:rPr lang="en-US" sz="2400" dirty="0" err="1"/>
+              <a:t>resume.dtm</a:t>
+            </a:r>
+            <a:r>
+              <a:rPr lang="en-US" sz="2400" dirty="0"/>
+              <a:t>)</a:t>
+            </a:r>
           </a:p>
         </p:txBody>
       </p:sp>
     </p:spTree>
     <p:extLst>
       <p:ext uri="{BB962C8B-B14F-4D97-AF65-F5344CB8AC3E}">
-        <p14:creationId xmlns:p14="http://schemas.microsoft.com/office/powerpoint/2010/main" val="3167346521"/>
+        <p14:creationId xmlns:p14="http://schemas.microsoft.com/office/powerpoint/2010/main" val="1689597098"/>
       </p:ext>
     </p:extLst>
   </p:cSld>
@@ -7730,7 +11014,7 @@
           <p:cNvPr id="2" name="Title 1">
             <a:extLst>
               <a:ext uri="{FF2B5EF4-FFF2-40B4-BE49-F238E27FC236}">
-                <a16:creationId xmlns:a16="http://schemas.microsoft.com/office/drawing/2014/main" id="{4C3AEDB0-7165-499A-BE92-E0CD0EDBB716}"/>
+                <a16:creationId xmlns:a16="http://schemas.microsoft.com/office/drawing/2014/main" id="{69EB7ECF-A088-47A2-9B6D-A520E90F0F1F}"/>
               </a:ext>
             </a:extLst>
           </p:cNvPr>
@@ -7746,7 +11030,10 @@
           <a:bodyPr/>
           <a:lstStyle/>
           <a:p>
-            <a:endParaRPr lang="en-US"/>
+            <a:r>
+              <a:rPr lang="en-US" dirty="0"/>
+              <a:t>Evaluation</a:t>
+            </a:r>
           </a:p>
         </p:txBody>
       </p:sp>
@@ -7755,7 +11042,7 @@
           <p:cNvPr id="3" name="Content Placeholder 2">
             <a:extLst>
               <a:ext uri="{FF2B5EF4-FFF2-40B4-BE49-F238E27FC236}">
-                <a16:creationId xmlns:a16="http://schemas.microsoft.com/office/drawing/2014/main" id="{520C38B0-A451-4248-8723-574CA9F639CF}"/>
+                <a16:creationId xmlns:a16="http://schemas.microsoft.com/office/drawing/2014/main" id="{76A4FA34-4101-4DB8-BDB1-B2BFA4449A68}"/>
               </a:ext>
             </a:extLst>
           </p:cNvPr>
@@ -7771,14 +11058,14 @@
           <a:bodyPr/>
           <a:lstStyle/>
           <a:p>
-            <a:endParaRPr lang="en-US"/>
+            <a:endParaRPr lang="en-US" dirty="0"/>
           </a:p>
         </p:txBody>
       </p:sp>
     </p:spTree>
     <p:extLst>
       <p:ext uri="{BB962C8B-B14F-4D97-AF65-F5344CB8AC3E}">
-        <p14:creationId xmlns:p14="http://schemas.microsoft.com/office/powerpoint/2010/main" val="2087181538"/>
+        <p14:creationId xmlns:p14="http://schemas.microsoft.com/office/powerpoint/2010/main" val="3407193998"/>
       </p:ext>
     </p:extLst>
   </p:cSld>
@@ -7907,6 +11194,249 @@
     <p:extLst>
       <p:ext uri="{BB962C8B-B14F-4D97-AF65-F5344CB8AC3E}">
         <p14:creationId xmlns:p14="http://schemas.microsoft.com/office/powerpoint/2010/main" val="447779202"/>
+      </p:ext>
+    </p:extLst>
+  </p:cSld>
+  <p:clrMapOvr>
+    <a:masterClrMapping/>
+  </p:clrMapOvr>
+</p:sld>
+</file>
+
+<file path=ppt/slides/slide20.xml><?xml version="1.0" encoding="utf-8"?>
+<p:sld xmlns:a="http://schemas.openxmlformats.org/drawingml/2006/main" xmlns:r="http://schemas.openxmlformats.org/officeDocument/2006/relationships" xmlns:p="http://schemas.openxmlformats.org/presentationml/2006/main">
+  <p:cSld>
+    <p:spTree>
+      <p:nvGrpSpPr>
+        <p:cNvPr id="1" name=""/>
+        <p:cNvGrpSpPr/>
+        <p:nvPr/>
+      </p:nvGrpSpPr>
+      <p:grpSpPr>
+        <a:xfrm>
+          <a:off x="0" y="0"/>
+          <a:ext cx="0" cy="0"/>
+          <a:chOff x="0" y="0"/>
+          <a:chExt cx="0" cy="0"/>
+        </a:xfrm>
+      </p:grpSpPr>
+      <p:sp>
+        <p:nvSpPr>
+          <p:cNvPr id="2" name="Title 1">
+            <a:extLst>
+              <a:ext uri="{FF2B5EF4-FFF2-40B4-BE49-F238E27FC236}">
+                <a16:creationId xmlns:a16="http://schemas.microsoft.com/office/drawing/2014/main" id="{83D2FCD0-74AF-46F9-8C29-8DF121006AFD}"/>
+              </a:ext>
+            </a:extLst>
+          </p:cNvPr>
+          <p:cNvSpPr>
+            <a:spLocks noGrp="1"/>
+          </p:cNvSpPr>
+          <p:nvPr>
+            <p:ph type="title"/>
+          </p:nvPr>
+        </p:nvSpPr>
+        <p:spPr/>
+        <p:txBody>
+          <a:bodyPr/>
+          <a:lstStyle/>
+          <a:p>
+            <a:endParaRPr lang="en-US"/>
+          </a:p>
+        </p:txBody>
+      </p:sp>
+      <p:sp>
+        <p:nvSpPr>
+          <p:cNvPr id="3" name="Content Placeholder 2">
+            <a:extLst>
+              <a:ext uri="{FF2B5EF4-FFF2-40B4-BE49-F238E27FC236}">
+                <a16:creationId xmlns:a16="http://schemas.microsoft.com/office/drawing/2014/main" id="{4C70BCF9-73F1-495A-9177-2AB26D26FF91}"/>
+              </a:ext>
+            </a:extLst>
+          </p:cNvPr>
+          <p:cNvSpPr>
+            <a:spLocks noGrp="1"/>
+          </p:cNvSpPr>
+          <p:nvPr>
+            <p:ph idx="1"/>
+          </p:nvPr>
+        </p:nvSpPr>
+        <p:spPr/>
+        <p:txBody>
+          <a:bodyPr/>
+          <a:lstStyle/>
+          <a:p>
+            <a:endParaRPr lang="en-US"/>
+          </a:p>
+        </p:txBody>
+      </p:sp>
+    </p:spTree>
+    <p:extLst>
+      <p:ext uri="{BB962C8B-B14F-4D97-AF65-F5344CB8AC3E}">
+        <p14:creationId xmlns:p14="http://schemas.microsoft.com/office/powerpoint/2010/main" val="4033900076"/>
+      </p:ext>
+    </p:extLst>
+  </p:cSld>
+  <p:clrMapOvr>
+    <a:masterClrMapping/>
+  </p:clrMapOvr>
+</p:sld>
+</file>
+
+<file path=ppt/slides/slide21.xml><?xml version="1.0" encoding="utf-8"?>
+<p:sld xmlns:a="http://schemas.openxmlformats.org/drawingml/2006/main" xmlns:r="http://schemas.openxmlformats.org/officeDocument/2006/relationships" xmlns:p="http://schemas.openxmlformats.org/presentationml/2006/main">
+  <p:cSld>
+    <p:spTree>
+      <p:nvGrpSpPr>
+        <p:cNvPr id="1" name=""/>
+        <p:cNvGrpSpPr/>
+        <p:nvPr/>
+      </p:nvGrpSpPr>
+      <p:grpSpPr>
+        <a:xfrm>
+          <a:off x="0" y="0"/>
+          <a:ext cx="0" cy="0"/>
+          <a:chOff x="0" y="0"/>
+          <a:chExt cx="0" cy="0"/>
+        </a:xfrm>
+      </p:grpSpPr>
+      <p:sp>
+        <p:nvSpPr>
+          <p:cNvPr id="2" name="Title 1">
+            <a:extLst>
+              <a:ext uri="{FF2B5EF4-FFF2-40B4-BE49-F238E27FC236}">
+                <a16:creationId xmlns:a16="http://schemas.microsoft.com/office/drawing/2014/main" id="{F20945F2-8D92-420A-815D-2D60176E6A01}"/>
+              </a:ext>
+            </a:extLst>
+          </p:cNvPr>
+          <p:cNvSpPr>
+            <a:spLocks noGrp="1"/>
+          </p:cNvSpPr>
+          <p:nvPr>
+            <p:ph type="title"/>
+          </p:nvPr>
+        </p:nvSpPr>
+        <p:spPr/>
+        <p:txBody>
+          <a:bodyPr/>
+          <a:lstStyle/>
+          <a:p>
+            <a:r>
+              <a:rPr lang="en-US" dirty="0"/>
+              <a:t>Next Steps…</a:t>
+            </a:r>
+          </a:p>
+        </p:txBody>
+      </p:sp>
+      <p:sp>
+        <p:nvSpPr>
+          <p:cNvPr id="3" name="Content Placeholder 2">
+            <a:extLst>
+              <a:ext uri="{FF2B5EF4-FFF2-40B4-BE49-F238E27FC236}">
+                <a16:creationId xmlns:a16="http://schemas.microsoft.com/office/drawing/2014/main" id="{BB5CE37B-29D2-4734-B33A-DA1505DC83B8}"/>
+              </a:ext>
+            </a:extLst>
+          </p:cNvPr>
+          <p:cNvSpPr>
+            <a:spLocks noGrp="1"/>
+          </p:cNvSpPr>
+          <p:nvPr>
+            <p:ph idx="1"/>
+          </p:nvPr>
+        </p:nvSpPr>
+        <p:spPr/>
+        <p:txBody>
+          <a:bodyPr/>
+          <a:lstStyle/>
+          <a:p>
+            <a:endParaRPr lang="en-US"/>
+          </a:p>
+        </p:txBody>
+      </p:sp>
+    </p:spTree>
+    <p:extLst>
+      <p:ext uri="{BB962C8B-B14F-4D97-AF65-F5344CB8AC3E}">
+        <p14:creationId xmlns:p14="http://schemas.microsoft.com/office/powerpoint/2010/main" val="3167346521"/>
+      </p:ext>
+    </p:extLst>
+  </p:cSld>
+  <p:clrMapOvr>
+    <a:masterClrMapping/>
+  </p:clrMapOvr>
+</p:sld>
+</file>
+
+<file path=ppt/slides/slide22.xml><?xml version="1.0" encoding="utf-8"?>
+<p:sld xmlns:a="http://schemas.openxmlformats.org/drawingml/2006/main" xmlns:r="http://schemas.openxmlformats.org/officeDocument/2006/relationships" xmlns:p="http://schemas.openxmlformats.org/presentationml/2006/main">
+  <p:cSld>
+    <p:spTree>
+      <p:nvGrpSpPr>
+        <p:cNvPr id="1" name=""/>
+        <p:cNvGrpSpPr/>
+        <p:nvPr/>
+      </p:nvGrpSpPr>
+      <p:grpSpPr>
+        <a:xfrm>
+          <a:off x="0" y="0"/>
+          <a:ext cx="0" cy="0"/>
+          <a:chOff x="0" y="0"/>
+          <a:chExt cx="0" cy="0"/>
+        </a:xfrm>
+      </p:grpSpPr>
+      <p:sp>
+        <p:nvSpPr>
+          <p:cNvPr id="2" name="Title 1">
+            <a:extLst>
+              <a:ext uri="{FF2B5EF4-FFF2-40B4-BE49-F238E27FC236}">
+                <a16:creationId xmlns:a16="http://schemas.microsoft.com/office/drawing/2014/main" id="{4C3AEDB0-7165-499A-BE92-E0CD0EDBB716}"/>
+              </a:ext>
+            </a:extLst>
+          </p:cNvPr>
+          <p:cNvSpPr>
+            <a:spLocks noGrp="1"/>
+          </p:cNvSpPr>
+          <p:nvPr>
+            <p:ph type="title"/>
+          </p:nvPr>
+        </p:nvSpPr>
+        <p:spPr/>
+        <p:txBody>
+          <a:bodyPr/>
+          <a:lstStyle/>
+          <a:p>
+            <a:endParaRPr lang="en-US"/>
+          </a:p>
+        </p:txBody>
+      </p:sp>
+      <p:sp>
+        <p:nvSpPr>
+          <p:cNvPr id="3" name="Content Placeholder 2">
+            <a:extLst>
+              <a:ext uri="{FF2B5EF4-FFF2-40B4-BE49-F238E27FC236}">
+                <a16:creationId xmlns:a16="http://schemas.microsoft.com/office/drawing/2014/main" id="{520C38B0-A451-4248-8723-574CA9F639CF}"/>
+              </a:ext>
+            </a:extLst>
+          </p:cNvPr>
+          <p:cNvSpPr>
+            <a:spLocks noGrp="1"/>
+          </p:cNvSpPr>
+          <p:nvPr>
+            <p:ph idx="1"/>
+          </p:nvPr>
+        </p:nvSpPr>
+        <p:spPr/>
+        <p:txBody>
+          <a:bodyPr/>
+          <a:lstStyle/>
+          <a:p>
+            <a:endParaRPr lang="en-US"/>
+          </a:p>
+        </p:txBody>
+      </p:sp>
+    </p:spTree>
+    <p:extLst>
+      <p:ext uri="{BB962C8B-B14F-4D97-AF65-F5344CB8AC3E}">
+        <p14:creationId xmlns:p14="http://schemas.microsoft.com/office/powerpoint/2010/main" val="2087181538"/>
       </p:ext>
     </p:extLst>
   </p:cSld>

</xml_diff>

<commit_message>
4 th LDA slide
</commit_message>
<xml_diff>
--- a/Jobs Analysis.pptx
+++ b/Jobs Analysis.pptx
@@ -21,13 +21,14 @@
     <p:sldId id="274" r:id="rId15"/>
     <p:sldId id="275" r:id="rId16"/>
     <p:sldId id="277" r:id="rId17"/>
-    <p:sldId id="278" r:id="rId18"/>
-    <p:sldId id="279" r:id="rId19"/>
+    <p:sldId id="279" r:id="rId18"/>
+    <p:sldId id="278" r:id="rId19"/>
     <p:sldId id="280" r:id="rId20"/>
-    <p:sldId id="267" r:id="rId21"/>
-    <p:sldId id="268" r:id="rId22"/>
-    <p:sldId id="269" r:id="rId23"/>
-    <p:sldId id="270" r:id="rId24"/>
+    <p:sldId id="281" r:id="rId21"/>
+    <p:sldId id="267" r:id="rId22"/>
+    <p:sldId id="268" r:id="rId23"/>
+    <p:sldId id="269" r:id="rId24"/>
+    <p:sldId id="270" r:id="rId25"/>
   </p:sldIdLst>
   <p:sldSz cx="12192000" cy="6858000"/>
   <p:notesSz cx="6858000" cy="9144000"/>
@@ -7623,1640 +7624,6 @@
           <p:cNvPr id="2" name="Title 1">
             <a:extLst>
               <a:ext uri="{FF2B5EF4-FFF2-40B4-BE49-F238E27FC236}">
-                <a16:creationId xmlns:a16="http://schemas.microsoft.com/office/drawing/2014/main" id="{E8E1B2DF-8C2C-43CD-8BD5-6DADBF613F07}"/>
-              </a:ext>
-            </a:extLst>
-          </p:cNvPr>
-          <p:cNvSpPr>
-            <a:spLocks noGrp="1"/>
-          </p:cNvSpPr>
-          <p:nvPr>
-            <p:ph type="title"/>
-          </p:nvPr>
-        </p:nvSpPr>
-        <p:spPr/>
-        <p:txBody>
-          <a:bodyPr/>
-          <a:lstStyle/>
-          <a:p>
-            <a:r>
-              <a:rPr lang="en-US" dirty="0"/>
-              <a:t>LDA Top Terms by Topic (k = 5)</a:t>
-            </a:r>
-          </a:p>
-        </p:txBody>
-      </p:sp>
-      <p:graphicFrame>
-        <p:nvGraphicFramePr>
-          <p:cNvPr id="4" name="Content Placeholder 3">
-            <a:extLst>
-              <a:ext uri="{FF2B5EF4-FFF2-40B4-BE49-F238E27FC236}">
-                <a16:creationId xmlns:a16="http://schemas.microsoft.com/office/drawing/2014/main" id="{908340B6-2CC9-4B95-B2DE-D6E6155B8EAC}"/>
-              </a:ext>
-            </a:extLst>
-          </p:cNvPr>
-          <p:cNvGraphicFramePr>
-            <a:graphicFrameLocks noGrp="1"/>
-          </p:cNvGraphicFramePr>
-          <p:nvPr>
-            <p:ph idx="1"/>
-            <p:extLst>
-              <p:ext uri="{D42A27DB-BD31-4B8C-83A1-F6EECF244321}">
-                <p14:modId xmlns:p14="http://schemas.microsoft.com/office/powerpoint/2010/main" val="462073877"/>
-              </p:ext>
-            </p:extLst>
-          </p:nvPr>
-        </p:nvGraphicFramePr>
-        <p:xfrm>
-          <a:off x="838198" y="1835020"/>
-          <a:ext cx="10515600" cy="4128135"/>
-        </p:xfrm>
-        <a:graphic>
-          <a:graphicData uri="http://schemas.openxmlformats.org/drawingml/2006/table">
-            <a:tbl>
-              <a:tblPr>
-                <a:tableStyleId>{3B4B98B0-60AC-42C2-AFA5-B58CD77FA1E5}</a:tableStyleId>
-              </a:tblPr>
-              <a:tblGrid>
-                <a:gridCol w="2103120">
-                  <a:extLst>
-                    <a:ext uri="{9D8B030D-6E8A-4147-A177-3AD203B41FA5}">
-                      <a16:colId xmlns:a16="http://schemas.microsoft.com/office/drawing/2014/main" val="3731036267"/>
-                    </a:ext>
-                  </a:extLst>
-                </a:gridCol>
-                <a:gridCol w="2103120">
-                  <a:extLst>
-                    <a:ext uri="{9D8B030D-6E8A-4147-A177-3AD203B41FA5}">
-                      <a16:colId xmlns:a16="http://schemas.microsoft.com/office/drawing/2014/main" val="2555341812"/>
-                    </a:ext>
-                  </a:extLst>
-                </a:gridCol>
-                <a:gridCol w="2103120">
-                  <a:extLst>
-                    <a:ext uri="{9D8B030D-6E8A-4147-A177-3AD203B41FA5}">
-                      <a16:colId xmlns:a16="http://schemas.microsoft.com/office/drawing/2014/main" val="1052258667"/>
-                    </a:ext>
-                  </a:extLst>
-                </a:gridCol>
-                <a:gridCol w="2103120">
-                  <a:extLst>
-                    <a:ext uri="{9D8B030D-6E8A-4147-A177-3AD203B41FA5}">
-                      <a16:colId xmlns:a16="http://schemas.microsoft.com/office/drawing/2014/main" val="2132033456"/>
-                    </a:ext>
-                  </a:extLst>
-                </a:gridCol>
-                <a:gridCol w="2103120">
-                  <a:extLst>
-                    <a:ext uri="{9D8B030D-6E8A-4147-A177-3AD203B41FA5}">
-                      <a16:colId xmlns:a16="http://schemas.microsoft.com/office/drawing/2014/main" val="1342537409"/>
-                    </a:ext>
-                  </a:extLst>
-                </a:gridCol>
-              </a:tblGrid>
-              <a:tr h="303634">
-                <a:tc>
-                  <a:txBody>
-                    <a:bodyPr/>
-                    <a:lstStyle/>
-                    <a:p>
-                      <a:pPr algn="l" fontAlgn="b"/>
-                      <a:r>
-                        <a:rPr lang="en-US" sz="2400" b="1" u="none" strike="noStrike" dirty="0">
-                          <a:effectLst/>
-                        </a:rPr>
-                        <a:t>Topic 1</a:t>
-                      </a:r>
-                      <a:endParaRPr lang="en-US" sz="2400" b="1" i="0" u="none" strike="noStrike" dirty="0">
-                        <a:solidFill>
-                          <a:srgbClr val="000000"/>
-                        </a:solidFill>
-                        <a:effectLst/>
-                        <a:latin typeface="Calibri" panose="020F0502020204030204" pitchFamily="34" charset="0"/>
-                      </a:endParaRPr>
-                    </a:p>
-                  </a:txBody>
-                  <a:tcPr marL="9525" marR="9525" marT="9525" marB="0" anchor="b">
-                    <a:lnB w="12700" cap="flat" cmpd="sng" algn="ctr">
-                      <a:solidFill>
-                        <a:schemeClr val="accent1">
-                          <a:lumMod val="60000"/>
-                          <a:lumOff val="40000"/>
-                        </a:schemeClr>
-                      </a:solidFill>
-                      <a:prstDash val="solid"/>
-                      <a:round/>
-                      <a:headEnd type="none" w="med" len="med"/>
-                      <a:tailEnd type="none" w="med" len="med"/>
-                    </a:lnB>
-                  </a:tcPr>
-                </a:tc>
-                <a:tc>
-                  <a:txBody>
-                    <a:bodyPr/>
-                    <a:lstStyle/>
-                    <a:p>
-                      <a:pPr algn="l" fontAlgn="b"/>
-                      <a:r>
-                        <a:rPr lang="en-US" sz="2400" b="1" u="none" strike="noStrike" dirty="0">
-                          <a:effectLst/>
-                        </a:rPr>
-                        <a:t>Topic 2</a:t>
-                      </a:r>
-                      <a:endParaRPr lang="en-US" sz="2400" b="1" i="0" u="none" strike="noStrike" dirty="0">
-                        <a:solidFill>
-                          <a:srgbClr val="000000"/>
-                        </a:solidFill>
-                        <a:effectLst/>
-                        <a:latin typeface="Calibri" panose="020F0502020204030204" pitchFamily="34" charset="0"/>
-                      </a:endParaRPr>
-                    </a:p>
-                  </a:txBody>
-                  <a:tcPr marL="9525" marR="9525" marT="9525" marB="0" anchor="b">
-                    <a:lnB w="12700" cap="flat" cmpd="sng" algn="ctr">
-                      <a:solidFill>
-                        <a:schemeClr val="accent1">
-                          <a:lumMod val="60000"/>
-                          <a:lumOff val="40000"/>
-                        </a:schemeClr>
-                      </a:solidFill>
-                      <a:prstDash val="solid"/>
-                      <a:round/>
-                      <a:headEnd type="none" w="med" len="med"/>
-                      <a:tailEnd type="none" w="med" len="med"/>
-                    </a:lnB>
-                  </a:tcPr>
-                </a:tc>
-                <a:tc>
-                  <a:txBody>
-                    <a:bodyPr/>
-                    <a:lstStyle/>
-                    <a:p>
-                      <a:pPr algn="l" fontAlgn="b"/>
-                      <a:r>
-                        <a:rPr lang="en-US" sz="2400" b="1" u="none" strike="noStrike" dirty="0">
-                          <a:effectLst/>
-                        </a:rPr>
-                        <a:t>Topic 3</a:t>
-                      </a:r>
-                      <a:endParaRPr lang="en-US" sz="2400" b="1" i="0" u="none" strike="noStrike" dirty="0">
-                        <a:solidFill>
-                          <a:srgbClr val="000000"/>
-                        </a:solidFill>
-                        <a:effectLst/>
-                        <a:latin typeface="Calibri" panose="020F0502020204030204" pitchFamily="34" charset="0"/>
-                      </a:endParaRPr>
-                    </a:p>
-                  </a:txBody>
-                  <a:tcPr marL="9525" marR="9525" marT="9525" marB="0" anchor="b">
-                    <a:lnB w="12700" cap="flat" cmpd="sng" algn="ctr">
-                      <a:solidFill>
-                        <a:schemeClr val="accent1">
-                          <a:lumMod val="60000"/>
-                          <a:lumOff val="40000"/>
-                        </a:schemeClr>
-                      </a:solidFill>
-                      <a:prstDash val="solid"/>
-                      <a:round/>
-                      <a:headEnd type="none" w="med" len="med"/>
-                      <a:tailEnd type="none" w="med" len="med"/>
-                    </a:lnB>
-                  </a:tcPr>
-                </a:tc>
-                <a:tc>
-                  <a:txBody>
-                    <a:bodyPr/>
-                    <a:lstStyle/>
-                    <a:p>
-                      <a:pPr algn="l" fontAlgn="b"/>
-                      <a:r>
-                        <a:rPr lang="en-US" sz="2400" b="1" u="none" strike="noStrike" dirty="0">
-                          <a:effectLst/>
-                        </a:rPr>
-                        <a:t>Topic 4</a:t>
-                      </a:r>
-                      <a:endParaRPr lang="en-US" sz="2400" b="1" i="0" u="none" strike="noStrike" dirty="0">
-                        <a:solidFill>
-                          <a:srgbClr val="000000"/>
-                        </a:solidFill>
-                        <a:effectLst/>
-                        <a:latin typeface="Calibri" panose="020F0502020204030204" pitchFamily="34" charset="0"/>
-                      </a:endParaRPr>
-                    </a:p>
-                  </a:txBody>
-                  <a:tcPr marL="9525" marR="9525" marT="9525" marB="0" anchor="b">
-                    <a:lnB w="12700" cap="flat" cmpd="sng" algn="ctr">
-                      <a:solidFill>
-                        <a:schemeClr val="accent1">
-                          <a:lumMod val="60000"/>
-                          <a:lumOff val="40000"/>
-                        </a:schemeClr>
-                      </a:solidFill>
-                      <a:prstDash val="solid"/>
-                      <a:round/>
-                      <a:headEnd type="none" w="med" len="med"/>
-                      <a:tailEnd type="none" w="med" len="med"/>
-                    </a:lnB>
-                  </a:tcPr>
-                </a:tc>
-                <a:tc>
-                  <a:txBody>
-                    <a:bodyPr/>
-                    <a:lstStyle/>
-                    <a:p>
-                      <a:pPr algn="l" fontAlgn="b"/>
-                      <a:r>
-                        <a:rPr lang="en-US" sz="2400" b="1" u="none" strike="noStrike" dirty="0">
-                          <a:effectLst/>
-                        </a:rPr>
-                        <a:t>Topic 5</a:t>
-                      </a:r>
-                      <a:endParaRPr lang="en-US" sz="2400" b="1" i="0" u="none" strike="noStrike" dirty="0">
-                        <a:solidFill>
-                          <a:srgbClr val="000000"/>
-                        </a:solidFill>
-                        <a:effectLst/>
-                        <a:latin typeface="Calibri" panose="020F0502020204030204" pitchFamily="34" charset="0"/>
-                      </a:endParaRPr>
-                    </a:p>
-                  </a:txBody>
-                  <a:tcPr marL="9525" marR="9525" marT="9525" marB="0" anchor="b">
-                    <a:lnB w="12700" cap="flat" cmpd="sng" algn="ctr">
-                      <a:solidFill>
-                        <a:schemeClr val="accent1">
-                          <a:lumMod val="60000"/>
-                          <a:lumOff val="40000"/>
-                        </a:schemeClr>
-                      </a:solidFill>
-                      <a:prstDash val="solid"/>
-                      <a:round/>
-                      <a:headEnd type="none" w="med" len="med"/>
-                      <a:tailEnd type="none" w="med" len="med"/>
-                    </a:lnB>
-                  </a:tcPr>
-                </a:tc>
-                <a:extLst>
-                  <a:ext uri="{0D108BD9-81ED-4DB2-BD59-A6C34878D82A}">
-                    <a16:rowId xmlns:a16="http://schemas.microsoft.com/office/drawing/2014/main" val="2827662962"/>
-                  </a:ext>
-                </a:extLst>
-              </a:tr>
-              <a:tr h="303634">
-                <a:tc>
-                  <a:txBody>
-                    <a:bodyPr/>
-                    <a:lstStyle/>
-                    <a:p>
-                      <a:pPr algn="l" fontAlgn="b"/>
-                      <a:r>
-                        <a:rPr lang="en-US" sz="2400" u="none" strike="noStrike" dirty="0">
-                          <a:effectLst/>
-                        </a:rPr>
-                        <a:t>business</a:t>
-                      </a:r>
-                      <a:endParaRPr lang="en-US" sz="2400" b="0" i="0" u="none" strike="noStrike" dirty="0">
-                        <a:solidFill>
-                          <a:srgbClr val="000000"/>
-                        </a:solidFill>
-                        <a:effectLst/>
-                        <a:latin typeface="Calibri" panose="020F0502020204030204" pitchFamily="34" charset="0"/>
-                      </a:endParaRPr>
-                    </a:p>
-                  </a:txBody>
-                  <a:tcPr marL="9525" marR="9525" marT="9525" marB="0" anchor="b">
-                    <a:lnT w="12700" cap="flat" cmpd="sng" algn="ctr">
-                      <a:solidFill>
-                        <a:schemeClr val="accent1">
-                          <a:lumMod val="60000"/>
-                          <a:lumOff val="40000"/>
-                        </a:schemeClr>
-                      </a:solidFill>
-                      <a:prstDash val="solid"/>
-                      <a:round/>
-                      <a:headEnd type="none" w="med" len="med"/>
-                      <a:tailEnd type="none" w="med" len="med"/>
-                    </a:lnT>
-                  </a:tcPr>
-                </a:tc>
-                <a:tc>
-                  <a:txBody>
-                    <a:bodyPr/>
-                    <a:lstStyle/>
-                    <a:p>
-                      <a:pPr algn="l" fontAlgn="b"/>
-                      <a:r>
-                        <a:rPr lang="en-US" sz="2400" u="none" strike="noStrike" dirty="0">
-                          <a:effectLst/>
-                        </a:rPr>
-                        <a:t>design</a:t>
-                      </a:r>
-                      <a:endParaRPr lang="en-US" sz="2400" b="0" i="0" u="none" strike="noStrike" dirty="0">
-                        <a:solidFill>
-                          <a:srgbClr val="000000"/>
-                        </a:solidFill>
-                        <a:effectLst/>
-                        <a:latin typeface="Calibri" panose="020F0502020204030204" pitchFamily="34" charset="0"/>
-                      </a:endParaRPr>
-                    </a:p>
-                  </a:txBody>
-                  <a:tcPr marL="9525" marR="9525" marT="9525" marB="0" anchor="b">
-                    <a:lnT w="12700" cap="flat" cmpd="sng" algn="ctr">
-                      <a:solidFill>
-                        <a:schemeClr val="accent1">
-                          <a:lumMod val="60000"/>
-                          <a:lumOff val="40000"/>
-                        </a:schemeClr>
-                      </a:solidFill>
-                      <a:prstDash val="solid"/>
-                      <a:round/>
-                      <a:headEnd type="none" w="med" len="med"/>
-                      <a:tailEnd type="none" w="med" len="med"/>
-                    </a:lnT>
-                  </a:tcPr>
-                </a:tc>
-                <a:tc>
-                  <a:txBody>
-                    <a:bodyPr/>
-                    <a:lstStyle/>
-                    <a:p>
-                      <a:pPr algn="l" fontAlgn="b"/>
-                      <a:r>
-                        <a:rPr lang="en-US" sz="2400" u="none" strike="noStrike" dirty="0">
-                          <a:effectLst/>
-                        </a:rPr>
-                        <a:t>technical</a:t>
-                      </a:r>
-                      <a:endParaRPr lang="en-US" sz="2400" b="0" i="0" u="none" strike="noStrike" dirty="0">
-                        <a:solidFill>
-                          <a:srgbClr val="000000"/>
-                        </a:solidFill>
-                        <a:effectLst/>
-                        <a:latin typeface="Calibri" panose="020F0502020204030204" pitchFamily="34" charset="0"/>
-                      </a:endParaRPr>
-                    </a:p>
-                  </a:txBody>
-                  <a:tcPr marL="9525" marR="9525" marT="9525" marB="0" anchor="b">
-                    <a:lnT w="12700" cap="flat" cmpd="sng" algn="ctr">
-                      <a:solidFill>
-                        <a:schemeClr val="accent1">
-                          <a:lumMod val="60000"/>
-                          <a:lumOff val="40000"/>
-                        </a:schemeClr>
-                      </a:solidFill>
-                      <a:prstDash val="solid"/>
-                      <a:round/>
-                      <a:headEnd type="none" w="med" len="med"/>
-                      <a:tailEnd type="none" w="med" len="med"/>
-                    </a:lnT>
-                  </a:tcPr>
-                </a:tc>
-                <a:tc>
-                  <a:txBody>
-                    <a:bodyPr/>
-                    <a:lstStyle/>
-                    <a:p>
-                      <a:pPr algn="l" fontAlgn="b"/>
-                      <a:r>
-                        <a:rPr lang="en-US" sz="2400" u="none" strike="noStrike" dirty="0">
-                          <a:effectLst/>
-                        </a:rPr>
-                        <a:t>team</a:t>
-                      </a:r>
-                      <a:endParaRPr lang="en-US" sz="2400" b="0" i="0" u="none" strike="noStrike" dirty="0">
-                        <a:solidFill>
-                          <a:srgbClr val="000000"/>
-                        </a:solidFill>
-                        <a:effectLst/>
-                        <a:latin typeface="Calibri" panose="020F0502020204030204" pitchFamily="34" charset="0"/>
-                      </a:endParaRPr>
-                    </a:p>
-                  </a:txBody>
-                  <a:tcPr marL="9525" marR="9525" marT="9525" marB="0" anchor="b">
-                    <a:lnT w="12700" cap="flat" cmpd="sng" algn="ctr">
-                      <a:solidFill>
-                        <a:schemeClr val="accent1">
-                          <a:lumMod val="60000"/>
-                          <a:lumOff val="40000"/>
-                        </a:schemeClr>
-                      </a:solidFill>
-                      <a:prstDash val="solid"/>
-                      <a:round/>
-                      <a:headEnd type="none" w="med" len="med"/>
-                      <a:tailEnd type="none" w="med" len="med"/>
-                    </a:lnT>
-                  </a:tcPr>
-                </a:tc>
-                <a:tc>
-                  <a:txBody>
-                    <a:bodyPr/>
-                    <a:lstStyle/>
-                    <a:p>
-                      <a:pPr algn="l" fontAlgn="b"/>
-                      <a:r>
-                        <a:rPr lang="en-US" sz="2400" u="none" strike="noStrike" dirty="0">
-                          <a:effectLst/>
-                        </a:rPr>
-                        <a:t>business</a:t>
-                      </a:r>
-                      <a:endParaRPr lang="en-US" sz="2400" b="0" i="0" u="none" strike="noStrike" dirty="0">
-                        <a:solidFill>
-                          <a:srgbClr val="000000"/>
-                        </a:solidFill>
-                        <a:effectLst/>
-                        <a:latin typeface="Calibri" panose="020F0502020204030204" pitchFamily="34" charset="0"/>
-                      </a:endParaRPr>
-                    </a:p>
-                  </a:txBody>
-                  <a:tcPr marL="9525" marR="9525" marT="9525" marB="0" anchor="b">
-                    <a:lnT w="12700" cap="flat" cmpd="sng" algn="ctr">
-                      <a:solidFill>
-                        <a:schemeClr val="accent1">
-                          <a:lumMod val="60000"/>
-                          <a:lumOff val="40000"/>
-                        </a:schemeClr>
-                      </a:solidFill>
-                      <a:prstDash val="solid"/>
-                      <a:round/>
-                      <a:headEnd type="none" w="med" len="med"/>
-                      <a:tailEnd type="none" w="med" len="med"/>
-                    </a:lnT>
-                  </a:tcPr>
-                </a:tc>
-                <a:extLst>
-                  <a:ext uri="{0D108BD9-81ED-4DB2-BD59-A6C34878D82A}">
-                    <a16:rowId xmlns:a16="http://schemas.microsoft.com/office/drawing/2014/main" val="2894263183"/>
-                  </a:ext>
-                </a:extLst>
-              </a:tr>
-              <a:tr h="303634">
-                <a:tc>
-                  <a:txBody>
-                    <a:bodyPr/>
-                    <a:lstStyle/>
-                    <a:p>
-                      <a:pPr algn="l" fontAlgn="b"/>
-                      <a:r>
-                        <a:rPr lang="en-US" sz="2400" u="none" strike="noStrike" dirty="0">
-                          <a:effectLst/>
-                        </a:rPr>
-                        <a:t>management</a:t>
-                      </a:r>
-                      <a:endParaRPr lang="en-US" sz="2400" b="0" i="0" u="none" strike="noStrike" dirty="0">
-                        <a:solidFill>
-                          <a:srgbClr val="000000"/>
-                        </a:solidFill>
-                        <a:effectLst/>
-                        <a:latin typeface="Calibri" panose="020F0502020204030204" pitchFamily="34" charset="0"/>
-                      </a:endParaRPr>
-                    </a:p>
-                  </a:txBody>
-                  <a:tcPr marL="9525" marR="9525" marT="9525" marB="0" anchor="b"/>
-                </a:tc>
-                <a:tc>
-                  <a:txBody>
-                    <a:bodyPr/>
-                    <a:lstStyle/>
-                    <a:p>
-                      <a:pPr algn="l" fontAlgn="b"/>
-                      <a:r>
-                        <a:rPr lang="en-US" sz="2400" u="none" strike="noStrike">
-                          <a:effectLst/>
-                        </a:rPr>
-                        <a:t>test</a:t>
-                      </a:r>
-                      <a:endParaRPr lang="en-US" sz="2400" b="0" i="0" u="none" strike="noStrike">
-                        <a:solidFill>
-                          <a:srgbClr val="000000"/>
-                        </a:solidFill>
-                        <a:effectLst/>
-                        <a:latin typeface="Calibri" panose="020F0502020204030204" pitchFamily="34" charset="0"/>
-                      </a:endParaRPr>
-                    </a:p>
-                  </a:txBody>
-                  <a:tcPr marL="9525" marR="9525" marT="9525" marB="0" anchor="b"/>
-                </a:tc>
-                <a:tc>
-                  <a:txBody>
-                    <a:bodyPr/>
-                    <a:lstStyle/>
-                    <a:p>
-                      <a:pPr algn="l" fontAlgn="b"/>
-                      <a:r>
-                        <a:rPr lang="en-US" sz="2400" u="none" strike="noStrike" dirty="0">
-                          <a:effectLst/>
-                        </a:rPr>
-                        <a:t>customers</a:t>
-                      </a:r>
-                      <a:endParaRPr lang="en-US" sz="2400" b="0" i="0" u="none" strike="noStrike" dirty="0">
-                        <a:solidFill>
-                          <a:srgbClr val="000000"/>
-                        </a:solidFill>
-                        <a:effectLst/>
-                        <a:latin typeface="Calibri" panose="020F0502020204030204" pitchFamily="34" charset="0"/>
-                      </a:endParaRPr>
-                    </a:p>
-                  </a:txBody>
-                  <a:tcPr marL="9525" marR="9525" marT="9525" marB="0" anchor="b"/>
-                </a:tc>
-                <a:tc>
-                  <a:txBody>
-                    <a:bodyPr/>
-                    <a:lstStyle/>
-                    <a:p>
-                      <a:pPr algn="l" fontAlgn="b"/>
-                      <a:r>
-                        <a:rPr lang="en-US" sz="2400" u="none" strike="noStrike" dirty="0">
-                          <a:effectLst/>
-                        </a:rPr>
-                        <a:t>software</a:t>
-                      </a:r>
-                      <a:endParaRPr lang="en-US" sz="2400" b="0" i="0" u="none" strike="noStrike" dirty="0">
-                        <a:solidFill>
-                          <a:srgbClr val="000000"/>
-                        </a:solidFill>
-                        <a:effectLst/>
-                        <a:latin typeface="Calibri" panose="020F0502020204030204" pitchFamily="34" charset="0"/>
-                      </a:endParaRPr>
-                    </a:p>
-                  </a:txBody>
-                  <a:tcPr marL="9525" marR="9525" marT="9525" marB="0" anchor="b"/>
-                </a:tc>
-                <a:tc>
-                  <a:txBody>
-                    <a:bodyPr/>
-                    <a:lstStyle/>
-                    <a:p>
-                      <a:pPr algn="l" fontAlgn="b"/>
-                      <a:r>
-                        <a:rPr lang="en-US" sz="2400" u="none" strike="noStrike" dirty="0">
-                          <a:effectLst/>
-                        </a:rPr>
-                        <a:t>security</a:t>
-                      </a:r>
-                      <a:endParaRPr lang="en-US" sz="2400" b="0" i="0" u="none" strike="noStrike" dirty="0">
-                        <a:solidFill>
-                          <a:srgbClr val="000000"/>
-                        </a:solidFill>
-                        <a:effectLst/>
-                        <a:latin typeface="Calibri" panose="020F0502020204030204" pitchFamily="34" charset="0"/>
-                      </a:endParaRPr>
-                    </a:p>
-                  </a:txBody>
-                  <a:tcPr marL="9525" marR="9525" marT="9525" marB="0" anchor="b"/>
-                </a:tc>
-                <a:extLst>
-                  <a:ext uri="{0D108BD9-81ED-4DB2-BD59-A6C34878D82A}">
-                    <a16:rowId xmlns:a16="http://schemas.microsoft.com/office/drawing/2014/main" val="2276288165"/>
-                  </a:ext>
-                </a:extLst>
-              </a:tr>
-              <a:tr h="303634">
-                <a:tc>
-                  <a:txBody>
-                    <a:bodyPr/>
-                    <a:lstStyle/>
-                    <a:p>
-                      <a:pPr algn="l" fontAlgn="b"/>
-                      <a:r>
-                        <a:rPr lang="en-US" sz="2400" u="none" strike="noStrike" dirty="0">
-                          <a:effectLst/>
-                        </a:rPr>
-                        <a:t>project</a:t>
-                      </a:r>
-                      <a:endParaRPr lang="en-US" sz="2400" b="0" i="0" u="none" strike="noStrike" dirty="0">
-                        <a:solidFill>
-                          <a:srgbClr val="000000"/>
-                        </a:solidFill>
-                        <a:effectLst/>
-                        <a:latin typeface="Calibri" panose="020F0502020204030204" pitchFamily="34" charset="0"/>
-                      </a:endParaRPr>
-                    </a:p>
-                  </a:txBody>
-                  <a:tcPr marL="9525" marR="9525" marT="9525" marB="0" anchor="b"/>
-                </a:tc>
-                <a:tc>
-                  <a:txBody>
-                    <a:bodyPr/>
-                    <a:lstStyle/>
-                    <a:p>
-                      <a:pPr algn="l" fontAlgn="b"/>
-                      <a:r>
-                        <a:rPr lang="en-US" sz="2400" u="none" strike="noStrike" dirty="0">
-                          <a:effectLst/>
-                        </a:rPr>
-                        <a:t>engineering</a:t>
-                      </a:r>
-                      <a:endParaRPr lang="en-US" sz="2400" b="0" i="0" u="none" strike="noStrike" dirty="0">
-                        <a:solidFill>
-                          <a:srgbClr val="000000"/>
-                        </a:solidFill>
-                        <a:effectLst/>
-                        <a:latin typeface="Calibri" panose="020F0502020204030204" pitchFamily="34" charset="0"/>
-                      </a:endParaRPr>
-                    </a:p>
-                  </a:txBody>
-                  <a:tcPr marL="9525" marR="9525" marT="9525" marB="0" anchor="b"/>
-                </a:tc>
-                <a:tc>
-                  <a:txBody>
-                    <a:bodyPr/>
-                    <a:lstStyle/>
-                    <a:p>
-                      <a:pPr algn="l" fontAlgn="b"/>
-                      <a:r>
-                        <a:rPr lang="en-US" sz="2400" u="none" strike="noStrike" dirty="0">
-                          <a:effectLst/>
-                        </a:rPr>
-                        <a:t>home</a:t>
-                      </a:r>
-                      <a:endParaRPr lang="en-US" sz="2400" b="0" i="0" u="none" strike="noStrike" dirty="0">
-                        <a:solidFill>
-                          <a:srgbClr val="000000"/>
-                        </a:solidFill>
-                        <a:effectLst/>
-                        <a:latin typeface="Calibri" panose="020F0502020204030204" pitchFamily="34" charset="0"/>
-                      </a:endParaRPr>
-                    </a:p>
-                  </a:txBody>
-                  <a:tcPr marL="9525" marR="9525" marT="9525" marB="0" anchor="b"/>
-                </a:tc>
-                <a:tc>
-                  <a:txBody>
-                    <a:bodyPr/>
-                    <a:lstStyle/>
-                    <a:p>
-                      <a:pPr algn="l" fontAlgn="b"/>
-                      <a:r>
-                        <a:rPr lang="en-US" sz="2400" u="none" strike="noStrike" dirty="0">
-                          <a:effectLst/>
-                        </a:rPr>
-                        <a:t>systems</a:t>
-                      </a:r>
-                      <a:endParaRPr lang="en-US" sz="2400" b="0" i="0" u="none" strike="noStrike" dirty="0">
-                        <a:solidFill>
-                          <a:srgbClr val="000000"/>
-                        </a:solidFill>
-                        <a:effectLst/>
-                        <a:latin typeface="Calibri" panose="020F0502020204030204" pitchFamily="34" charset="0"/>
-                      </a:endParaRPr>
-                    </a:p>
-                  </a:txBody>
-                  <a:tcPr marL="9525" marR="9525" marT="9525" marB="0" anchor="b"/>
-                </a:tc>
-                <a:tc>
-                  <a:txBody>
-                    <a:bodyPr/>
-                    <a:lstStyle/>
-                    <a:p>
-                      <a:pPr algn="l" fontAlgn="b"/>
-                      <a:r>
-                        <a:rPr lang="en-US" sz="2400" u="none" strike="noStrike" dirty="0">
-                          <a:effectLst/>
-                        </a:rPr>
-                        <a:t>information</a:t>
-                      </a:r>
-                      <a:endParaRPr lang="en-US" sz="2400" b="0" i="0" u="none" strike="noStrike" dirty="0">
-                        <a:solidFill>
-                          <a:srgbClr val="000000"/>
-                        </a:solidFill>
-                        <a:effectLst/>
-                        <a:latin typeface="Calibri" panose="020F0502020204030204" pitchFamily="34" charset="0"/>
-                      </a:endParaRPr>
-                    </a:p>
-                  </a:txBody>
-                  <a:tcPr marL="9525" marR="9525" marT="9525" marB="0" anchor="b"/>
-                </a:tc>
-                <a:extLst>
-                  <a:ext uri="{0D108BD9-81ED-4DB2-BD59-A6C34878D82A}">
-                    <a16:rowId xmlns:a16="http://schemas.microsoft.com/office/drawing/2014/main" val="1913292412"/>
-                  </a:ext>
-                </a:extLst>
-              </a:tr>
-              <a:tr h="303634">
-                <a:tc>
-                  <a:txBody>
-                    <a:bodyPr/>
-                    <a:lstStyle/>
-                    <a:p>
-                      <a:pPr algn="l" fontAlgn="b"/>
-                      <a:r>
-                        <a:rPr lang="en-US" sz="2400" u="none" strike="noStrike" dirty="0">
-                          <a:effectLst/>
-                        </a:rPr>
-                        <a:t>support</a:t>
-                      </a:r>
-                      <a:endParaRPr lang="en-US" sz="2400" b="0" i="0" u="none" strike="noStrike" dirty="0">
-                        <a:solidFill>
-                          <a:srgbClr val="000000"/>
-                        </a:solidFill>
-                        <a:effectLst/>
-                        <a:latin typeface="Calibri" panose="020F0502020204030204" pitchFamily="34" charset="0"/>
-                      </a:endParaRPr>
-                    </a:p>
-                  </a:txBody>
-                  <a:tcPr marL="9525" marR="9525" marT="9525" marB="0" anchor="b"/>
-                </a:tc>
-                <a:tc>
-                  <a:txBody>
-                    <a:bodyPr/>
-                    <a:lstStyle/>
-                    <a:p>
-                      <a:pPr algn="l" fontAlgn="b"/>
-                      <a:r>
-                        <a:rPr lang="en-US" sz="2400" u="none" strike="noStrike" dirty="0">
-                          <a:effectLst/>
-                        </a:rPr>
-                        <a:t>development</a:t>
-                      </a:r>
-                      <a:endParaRPr lang="en-US" sz="2400" b="0" i="0" u="none" strike="noStrike" dirty="0">
-                        <a:solidFill>
-                          <a:srgbClr val="000000"/>
-                        </a:solidFill>
-                        <a:effectLst/>
-                        <a:latin typeface="Calibri" panose="020F0502020204030204" pitchFamily="34" charset="0"/>
-                      </a:endParaRPr>
-                    </a:p>
-                  </a:txBody>
-                  <a:tcPr marL="9525" marR="9525" marT="9525" marB="0" anchor="b"/>
-                </a:tc>
-                <a:tc>
-                  <a:txBody>
-                    <a:bodyPr/>
-                    <a:lstStyle/>
-                    <a:p>
-                      <a:pPr marL="0" marR="0" lvl="0" indent="0" algn="l" defTabSz="914400" rtl="0" eaLnBrk="1" fontAlgn="auto" latinLnBrk="0" hangingPunct="1">
-                        <a:lnSpc>
-                          <a:spcPct val="100000"/>
-                        </a:lnSpc>
-                        <a:spcBef>
-                          <a:spcPts val="0"/>
-                        </a:spcBef>
-                        <a:spcAft>
-                          <a:spcPts val="0"/>
-                        </a:spcAft>
-                        <a:buClrTx/>
-                        <a:buSzTx/>
-                        <a:buFontTx/>
-                        <a:buNone/>
-                        <a:tabLst/>
-                        <a:defRPr/>
-                      </a:pPr>
-                      <a:r>
-                        <a:rPr lang="en-US" sz="2400" u="none" strike="noStrike" dirty="0">
-                          <a:effectLst/>
-                        </a:rPr>
-                        <a:t>hours</a:t>
-                      </a:r>
-                      <a:endParaRPr lang="en-US" sz="2400" b="0" i="0" u="none" strike="noStrike" dirty="0">
-                        <a:solidFill>
-                          <a:srgbClr val="000000"/>
-                        </a:solidFill>
-                        <a:effectLst/>
-                        <a:latin typeface="Calibri" panose="020F0502020204030204" pitchFamily="34" charset="0"/>
-                      </a:endParaRPr>
-                    </a:p>
-                  </a:txBody>
-                  <a:tcPr marL="9525" marR="9525" marT="9525" marB="0" anchor="b"/>
-                </a:tc>
-                <a:tc>
-                  <a:txBody>
-                    <a:bodyPr/>
-                    <a:lstStyle/>
-                    <a:p>
-                      <a:pPr algn="l" fontAlgn="b"/>
-                      <a:r>
-                        <a:rPr lang="en-US" sz="2400" u="none" strike="noStrike" dirty="0">
-                          <a:effectLst/>
-                        </a:rPr>
-                        <a:t>computer</a:t>
-                      </a:r>
-                      <a:endParaRPr lang="en-US" sz="2400" b="0" i="0" u="none" strike="noStrike" dirty="0">
-                        <a:solidFill>
-                          <a:srgbClr val="000000"/>
-                        </a:solidFill>
-                        <a:effectLst/>
-                        <a:latin typeface="Calibri" panose="020F0502020204030204" pitchFamily="34" charset="0"/>
-                      </a:endParaRPr>
-                    </a:p>
-                  </a:txBody>
-                  <a:tcPr marL="9525" marR="9525" marT="9525" marB="0" anchor="b"/>
-                </a:tc>
-                <a:tc>
-                  <a:txBody>
-                    <a:bodyPr/>
-                    <a:lstStyle/>
-                    <a:p>
-                      <a:pPr algn="l" fontAlgn="b"/>
-                      <a:r>
-                        <a:rPr lang="en-US" sz="2400" u="none" strike="noStrike" dirty="0">
-                          <a:effectLst/>
-                        </a:rPr>
-                        <a:t>analytics</a:t>
-                      </a:r>
-                      <a:endParaRPr lang="en-US" sz="2400" b="0" i="0" u="none" strike="noStrike" dirty="0">
-                        <a:solidFill>
-                          <a:srgbClr val="000000"/>
-                        </a:solidFill>
-                        <a:effectLst/>
-                        <a:latin typeface="Calibri" panose="020F0502020204030204" pitchFamily="34" charset="0"/>
-                      </a:endParaRPr>
-                    </a:p>
-                  </a:txBody>
-                  <a:tcPr marL="9525" marR="9525" marT="9525" marB="0" anchor="b"/>
-                </a:tc>
-                <a:extLst>
-                  <a:ext uri="{0D108BD9-81ED-4DB2-BD59-A6C34878D82A}">
-                    <a16:rowId xmlns:a16="http://schemas.microsoft.com/office/drawing/2014/main" val="330431423"/>
-                  </a:ext>
-                </a:extLst>
-              </a:tr>
-              <a:tr h="303634">
-                <a:tc>
-                  <a:txBody>
-                    <a:bodyPr/>
-                    <a:lstStyle/>
-                    <a:p>
-                      <a:pPr algn="l" fontAlgn="b"/>
-                      <a:r>
-                        <a:rPr lang="en-US" sz="2400" u="none" strike="noStrike" dirty="0">
-                          <a:effectLst/>
-                        </a:rPr>
-                        <a:t>team</a:t>
-                      </a:r>
-                      <a:endParaRPr lang="en-US" sz="2400" b="0" i="0" u="none" strike="noStrike" dirty="0">
-                        <a:solidFill>
-                          <a:srgbClr val="000000"/>
-                        </a:solidFill>
-                        <a:effectLst/>
-                        <a:latin typeface="Calibri" panose="020F0502020204030204" pitchFamily="34" charset="0"/>
-                      </a:endParaRPr>
-                    </a:p>
-                  </a:txBody>
-                  <a:tcPr marL="9525" marR="9525" marT="9525" marB="0" anchor="b"/>
-                </a:tc>
-                <a:tc>
-                  <a:txBody>
-                    <a:bodyPr/>
-                    <a:lstStyle/>
-                    <a:p>
-                      <a:pPr algn="l" fontAlgn="b"/>
-                      <a:r>
-                        <a:rPr lang="en-US" sz="2400" u="none" strike="noStrike" dirty="0">
-                          <a:effectLst/>
-                        </a:rPr>
-                        <a:t>team</a:t>
-                      </a:r>
-                      <a:endParaRPr lang="en-US" sz="2400" b="0" i="0" u="none" strike="noStrike" dirty="0">
-                        <a:solidFill>
-                          <a:srgbClr val="000000"/>
-                        </a:solidFill>
-                        <a:effectLst/>
-                        <a:latin typeface="Calibri" panose="020F0502020204030204" pitchFamily="34" charset="0"/>
-                      </a:endParaRPr>
-                    </a:p>
-                  </a:txBody>
-                  <a:tcPr marL="9525" marR="9525" marT="9525" marB="0" anchor="b"/>
-                </a:tc>
-                <a:tc>
-                  <a:txBody>
-                    <a:bodyPr/>
-                    <a:lstStyle/>
-                    <a:p>
-                      <a:pPr algn="l" fontAlgn="b"/>
-                      <a:r>
-                        <a:rPr lang="en-US" sz="2400" u="none" strike="noStrike" dirty="0">
-                          <a:effectLst/>
-                        </a:rPr>
-                        <a:t>ability</a:t>
-                      </a:r>
-                      <a:endParaRPr lang="en-US" sz="2400" b="0" i="0" u="none" strike="noStrike" dirty="0">
-                        <a:solidFill>
-                          <a:srgbClr val="000000"/>
-                        </a:solidFill>
-                        <a:effectLst/>
-                        <a:latin typeface="Calibri" panose="020F0502020204030204" pitchFamily="34" charset="0"/>
-                      </a:endParaRPr>
-                    </a:p>
-                  </a:txBody>
-                  <a:tcPr marL="9525" marR="9525" marT="9525" marB="0" anchor="b"/>
-                </a:tc>
-                <a:tc>
-                  <a:txBody>
-                    <a:bodyPr/>
-                    <a:lstStyle/>
-                    <a:p>
-                      <a:pPr algn="l" fontAlgn="b"/>
-                      <a:r>
-                        <a:rPr lang="en-US" sz="2400" u="none" strike="noStrike" dirty="0">
-                          <a:effectLst/>
-                        </a:rPr>
-                        <a:t>science</a:t>
-                      </a:r>
-                      <a:endParaRPr lang="en-US" sz="2400" b="0" i="0" u="none" strike="noStrike" dirty="0">
-                        <a:solidFill>
-                          <a:srgbClr val="000000"/>
-                        </a:solidFill>
-                        <a:effectLst/>
-                        <a:latin typeface="Calibri" panose="020F0502020204030204" pitchFamily="34" charset="0"/>
-                      </a:endParaRPr>
-                    </a:p>
-                  </a:txBody>
-                  <a:tcPr marL="9525" marR="9525" marT="9525" marB="0" anchor="b"/>
-                </a:tc>
-                <a:tc>
-                  <a:txBody>
-                    <a:bodyPr/>
-                    <a:lstStyle/>
-                    <a:p>
-                      <a:pPr algn="l" fontAlgn="b"/>
-                      <a:r>
-                        <a:rPr lang="en-US" sz="2400" u="none" strike="noStrike" dirty="0">
-                          <a:effectLst/>
-                        </a:rPr>
-                        <a:t>team</a:t>
-                      </a:r>
-                      <a:endParaRPr lang="en-US" sz="2400" b="0" i="0" u="none" strike="noStrike" dirty="0">
-                        <a:solidFill>
-                          <a:srgbClr val="000000"/>
-                        </a:solidFill>
-                        <a:effectLst/>
-                        <a:latin typeface="Calibri" panose="020F0502020204030204" pitchFamily="34" charset="0"/>
-                      </a:endParaRPr>
-                    </a:p>
-                  </a:txBody>
-                  <a:tcPr marL="9525" marR="9525" marT="9525" marB="0" anchor="b"/>
-                </a:tc>
-                <a:extLst>
-                  <a:ext uri="{0D108BD9-81ED-4DB2-BD59-A6C34878D82A}">
-                    <a16:rowId xmlns:a16="http://schemas.microsoft.com/office/drawing/2014/main" val="2121785788"/>
-                  </a:ext>
-                </a:extLst>
-              </a:tr>
-              <a:tr h="303634">
-                <a:tc>
-                  <a:txBody>
-                    <a:bodyPr/>
-                    <a:lstStyle/>
-                    <a:p>
-                      <a:pPr algn="l" fontAlgn="b"/>
-                      <a:r>
-                        <a:rPr lang="en-US" sz="2400" u="none" strike="noStrike" dirty="0">
-                          <a:effectLst/>
-                        </a:rPr>
-                        <a:t>process</a:t>
-                      </a:r>
-                      <a:endParaRPr lang="en-US" sz="2400" b="0" i="0" u="none" strike="noStrike" dirty="0">
-                        <a:solidFill>
-                          <a:srgbClr val="000000"/>
-                        </a:solidFill>
-                        <a:effectLst/>
-                        <a:latin typeface="Calibri" panose="020F0502020204030204" pitchFamily="34" charset="0"/>
-                      </a:endParaRPr>
-                    </a:p>
-                  </a:txBody>
-                  <a:tcPr marL="9525" marR="9525" marT="9525" marB="0" anchor="b"/>
-                </a:tc>
-                <a:tc>
-                  <a:txBody>
-                    <a:bodyPr/>
-                    <a:lstStyle/>
-                    <a:p>
-                      <a:pPr algn="l" fontAlgn="b"/>
-                      <a:r>
-                        <a:rPr lang="en-US" sz="2400" u="none" strike="noStrike" dirty="0">
-                          <a:effectLst/>
-                        </a:rPr>
-                        <a:t>product</a:t>
-                      </a:r>
-                      <a:endParaRPr lang="en-US" sz="2400" b="0" i="0" u="none" strike="noStrike" dirty="0">
-                        <a:solidFill>
-                          <a:srgbClr val="000000"/>
-                        </a:solidFill>
-                        <a:effectLst/>
-                        <a:latin typeface="Calibri" panose="020F0502020204030204" pitchFamily="34" charset="0"/>
-                      </a:endParaRPr>
-                    </a:p>
-                  </a:txBody>
-                  <a:tcPr marL="9525" marR="9525" marT="9525" marB="0" anchor="b"/>
-                </a:tc>
-                <a:tc>
-                  <a:txBody>
-                    <a:bodyPr/>
-                    <a:lstStyle/>
-                    <a:p>
-                      <a:pPr algn="l" fontAlgn="b"/>
-                      <a:r>
-                        <a:rPr lang="en-US" sz="2400" u="none" strike="noStrike" dirty="0">
-                          <a:effectLst/>
-                        </a:rPr>
-                        <a:t>well</a:t>
-                      </a:r>
-                      <a:endParaRPr lang="en-US" sz="2400" b="0" i="0" u="none" strike="noStrike" dirty="0">
-                        <a:solidFill>
-                          <a:srgbClr val="000000"/>
-                        </a:solidFill>
-                        <a:effectLst/>
-                        <a:latin typeface="Calibri" panose="020F0502020204030204" pitchFamily="34" charset="0"/>
-                      </a:endParaRPr>
-                    </a:p>
-                  </a:txBody>
-                  <a:tcPr marL="9525" marR="9525" marT="9525" marB="0" anchor="b"/>
-                </a:tc>
-                <a:tc>
-                  <a:txBody>
-                    <a:bodyPr/>
-                    <a:lstStyle/>
-                    <a:p>
-                      <a:pPr algn="l" fontAlgn="b"/>
-                      <a:r>
-                        <a:rPr lang="en-US" sz="2400" u="none" strike="noStrike" dirty="0">
-                          <a:effectLst/>
-                        </a:rPr>
-                        <a:t>engineering</a:t>
-                      </a:r>
-                      <a:endParaRPr lang="en-US" sz="2400" b="0" i="0" u="none" strike="noStrike" dirty="0">
-                        <a:solidFill>
-                          <a:srgbClr val="000000"/>
-                        </a:solidFill>
-                        <a:effectLst/>
-                        <a:latin typeface="Calibri" panose="020F0502020204030204" pitchFamily="34" charset="0"/>
-                      </a:endParaRPr>
-                    </a:p>
-                  </a:txBody>
-                  <a:tcPr marL="9525" marR="9525" marT="9525" marB="0" anchor="b"/>
-                </a:tc>
-                <a:tc>
-                  <a:txBody>
-                    <a:bodyPr/>
-                    <a:lstStyle/>
-                    <a:p>
-                      <a:pPr algn="l" fontAlgn="b"/>
-                      <a:r>
-                        <a:rPr lang="en-US" sz="2400" u="none" strike="noStrike" dirty="0">
-                          <a:effectLst/>
-                        </a:rPr>
-                        <a:t>solutions</a:t>
-                      </a:r>
-                      <a:endParaRPr lang="en-US" sz="2400" b="0" i="0" u="none" strike="noStrike" dirty="0">
-                        <a:solidFill>
-                          <a:srgbClr val="000000"/>
-                        </a:solidFill>
-                        <a:effectLst/>
-                        <a:latin typeface="Calibri" panose="020F0502020204030204" pitchFamily="34" charset="0"/>
-                      </a:endParaRPr>
-                    </a:p>
-                  </a:txBody>
-                  <a:tcPr marL="9525" marR="9525" marT="9525" marB="0" anchor="b"/>
-                </a:tc>
-                <a:extLst>
-                  <a:ext uri="{0D108BD9-81ED-4DB2-BD59-A6C34878D82A}">
-                    <a16:rowId xmlns:a16="http://schemas.microsoft.com/office/drawing/2014/main" val="946385162"/>
-                  </a:ext>
-                </a:extLst>
-              </a:tr>
-              <a:tr h="303634">
-                <a:tc>
-                  <a:txBody>
-                    <a:bodyPr/>
-                    <a:lstStyle/>
-                    <a:p>
-                      <a:pPr algn="l" fontAlgn="b"/>
-                      <a:r>
-                        <a:rPr lang="en-US" sz="2400" u="none" strike="noStrike" dirty="0">
-                          <a:effectLst/>
-                        </a:rPr>
-                        <a:t>operations</a:t>
-                      </a:r>
-                      <a:endParaRPr lang="en-US" sz="2400" b="0" i="0" u="none" strike="noStrike" dirty="0">
-                        <a:solidFill>
-                          <a:srgbClr val="000000"/>
-                        </a:solidFill>
-                        <a:effectLst/>
-                        <a:latin typeface="Calibri" panose="020F0502020204030204" pitchFamily="34" charset="0"/>
-                      </a:endParaRPr>
-                    </a:p>
-                  </a:txBody>
-                  <a:tcPr marL="9525" marR="9525" marT="9525" marB="0" anchor="b"/>
-                </a:tc>
-                <a:tc>
-                  <a:txBody>
-                    <a:bodyPr/>
-                    <a:lstStyle/>
-                    <a:p>
-                      <a:pPr algn="l" fontAlgn="b"/>
-                      <a:r>
-                        <a:rPr lang="en-US" sz="2400" u="none" strike="noStrike" dirty="0">
-                          <a:effectLst/>
-                        </a:rPr>
-                        <a:t>system</a:t>
-                      </a:r>
-                      <a:endParaRPr lang="en-US" sz="2400" b="0" i="0" u="none" strike="noStrike" dirty="0">
-                        <a:solidFill>
-                          <a:srgbClr val="000000"/>
-                        </a:solidFill>
-                        <a:effectLst/>
-                        <a:latin typeface="Calibri" panose="020F0502020204030204" pitchFamily="34" charset="0"/>
-                      </a:endParaRPr>
-                    </a:p>
-                  </a:txBody>
-                  <a:tcPr marL="9525" marR="9525" marT="9525" marB="0" anchor="b"/>
-                </a:tc>
-                <a:tc>
-                  <a:txBody>
-                    <a:bodyPr/>
-                    <a:lstStyle/>
-                    <a:p>
-                      <a:pPr algn="l" fontAlgn="b"/>
-                      <a:r>
-                        <a:rPr lang="en-US" sz="2400" u="none" strike="noStrike" dirty="0">
-                          <a:effectLst/>
-                        </a:rPr>
-                        <a:t>training</a:t>
-                      </a:r>
-                      <a:endParaRPr lang="en-US" sz="2400" b="0" i="0" u="none" strike="noStrike" dirty="0">
-                        <a:solidFill>
-                          <a:srgbClr val="000000"/>
-                        </a:solidFill>
-                        <a:effectLst/>
-                        <a:latin typeface="Calibri" panose="020F0502020204030204" pitchFamily="34" charset="0"/>
-                      </a:endParaRPr>
-                    </a:p>
-                  </a:txBody>
-                  <a:tcPr marL="9525" marR="9525" marT="9525" marB="0" anchor="b"/>
-                </a:tc>
-                <a:tc>
-                  <a:txBody>
-                    <a:bodyPr/>
-                    <a:lstStyle/>
-                    <a:p>
-                      <a:pPr algn="l" fontAlgn="b"/>
-                      <a:r>
-                        <a:rPr lang="en-US" sz="2400" u="none" strike="noStrike" dirty="0">
-                          <a:effectLst/>
-                        </a:rPr>
-                        <a:t>services</a:t>
-                      </a:r>
-                      <a:endParaRPr lang="en-US" sz="2400" b="0" i="0" u="none" strike="noStrike" dirty="0">
-                        <a:solidFill>
-                          <a:srgbClr val="000000"/>
-                        </a:solidFill>
-                        <a:effectLst/>
-                        <a:latin typeface="Calibri" panose="020F0502020204030204" pitchFamily="34" charset="0"/>
-                      </a:endParaRPr>
-                    </a:p>
-                  </a:txBody>
-                  <a:tcPr marL="9525" marR="9525" marT="9525" marB="0" anchor="b"/>
-                </a:tc>
-                <a:tc>
-                  <a:txBody>
-                    <a:bodyPr/>
-                    <a:lstStyle/>
-                    <a:p>
-                      <a:pPr algn="l" fontAlgn="b"/>
-                      <a:r>
-                        <a:rPr lang="en-US" sz="2400" u="none" strike="noStrike" dirty="0">
-                          <a:effectLst/>
-                        </a:rPr>
-                        <a:t>services</a:t>
-                      </a:r>
-                      <a:endParaRPr lang="en-US" sz="2400" b="0" i="0" u="none" strike="noStrike" dirty="0">
-                        <a:solidFill>
-                          <a:srgbClr val="000000"/>
-                        </a:solidFill>
-                        <a:effectLst/>
-                        <a:latin typeface="Calibri" panose="020F0502020204030204" pitchFamily="34" charset="0"/>
-                      </a:endParaRPr>
-                    </a:p>
-                  </a:txBody>
-                  <a:tcPr marL="9525" marR="9525" marT="9525" marB="0" anchor="b"/>
-                </a:tc>
-                <a:extLst>
-                  <a:ext uri="{0D108BD9-81ED-4DB2-BD59-A6C34878D82A}">
-                    <a16:rowId xmlns:a16="http://schemas.microsoft.com/office/drawing/2014/main" val="2540218499"/>
-                  </a:ext>
-                </a:extLst>
-              </a:tr>
-              <a:tr h="303634">
-                <a:tc>
-                  <a:txBody>
-                    <a:bodyPr/>
-                    <a:lstStyle/>
-                    <a:p>
-                      <a:pPr algn="l" fontAlgn="b"/>
-                      <a:r>
-                        <a:rPr lang="en-US" sz="2400" u="none" strike="noStrike" dirty="0">
-                          <a:effectLst/>
-                        </a:rPr>
-                        <a:t>ability</a:t>
-                      </a:r>
-                      <a:endParaRPr lang="en-US" sz="2400" b="0" i="0" u="none" strike="noStrike" dirty="0">
-                        <a:solidFill>
-                          <a:srgbClr val="000000"/>
-                        </a:solidFill>
-                        <a:effectLst/>
-                        <a:latin typeface="Calibri" panose="020F0502020204030204" pitchFamily="34" charset="0"/>
-                      </a:endParaRPr>
-                    </a:p>
-                  </a:txBody>
-                  <a:tcPr marL="9525" marR="9525" marT="9525" marB="0" anchor="b"/>
-                </a:tc>
-                <a:tc>
-                  <a:txBody>
-                    <a:bodyPr/>
-                    <a:lstStyle/>
-                    <a:p>
-                      <a:pPr algn="l" fontAlgn="b"/>
-                      <a:r>
-                        <a:rPr lang="en-US" sz="2400" u="none" strike="noStrike" dirty="0">
-                          <a:effectLst/>
-                        </a:rPr>
-                        <a:t>quality</a:t>
-                      </a:r>
-                      <a:endParaRPr lang="en-US" sz="2400" b="0" i="0" u="none" strike="noStrike" dirty="0">
-                        <a:solidFill>
-                          <a:srgbClr val="000000"/>
-                        </a:solidFill>
-                        <a:effectLst/>
-                        <a:latin typeface="Calibri" panose="020F0502020204030204" pitchFamily="34" charset="0"/>
-                      </a:endParaRPr>
-                    </a:p>
-                  </a:txBody>
-                  <a:tcPr marL="9525" marR="9525" marT="9525" marB="0" anchor="b"/>
-                </a:tc>
-                <a:tc>
-                  <a:txBody>
-                    <a:bodyPr/>
-                    <a:lstStyle/>
-                    <a:p>
-                      <a:pPr algn="l" fontAlgn="b"/>
-                      <a:r>
-                        <a:rPr lang="en-US" sz="2400" u="none" strike="noStrike" dirty="0">
-                          <a:effectLst/>
-                        </a:rPr>
-                        <a:t>advisor</a:t>
-                      </a:r>
-                      <a:endParaRPr lang="en-US" sz="2400" b="0" i="0" u="none" strike="noStrike" dirty="0">
-                        <a:solidFill>
-                          <a:srgbClr val="000000"/>
-                        </a:solidFill>
-                        <a:effectLst/>
-                        <a:latin typeface="Calibri" panose="020F0502020204030204" pitchFamily="34" charset="0"/>
-                      </a:endParaRPr>
-                    </a:p>
-                  </a:txBody>
-                  <a:tcPr marL="9525" marR="9525" marT="9525" marB="0" anchor="b"/>
-                </a:tc>
-                <a:tc>
-                  <a:txBody>
-                    <a:bodyPr/>
-                    <a:lstStyle/>
-                    <a:p>
-                      <a:pPr algn="l" fontAlgn="b"/>
-                      <a:r>
-                        <a:rPr lang="en-US" sz="2400" u="none" strike="noStrike" dirty="0">
-                          <a:effectLst/>
-                        </a:rPr>
-                        <a:t>design</a:t>
-                      </a:r>
-                      <a:endParaRPr lang="en-US" sz="2400" b="0" i="0" u="none" strike="noStrike" dirty="0">
-                        <a:solidFill>
-                          <a:srgbClr val="000000"/>
-                        </a:solidFill>
-                        <a:effectLst/>
-                        <a:latin typeface="Calibri" panose="020F0502020204030204" pitchFamily="34" charset="0"/>
-                      </a:endParaRPr>
-                    </a:p>
-                  </a:txBody>
-                  <a:tcPr marL="9525" marR="9525" marT="9525" marB="0" anchor="b"/>
-                </a:tc>
-                <a:tc>
-                  <a:txBody>
-                    <a:bodyPr/>
-                    <a:lstStyle/>
-                    <a:p>
-                      <a:pPr algn="l" fontAlgn="b"/>
-                      <a:r>
-                        <a:rPr lang="en-US" sz="2400" u="none" strike="noStrike" dirty="0">
-                          <a:effectLst/>
-                        </a:rPr>
-                        <a:t>product</a:t>
-                      </a:r>
-                      <a:endParaRPr lang="en-US" sz="2400" b="0" i="0" u="none" strike="noStrike" dirty="0">
-                        <a:solidFill>
-                          <a:srgbClr val="000000"/>
-                        </a:solidFill>
-                        <a:effectLst/>
-                        <a:latin typeface="Calibri" panose="020F0502020204030204" pitchFamily="34" charset="0"/>
-                      </a:endParaRPr>
-                    </a:p>
-                  </a:txBody>
-                  <a:tcPr marL="9525" marR="9525" marT="9525" marB="0" anchor="b"/>
-                </a:tc>
-                <a:extLst>
-                  <a:ext uri="{0D108BD9-81ED-4DB2-BD59-A6C34878D82A}">
-                    <a16:rowId xmlns:a16="http://schemas.microsoft.com/office/drawing/2014/main" val="3238101484"/>
-                  </a:ext>
-                </a:extLst>
-              </a:tr>
-              <a:tr h="303634">
-                <a:tc>
-                  <a:txBody>
-                    <a:bodyPr/>
-                    <a:lstStyle/>
-                    <a:p>
-                      <a:pPr algn="l" fontAlgn="b"/>
-                      <a:r>
-                        <a:rPr lang="en-US" sz="2400" u="none" strike="noStrike" dirty="0">
-                          <a:effectLst/>
-                        </a:rPr>
-                        <a:t>manage</a:t>
-                      </a:r>
-                      <a:endParaRPr lang="en-US" sz="2400" b="0" i="0" u="none" strike="noStrike" dirty="0">
-                        <a:solidFill>
-                          <a:srgbClr val="000000"/>
-                        </a:solidFill>
-                        <a:effectLst/>
-                        <a:latin typeface="Calibri" panose="020F0502020204030204" pitchFamily="34" charset="0"/>
-                      </a:endParaRPr>
-                    </a:p>
-                  </a:txBody>
-                  <a:tcPr marL="9525" marR="9525" marT="9525" marB="0" anchor="b"/>
-                </a:tc>
-                <a:tc>
-                  <a:txBody>
-                    <a:bodyPr/>
-                    <a:lstStyle/>
-                    <a:p>
-                      <a:pPr algn="l" fontAlgn="b"/>
-                      <a:r>
-                        <a:rPr lang="en-US" sz="2400" u="none" strike="noStrike" dirty="0">
-                          <a:effectLst/>
-                        </a:rPr>
-                        <a:t>new</a:t>
-                      </a:r>
-                      <a:endParaRPr lang="en-US" sz="2400" b="0" i="0" u="none" strike="noStrike" dirty="0">
-                        <a:solidFill>
-                          <a:srgbClr val="000000"/>
-                        </a:solidFill>
-                        <a:effectLst/>
-                        <a:latin typeface="Calibri" panose="020F0502020204030204" pitchFamily="34" charset="0"/>
-                      </a:endParaRPr>
-                    </a:p>
-                  </a:txBody>
-                  <a:tcPr marL="9525" marR="9525" marT="9525" marB="0" anchor="b"/>
-                </a:tc>
-                <a:tc>
-                  <a:txBody>
-                    <a:bodyPr/>
-                    <a:lstStyle/>
-                    <a:p>
-                      <a:pPr algn="l" fontAlgn="b"/>
-                      <a:r>
-                        <a:rPr lang="en-US" sz="2400" u="none" strike="noStrike" dirty="0">
-                          <a:effectLst/>
-                        </a:rPr>
-                        <a:t>world</a:t>
-                      </a:r>
-                      <a:endParaRPr lang="en-US" sz="2400" b="0" i="0" u="none" strike="noStrike" dirty="0">
-                        <a:solidFill>
-                          <a:srgbClr val="000000"/>
-                        </a:solidFill>
-                        <a:effectLst/>
-                        <a:latin typeface="Calibri" panose="020F0502020204030204" pitchFamily="34" charset="0"/>
-                      </a:endParaRPr>
-                    </a:p>
-                  </a:txBody>
-                  <a:tcPr marL="9525" marR="9525" marT="9525" marB="0" anchor="b"/>
-                </a:tc>
-                <a:tc>
-                  <a:txBody>
-                    <a:bodyPr/>
-                    <a:lstStyle/>
-                    <a:p>
-                      <a:pPr algn="l" fontAlgn="b"/>
-                      <a:r>
-                        <a:rPr lang="en-US" sz="2400" u="none" strike="noStrike" dirty="0">
-                          <a:effectLst/>
-                        </a:rPr>
-                        <a:t>products</a:t>
-                      </a:r>
-                      <a:endParaRPr lang="en-US" sz="2400" b="0" i="0" u="none" strike="noStrike" dirty="0">
-                        <a:solidFill>
-                          <a:srgbClr val="000000"/>
-                        </a:solidFill>
-                        <a:effectLst/>
-                        <a:latin typeface="Calibri" panose="020F0502020204030204" pitchFamily="34" charset="0"/>
-                      </a:endParaRPr>
-                    </a:p>
-                  </a:txBody>
-                  <a:tcPr marL="9525" marR="9525" marT="9525" marB="0" anchor="b"/>
-                </a:tc>
-                <a:tc>
-                  <a:txBody>
-                    <a:bodyPr/>
-                    <a:lstStyle/>
-                    <a:p>
-                      <a:pPr algn="l" fontAlgn="b"/>
-                      <a:r>
-                        <a:rPr lang="en-US" sz="2400" u="none" strike="noStrike" dirty="0">
-                          <a:effectLst/>
-                        </a:rPr>
-                        <a:t>analysis</a:t>
-                      </a:r>
-                      <a:endParaRPr lang="en-US" sz="2400" b="0" i="0" u="none" strike="noStrike" dirty="0">
-                        <a:solidFill>
-                          <a:srgbClr val="000000"/>
-                        </a:solidFill>
-                        <a:effectLst/>
-                        <a:latin typeface="Calibri" panose="020F0502020204030204" pitchFamily="34" charset="0"/>
-                      </a:endParaRPr>
-                    </a:p>
-                  </a:txBody>
-                  <a:tcPr marL="9525" marR="9525" marT="9525" marB="0" anchor="b"/>
-                </a:tc>
-                <a:extLst>
-                  <a:ext uri="{0D108BD9-81ED-4DB2-BD59-A6C34878D82A}">
-                    <a16:rowId xmlns:a16="http://schemas.microsoft.com/office/drawing/2014/main" val="3424389576"/>
-                  </a:ext>
-                </a:extLst>
-              </a:tr>
-              <a:tr h="303634">
-                <a:tc>
-                  <a:txBody>
-                    <a:bodyPr/>
-                    <a:lstStyle/>
-                    <a:p>
-                      <a:pPr algn="l" fontAlgn="b"/>
-                      <a:r>
-                        <a:rPr lang="en-US" sz="2400" u="none" strike="noStrike" dirty="0">
-                          <a:effectLst/>
-                        </a:rPr>
-                        <a:t>skills</a:t>
-                      </a:r>
-                      <a:endParaRPr lang="en-US" sz="2400" b="0" i="0" u="none" strike="noStrike" dirty="0">
-                        <a:solidFill>
-                          <a:srgbClr val="000000"/>
-                        </a:solidFill>
-                        <a:effectLst/>
-                        <a:latin typeface="Calibri" panose="020F0502020204030204" pitchFamily="34" charset="0"/>
-                      </a:endParaRPr>
-                    </a:p>
-                  </a:txBody>
-                  <a:tcPr marL="9525" marR="9525" marT="9525" marB="0" anchor="b"/>
-                </a:tc>
-                <a:tc>
-                  <a:txBody>
-                    <a:bodyPr/>
-                    <a:lstStyle/>
-                    <a:p>
-                      <a:pPr algn="l" fontAlgn="b"/>
-                      <a:r>
-                        <a:rPr lang="en-US" sz="2400" u="none" strike="noStrike" dirty="0">
-                          <a:effectLst/>
-                        </a:rPr>
-                        <a:t>develop</a:t>
-                      </a:r>
-                      <a:endParaRPr lang="en-US" sz="2400" b="0" i="0" u="none" strike="noStrike" dirty="0">
-                        <a:solidFill>
-                          <a:srgbClr val="000000"/>
-                        </a:solidFill>
-                        <a:effectLst/>
-                        <a:latin typeface="Calibri" panose="020F0502020204030204" pitchFamily="34" charset="0"/>
-                      </a:endParaRPr>
-                    </a:p>
-                  </a:txBody>
-                  <a:tcPr marL="9525" marR="9525" marT="9525" marB="0" anchor="b"/>
-                </a:tc>
-                <a:tc>
-                  <a:txBody>
-                    <a:bodyPr/>
-                    <a:lstStyle/>
-                    <a:p>
-                      <a:pPr marL="0" marR="0" lvl="0" indent="0" algn="l" defTabSz="914400" rtl="0" eaLnBrk="1" fontAlgn="b" latinLnBrk="0" hangingPunct="1">
-                        <a:lnSpc>
-                          <a:spcPct val="100000"/>
-                        </a:lnSpc>
-                        <a:spcBef>
-                          <a:spcPts val="0"/>
-                        </a:spcBef>
-                        <a:spcAft>
-                          <a:spcPts val="0"/>
-                        </a:spcAft>
-                        <a:buClrTx/>
-                        <a:buSzTx/>
-                        <a:buFontTx/>
-                        <a:buNone/>
-                        <a:tabLst/>
-                        <a:defRPr/>
-                      </a:pPr>
-                      <a:r>
-                        <a:rPr lang="en-US" sz="2400" u="none" strike="noStrike" dirty="0">
-                          <a:effectLst/>
-                        </a:rPr>
-                        <a:t>support</a:t>
-                      </a:r>
-                      <a:endParaRPr lang="en-US" sz="2400" b="0" i="0" u="none" strike="noStrike" dirty="0">
-                        <a:solidFill>
-                          <a:srgbClr val="000000"/>
-                        </a:solidFill>
-                        <a:effectLst/>
-                        <a:latin typeface="Calibri" panose="020F0502020204030204" pitchFamily="34" charset="0"/>
-                      </a:endParaRPr>
-                    </a:p>
-                  </a:txBody>
-                  <a:tcPr marL="9525" marR="9525" marT="9525" marB="0" anchor="b"/>
-                </a:tc>
-                <a:tc>
-                  <a:txBody>
-                    <a:bodyPr/>
-                    <a:lstStyle/>
-                    <a:p>
-                      <a:pPr algn="l" fontAlgn="b"/>
-                      <a:r>
-                        <a:rPr lang="en-US" sz="2400" u="none" strike="noStrike" dirty="0">
-                          <a:effectLst/>
-                        </a:rPr>
-                        <a:t>new</a:t>
-                      </a:r>
-                      <a:endParaRPr lang="en-US" sz="2400" b="0" i="0" u="none" strike="noStrike" dirty="0">
-                        <a:solidFill>
-                          <a:srgbClr val="000000"/>
-                        </a:solidFill>
-                        <a:effectLst/>
-                        <a:latin typeface="Calibri" panose="020F0502020204030204" pitchFamily="34" charset="0"/>
-                      </a:endParaRPr>
-                    </a:p>
-                  </a:txBody>
-                  <a:tcPr marL="9525" marR="9525" marT="9525" marB="0" anchor="b"/>
-                </a:tc>
-                <a:tc>
-                  <a:txBody>
-                    <a:bodyPr/>
-                    <a:lstStyle/>
-                    <a:p>
-                      <a:pPr algn="l" fontAlgn="b"/>
-                      <a:r>
-                        <a:rPr lang="en-US" sz="2400" u="none" strike="noStrike" dirty="0">
-                          <a:effectLst/>
-                        </a:rPr>
-                        <a:t>technical</a:t>
-                      </a:r>
-                      <a:endParaRPr lang="en-US" sz="2400" b="0" i="0" u="none" strike="noStrike" dirty="0">
-                        <a:solidFill>
-                          <a:srgbClr val="000000"/>
-                        </a:solidFill>
-                        <a:effectLst/>
-                        <a:latin typeface="Calibri" panose="020F0502020204030204" pitchFamily="34" charset="0"/>
-                      </a:endParaRPr>
-                    </a:p>
-                  </a:txBody>
-                  <a:tcPr marL="9525" marR="9525" marT="9525" marB="0" anchor="b"/>
-                </a:tc>
-                <a:extLst>
-                  <a:ext uri="{0D108BD9-81ED-4DB2-BD59-A6C34878D82A}">
-                    <a16:rowId xmlns:a16="http://schemas.microsoft.com/office/drawing/2014/main" val="3544599095"/>
-                  </a:ext>
-                </a:extLst>
-              </a:tr>
-            </a:tbl>
-          </a:graphicData>
-        </a:graphic>
-      </p:graphicFrame>
-    </p:spTree>
-    <p:extLst>
-      <p:ext uri="{BB962C8B-B14F-4D97-AF65-F5344CB8AC3E}">
-        <p14:creationId xmlns:p14="http://schemas.microsoft.com/office/powerpoint/2010/main" val="508303959"/>
-      </p:ext>
-    </p:extLst>
-  </p:cSld>
-  <p:clrMapOvr>
-    <a:masterClrMapping/>
-  </p:clrMapOvr>
-</p:sld>
-</file>
-
-<file path=ppt/slides/slide18.xml><?xml version="1.0" encoding="utf-8"?>
-<p:sld xmlns:a="http://schemas.openxmlformats.org/drawingml/2006/main" xmlns:r="http://schemas.openxmlformats.org/officeDocument/2006/relationships" xmlns:p="http://schemas.openxmlformats.org/presentationml/2006/main">
-  <p:cSld>
-    <p:spTree>
-      <p:nvGrpSpPr>
-        <p:cNvPr id="1" name=""/>
-        <p:cNvGrpSpPr/>
-        <p:nvPr/>
-      </p:nvGrpSpPr>
-      <p:grpSpPr>
-        <a:xfrm>
-          <a:off x="0" y="0"/>
-          <a:ext cx="0" cy="0"/>
-          <a:chOff x="0" y="0"/>
-          <a:chExt cx="0" cy="0"/>
-        </a:xfrm>
-      </p:grpSpPr>
-      <p:sp>
-        <p:nvSpPr>
-          <p:cNvPr id="2" name="Title 1">
-            <a:extLst>
-              <a:ext uri="{FF2B5EF4-FFF2-40B4-BE49-F238E27FC236}">
                 <a16:creationId xmlns:a16="http://schemas.microsoft.com/office/drawing/2014/main" id="{B8D8FF8A-96C9-49D8-BA5C-977B947079A0}"/>
               </a:ext>
             </a:extLst>
@@ -10993,6 +9360,1640 @@
 </p:sld>
 </file>
 
+<file path=ppt/slides/slide18.xml><?xml version="1.0" encoding="utf-8"?>
+<p:sld xmlns:a="http://schemas.openxmlformats.org/drawingml/2006/main" xmlns:r="http://schemas.openxmlformats.org/officeDocument/2006/relationships" xmlns:p="http://schemas.openxmlformats.org/presentationml/2006/main">
+  <p:cSld>
+    <p:spTree>
+      <p:nvGrpSpPr>
+        <p:cNvPr id="1" name=""/>
+        <p:cNvGrpSpPr/>
+        <p:nvPr/>
+      </p:nvGrpSpPr>
+      <p:grpSpPr>
+        <a:xfrm>
+          <a:off x="0" y="0"/>
+          <a:ext cx="0" cy="0"/>
+          <a:chOff x="0" y="0"/>
+          <a:chExt cx="0" cy="0"/>
+        </a:xfrm>
+      </p:grpSpPr>
+      <p:sp>
+        <p:nvSpPr>
+          <p:cNvPr id="2" name="Title 1">
+            <a:extLst>
+              <a:ext uri="{FF2B5EF4-FFF2-40B4-BE49-F238E27FC236}">
+                <a16:creationId xmlns:a16="http://schemas.microsoft.com/office/drawing/2014/main" id="{E8E1B2DF-8C2C-43CD-8BD5-6DADBF613F07}"/>
+              </a:ext>
+            </a:extLst>
+          </p:cNvPr>
+          <p:cNvSpPr>
+            <a:spLocks noGrp="1"/>
+          </p:cNvSpPr>
+          <p:nvPr>
+            <p:ph type="title"/>
+          </p:nvPr>
+        </p:nvSpPr>
+        <p:spPr/>
+        <p:txBody>
+          <a:bodyPr/>
+          <a:lstStyle/>
+          <a:p>
+            <a:r>
+              <a:rPr lang="en-US" dirty="0"/>
+              <a:t>LDA Top Terms by Topic (k = 5)</a:t>
+            </a:r>
+          </a:p>
+        </p:txBody>
+      </p:sp>
+      <p:graphicFrame>
+        <p:nvGraphicFramePr>
+          <p:cNvPr id="4" name="Content Placeholder 3">
+            <a:extLst>
+              <a:ext uri="{FF2B5EF4-FFF2-40B4-BE49-F238E27FC236}">
+                <a16:creationId xmlns:a16="http://schemas.microsoft.com/office/drawing/2014/main" id="{908340B6-2CC9-4B95-B2DE-D6E6155B8EAC}"/>
+              </a:ext>
+            </a:extLst>
+          </p:cNvPr>
+          <p:cNvGraphicFramePr>
+            <a:graphicFrameLocks noGrp="1"/>
+          </p:cNvGraphicFramePr>
+          <p:nvPr>
+            <p:ph idx="1"/>
+            <p:extLst>
+              <p:ext uri="{D42A27DB-BD31-4B8C-83A1-F6EECF244321}">
+                <p14:modId xmlns:p14="http://schemas.microsoft.com/office/powerpoint/2010/main" val="462073877"/>
+              </p:ext>
+            </p:extLst>
+          </p:nvPr>
+        </p:nvGraphicFramePr>
+        <p:xfrm>
+          <a:off x="838198" y="1835020"/>
+          <a:ext cx="10515600" cy="4128135"/>
+        </p:xfrm>
+        <a:graphic>
+          <a:graphicData uri="http://schemas.openxmlformats.org/drawingml/2006/table">
+            <a:tbl>
+              <a:tblPr>
+                <a:tableStyleId>{3B4B98B0-60AC-42C2-AFA5-B58CD77FA1E5}</a:tableStyleId>
+              </a:tblPr>
+              <a:tblGrid>
+                <a:gridCol w="2103120">
+                  <a:extLst>
+                    <a:ext uri="{9D8B030D-6E8A-4147-A177-3AD203B41FA5}">
+                      <a16:colId xmlns:a16="http://schemas.microsoft.com/office/drawing/2014/main" val="3731036267"/>
+                    </a:ext>
+                  </a:extLst>
+                </a:gridCol>
+                <a:gridCol w="2103120">
+                  <a:extLst>
+                    <a:ext uri="{9D8B030D-6E8A-4147-A177-3AD203B41FA5}">
+                      <a16:colId xmlns:a16="http://schemas.microsoft.com/office/drawing/2014/main" val="2555341812"/>
+                    </a:ext>
+                  </a:extLst>
+                </a:gridCol>
+                <a:gridCol w="2103120">
+                  <a:extLst>
+                    <a:ext uri="{9D8B030D-6E8A-4147-A177-3AD203B41FA5}">
+                      <a16:colId xmlns:a16="http://schemas.microsoft.com/office/drawing/2014/main" val="1052258667"/>
+                    </a:ext>
+                  </a:extLst>
+                </a:gridCol>
+                <a:gridCol w="2103120">
+                  <a:extLst>
+                    <a:ext uri="{9D8B030D-6E8A-4147-A177-3AD203B41FA5}">
+                      <a16:colId xmlns:a16="http://schemas.microsoft.com/office/drawing/2014/main" val="2132033456"/>
+                    </a:ext>
+                  </a:extLst>
+                </a:gridCol>
+                <a:gridCol w="2103120">
+                  <a:extLst>
+                    <a:ext uri="{9D8B030D-6E8A-4147-A177-3AD203B41FA5}">
+                      <a16:colId xmlns:a16="http://schemas.microsoft.com/office/drawing/2014/main" val="1342537409"/>
+                    </a:ext>
+                  </a:extLst>
+                </a:gridCol>
+              </a:tblGrid>
+              <a:tr h="303634">
+                <a:tc>
+                  <a:txBody>
+                    <a:bodyPr/>
+                    <a:lstStyle/>
+                    <a:p>
+                      <a:pPr algn="l" fontAlgn="b"/>
+                      <a:r>
+                        <a:rPr lang="en-US" sz="2400" b="1" u="none" strike="noStrike" dirty="0">
+                          <a:effectLst/>
+                        </a:rPr>
+                        <a:t>Topic 1</a:t>
+                      </a:r>
+                      <a:endParaRPr lang="en-US" sz="2400" b="1" i="0" u="none" strike="noStrike" dirty="0">
+                        <a:solidFill>
+                          <a:srgbClr val="000000"/>
+                        </a:solidFill>
+                        <a:effectLst/>
+                        <a:latin typeface="Calibri" panose="020F0502020204030204" pitchFamily="34" charset="0"/>
+                      </a:endParaRPr>
+                    </a:p>
+                  </a:txBody>
+                  <a:tcPr marL="9525" marR="9525" marT="9525" marB="0" anchor="b">
+                    <a:lnB w="12700" cap="flat" cmpd="sng" algn="ctr">
+                      <a:solidFill>
+                        <a:schemeClr val="accent1">
+                          <a:lumMod val="60000"/>
+                          <a:lumOff val="40000"/>
+                        </a:schemeClr>
+                      </a:solidFill>
+                      <a:prstDash val="solid"/>
+                      <a:round/>
+                      <a:headEnd type="none" w="med" len="med"/>
+                      <a:tailEnd type="none" w="med" len="med"/>
+                    </a:lnB>
+                  </a:tcPr>
+                </a:tc>
+                <a:tc>
+                  <a:txBody>
+                    <a:bodyPr/>
+                    <a:lstStyle/>
+                    <a:p>
+                      <a:pPr algn="l" fontAlgn="b"/>
+                      <a:r>
+                        <a:rPr lang="en-US" sz="2400" b="1" u="none" strike="noStrike" dirty="0">
+                          <a:effectLst/>
+                        </a:rPr>
+                        <a:t>Topic 2</a:t>
+                      </a:r>
+                      <a:endParaRPr lang="en-US" sz="2400" b="1" i="0" u="none" strike="noStrike" dirty="0">
+                        <a:solidFill>
+                          <a:srgbClr val="000000"/>
+                        </a:solidFill>
+                        <a:effectLst/>
+                        <a:latin typeface="Calibri" panose="020F0502020204030204" pitchFamily="34" charset="0"/>
+                      </a:endParaRPr>
+                    </a:p>
+                  </a:txBody>
+                  <a:tcPr marL="9525" marR="9525" marT="9525" marB="0" anchor="b">
+                    <a:lnB w="12700" cap="flat" cmpd="sng" algn="ctr">
+                      <a:solidFill>
+                        <a:schemeClr val="accent1">
+                          <a:lumMod val="60000"/>
+                          <a:lumOff val="40000"/>
+                        </a:schemeClr>
+                      </a:solidFill>
+                      <a:prstDash val="solid"/>
+                      <a:round/>
+                      <a:headEnd type="none" w="med" len="med"/>
+                      <a:tailEnd type="none" w="med" len="med"/>
+                    </a:lnB>
+                  </a:tcPr>
+                </a:tc>
+                <a:tc>
+                  <a:txBody>
+                    <a:bodyPr/>
+                    <a:lstStyle/>
+                    <a:p>
+                      <a:pPr algn="l" fontAlgn="b"/>
+                      <a:r>
+                        <a:rPr lang="en-US" sz="2400" b="1" u="none" strike="noStrike" dirty="0">
+                          <a:effectLst/>
+                        </a:rPr>
+                        <a:t>Topic 3</a:t>
+                      </a:r>
+                      <a:endParaRPr lang="en-US" sz="2400" b="1" i="0" u="none" strike="noStrike" dirty="0">
+                        <a:solidFill>
+                          <a:srgbClr val="000000"/>
+                        </a:solidFill>
+                        <a:effectLst/>
+                        <a:latin typeface="Calibri" panose="020F0502020204030204" pitchFamily="34" charset="0"/>
+                      </a:endParaRPr>
+                    </a:p>
+                  </a:txBody>
+                  <a:tcPr marL="9525" marR="9525" marT="9525" marB="0" anchor="b">
+                    <a:lnB w="12700" cap="flat" cmpd="sng" algn="ctr">
+                      <a:solidFill>
+                        <a:schemeClr val="accent1">
+                          <a:lumMod val="60000"/>
+                          <a:lumOff val="40000"/>
+                        </a:schemeClr>
+                      </a:solidFill>
+                      <a:prstDash val="solid"/>
+                      <a:round/>
+                      <a:headEnd type="none" w="med" len="med"/>
+                      <a:tailEnd type="none" w="med" len="med"/>
+                    </a:lnB>
+                  </a:tcPr>
+                </a:tc>
+                <a:tc>
+                  <a:txBody>
+                    <a:bodyPr/>
+                    <a:lstStyle/>
+                    <a:p>
+                      <a:pPr algn="l" fontAlgn="b"/>
+                      <a:r>
+                        <a:rPr lang="en-US" sz="2400" b="1" u="none" strike="noStrike" dirty="0">
+                          <a:effectLst/>
+                        </a:rPr>
+                        <a:t>Topic 4</a:t>
+                      </a:r>
+                      <a:endParaRPr lang="en-US" sz="2400" b="1" i="0" u="none" strike="noStrike" dirty="0">
+                        <a:solidFill>
+                          <a:srgbClr val="000000"/>
+                        </a:solidFill>
+                        <a:effectLst/>
+                        <a:latin typeface="Calibri" panose="020F0502020204030204" pitchFamily="34" charset="0"/>
+                      </a:endParaRPr>
+                    </a:p>
+                  </a:txBody>
+                  <a:tcPr marL="9525" marR="9525" marT="9525" marB="0" anchor="b">
+                    <a:lnB w="12700" cap="flat" cmpd="sng" algn="ctr">
+                      <a:solidFill>
+                        <a:schemeClr val="accent1">
+                          <a:lumMod val="60000"/>
+                          <a:lumOff val="40000"/>
+                        </a:schemeClr>
+                      </a:solidFill>
+                      <a:prstDash val="solid"/>
+                      <a:round/>
+                      <a:headEnd type="none" w="med" len="med"/>
+                      <a:tailEnd type="none" w="med" len="med"/>
+                    </a:lnB>
+                  </a:tcPr>
+                </a:tc>
+                <a:tc>
+                  <a:txBody>
+                    <a:bodyPr/>
+                    <a:lstStyle/>
+                    <a:p>
+                      <a:pPr algn="l" fontAlgn="b"/>
+                      <a:r>
+                        <a:rPr lang="en-US" sz="2400" b="1" u="none" strike="noStrike" dirty="0">
+                          <a:effectLst/>
+                        </a:rPr>
+                        <a:t>Topic 5</a:t>
+                      </a:r>
+                      <a:endParaRPr lang="en-US" sz="2400" b="1" i="0" u="none" strike="noStrike" dirty="0">
+                        <a:solidFill>
+                          <a:srgbClr val="000000"/>
+                        </a:solidFill>
+                        <a:effectLst/>
+                        <a:latin typeface="Calibri" panose="020F0502020204030204" pitchFamily="34" charset="0"/>
+                      </a:endParaRPr>
+                    </a:p>
+                  </a:txBody>
+                  <a:tcPr marL="9525" marR="9525" marT="9525" marB="0" anchor="b">
+                    <a:lnB w="12700" cap="flat" cmpd="sng" algn="ctr">
+                      <a:solidFill>
+                        <a:schemeClr val="accent1">
+                          <a:lumMod val="60000"/>
+                          <a:lumOff val="40000"/>
+                        </a:schemeClr>
+                      </a:solidFill>
+                      <a:prstDash val="solid"/>
+                      <a:round/>
+                      <a:headEnd type="none" w="med" len="med"/>
+                      <a:tailEnd type="none" w="med" len="med"/>
+                    </a:lnB>
+                  </a:tcPr>
+                </a:tc>
+                <a:extLst>
+                  <a:ext uri="{0D108BD9-81ED-4DB2-BD59-A6C34878D82A}">
+                    <a16:rowId xmlns:a16="http://schemas.microsoft.com/office/drawing/2014/main" val="2827662962"/>
+                  </a:ext>
+                </a:extLst>
+              </a:tr>
+              <a:tr h="303634">
+                <a:tc>
+                  <a:txBody>
+                    <a:bodyPr/>
+                    <a:lstStyle/>
+                    <a:p>
+                      <a:pPr algn="l" fontAlgn="b"/>
+                      <a:r>
+                        <a:rPr lang="en-US" sz="2400" u="none" strike="noStrike" dirty="0">
+                          <a:effectLst/>
+                        </a:rPr>
+                        <a:t>business</a:t>
+                      </a:r>
+                      <a:endParaRPr lang="en-US" sz="2400" b="0" i="0" u="none" strike="noStrike" dirty="0">
+                        <a:solidFill>
+                          <a:srgbClr val="000000"/>
+                        </a:solidFill>
+                        <a:effectLst/>
+                        <a:latin typeface="Calibri" panose="020F0502020204030204" pitchFamily="34" charset="0"/>
+                      </a:endParaRPr>
+                    </a:p>
+                  </a:txBody>
+                  <a:tcPr marL="9525" marR="9525" marT="9525" marB="0" anchor="b">
+                    <a:lnT w="12700" cap="flat" cmpd="sng" algn="ctr">
+                      <a:solidFill>
+                        <a:schemeClr val="accent1">
+                          <a:lumMod val="60000"/>
+                          <a:lumOff val="40000"/>
+                        </a:schemeClr>
+                      </a:solidFill>
+                      <a:prstDash val="solid"/>
+                      <a:round/>
+                      <a:headEnd type="none" w="med" len="med"/>
+                      <a:tailEnd type="none" w="med" len="med"/>
+                    </a:lnT>
+                  </a:tcPr>
+                </a:tc>
+                <a:tc>
+                  <a:txBody>
+                    <a:bodyPr/>
+                    <a:lstStyle/>
+                    <a:p>
+                      <a:pPr algn="l" fontAlgn="b"/>
+                      <a:r>
+                        <a:rPr lang="en-US" sz="2400" u="none" strike="noStrike" dirty="0">
+                          <a:effectLst/>
+                        </a:rPr>
+                        <a:t>design</a:t>
+                      </a:r>
+                      <a:endParaRPr lang="en-US" sz="2400" b="0" i="0" u="none" strike="noStrike" dirty="0">
+                        <a:solidFill>
+                          <a:srgbClr val="000000"/>
+                        </a:solidFill>
+                        <a:effectLst/>
+                        <a:latin typeface="Calibri" panose="020F0502020204030204" pitchFamily="34" charset="0"/>
+                      </a:endParaRPr>
+                    </a:p>
+                  </a:txBody>
+                  <a:tcPr marL="9525" marR="9525" marT="9525" marB="0" anchor="b">
+                    <a:lnT w="12700" cap="flat" cmpd="sng" algn="ctr">
+                      <a:solidFill>
+                        <a:schemeClr val="accent1">
+                          <a:lumMod val="60000"/>
+                          <a:lumOff val="40000"/>
+                        </a:schemeClr>
+                      </a:solidFill>
+                      <a:prstDash val="solid"/>
+                      <a:round/>
+                      <a:headEnd type="none" w="med" len="med"/>
+                      <a:tailEnd type="none" w="med" len="med"/>
+                    </a:lnT>
+                  </a:tcPr>
+                </a:tc>
+                <a:tc>
+                  <a:txBody>
+                    <a:bodyPr/>
+                    <a:lstStyle/>
+                    <a:p>
+                      <a:pPr algn="l" fontAlgn="b"/>
+                      <a:r>
+                        <a:rPr lang="en-US" sz="2400" u="none" strike="noStrike" dirty="0">
+                          <a:effectLst/>
+                        </a:rPr>
+                        <a:t>technical</a:t>
+                      </a:r>
+                      <a:endParaRPr lang="en-US" sz="2400" b="0" i="0" u="none" strike="noStrike" dirty="0">
+                        <a:solidFill>
+                          <a:srgbClr val="000000"/>
+                        </a:solidFill>
+                        <a:effectLst/>
+                        <a:latin typeface="Calibri" panose="020F0502020204030204" pitchFamily="34" charset="0"/>
+                      </a:endParaRPr>
+                    </a:p>
+                  </a:txBody>
+                  <a:tcPr marL="9525" marR="9525" marT="9525" marB="0" anchor="b">
+                    <a:lnT w="12700" cap="flat" cmpd="sng" algn="ctr">
+                      <a:solidFill>
+                        <a:schemeClr val="accent1">
+                          <a:lumMod val="60000"/>
+                          <a:lumOff val="40000"/>
+                        </a:schemeClr>
+                      </a:solidFill>
+                      <a:prstDash val="solid"/>
+                      <a:round/>
+                      <a:headEnd type="none" w="med" len="med"/>
+                      <a:tailEnd type="none" w="med" len="med"/>
+                    </a:lnT>
+                  </a:tcPr>
+                </a:tc>
+                <a:tc>
+                  <a:txBody>
+                    <a:bodyPr/>
+                    <a:lstStyle/>
+                    <a:p>
+                      <a:pPr algn="l" fontAlgn="b"/>
+                      <a:r>
+                        <a:rPr lang="en-US" sz="2400" u="none" strike="noStrike" dirty="0">
+                          <a:effectLst/>
+                        </a:rPr>
+                        <a:t>team</a:t>
+                      </a:r>
+                      <a:endParaRPr lang="en-US" sz="2400" b="0" i="0" u="none" strike="noStrike" dirty="0">
+                        <a:solidFill>
+                          <a:srgbClr val="000000"/>
+                        </a:solidFill>
+                        <a:effectLst/>
+                        <a:latin typeface="Calibri" panose="020F0502020204030204" pitchFamily="34" charset="0"/>
+                      </a:endParaRPr>
+                    </a:p>
+                  </a:txBody>
+                  <a:tcPr marL="9525" marR="9525" marT="9525" marB="0" anchor="b">
+                    <a:lnT w="12700" cap="flat" cmpd="sng" algn="ctr">
+                      <a:solidFill>
+                        <a:schemeClr val="accent1">
+                          <a:lumMod val="60000"/>
+                          <a:lumOff val="40000"/>
+                        </a:schemeClr>
+                      </a:solidFill>
+                      <a:prstDash val="solid"/>
+                      <a:round/>
+                      <a:headEnd type="none" w="med" len="med"/>
+                      <a:tailEnd type="none" w="med" len="med"/>
+                    </a:lnT>
+                  </a:tcPr>
+                </a:tc>
+                <a:tc>
+                  <a:txBody>
+                    <a:bodyPr/>
+                    <a:lstStyle/>
+                    <a:p>
+                      <a:pPr algn="l" fontAlgn="b"/>
+                      <a:r>
+                        <a:rPr lang="en-US" sz="2400" u="none" strike="noStrike" dirty="0">
+                          <a:effectLst/>
+                        </a:rPr>
+                        <a:t>business</a:t>
+                      </a:r>
+                      <a:endParaRPr lang="en-US" sz="2400" b="0" i="0" u="none" strike="noStrike" dirty="0">
+                        <a:solidFill>
+                          <a:srgbClr val="000000"/>
+                        </a:solidFill>
+                        <a:effectLst/>
+                        <a:latin typeface="Calibri" panose="020F0502020204030204" pitchFamily="34" charset="0"/>
+                      </a:endParaRPr>
+                    </a:p>
+                  </a:txBody>
+                  <a:tcPr marL="9525" marR="9525" marT="9525" marB="0" anchor="b">
+                    <a:lnT w="12700" cap="flat" cmpd="sng" algn="ctr">
+                      <a:solidFill>
+                        <a:schemeClr val="accent1">
+                          <a:lumMod val="60000"/>
+                          <a:lumOff val="40000"/>
+                        </a:schemeClr>
+                      </a:solidFill>
+                      <a:prstDash val="solid"/>
+                      <a:round/>
+                      <a:headEnd type="none" w="med" len="med"/>
+                      <a:tailEnd type="none" w="med" len="med"/>
+                    </a:lnT>
+                  </a:tcPr>
+                </a:tc>
+                <a:extLst>
+                  <a:ext uri="{0D108BD9-81ED-4DB2-BD59-A6C34878D82A}">
+                    <a16:rowId xmlns:a16="http://schemas.microsoft.com/office/drawing/2014/main" val="2894263183"/>
+                  </a:ext>
+                </a:extLst>
+              </a:tr>
+              <a:tr h="303634">
+                <a:tc>
+                  <a:txBody>
+                    <a:bodyPr/>
+                    <a:lstStyle/>
+                    <a:p>
+                      <a:pPr algn="l" fontAlgn="b"/>
+                      <a:r>
+                        <a:rPr lang="en-US" sz="2400" u="none" strike="noStrike" dirty="0">
+                          <a:effectLst/>
+                        </a:rPr>
+                        <a:t>management</a:t>
+                      </a:r>
+                      <a:endParaRPr lang="en-US" sz="2400" b="0" i="0" u="none" strike="noStrike" dirty="0">
+                        <a:solidFill>
+                          <a:srgbClr val="000000"/>
+                        </a:solidFill>
+                        <a:effectLst/>
+                        <a:latin typeface="Calibri" panose="020F0502020204030204" pitchFamily="34" charset="0"/>
+                      </a:endParaRPr>
+                    </a:p>
+                  </a:txBody>
+                  <a:tcPr marL="9525" marR="9525" marT="9525" marB="0" anchor="b"/>
+                </a:tc>
+                <a:tc>
+                  <a:txBody>
+                    <a:bodyPr/>
+                    <a:lstStyle/>
+                    <a:p>
+                      <a:pPr algn="l" fontAlgn="b"/>
+                      <a:r>
+                        <a:rPr lang="en-US" sz="2400" u="none" strike="noStrike">
+                          <a:effectLst/>
+                        </a:rPr>
+                        <a:t>test</a:t>
+                      </a:r>
+                      <a:endParaRPr lang="en-US" sz="2400" b="0" i="0" u="none" strike="noStrike">
+                        <a:solidFill>
+                          <a:srgbClr val="000000"/>
+                        </a:solidFill>
+                        <a:effectLst/>
+                        <a:latin typeface="Calibri" panose="020F0502020204030204" pitchFamily="34" charset="0"/>
+                      </a:endParaRPr>
+                    </a:p>
+                  </a:txBody>
+                  <a:tcPr marL="9525" marR="9525" marT="9525" marB="0" anchor="b"/>
+                </a:tc>
+                <a:tc>
+                  <a:txBody>
+                    <a:bodyPr/>
+                    <a:lstStyle/>
+                    <a:p>
+                      <a:pPr algn="l" fontAlgn="b"/>
+                      <a:r>
+                        <a:rPr lang="en-US" sz="2400" u="none" strike="noStrike" dirty="0">
+                          <a:effectLst/>
+                        </a:rPr>
+                        <a:t>customers</a:t>
+                      </a:r>
+                      <a:endParaRPr lang="en-US" sz="2400" b="0" i="0" u="none" strike="noStrike" dirty="0">
+                        <a:solidFill>
+                          <a:srgbClr val="000000"/>
+                        </a:solidFill>
+                        <a:effectLst/>
+                        <a:latin typeface="Calibri" panose="020F0502020204030204" pitchFamily="34" charset="0"/>
+                      </a:endParaRPr>
+                    </a:p>
+                  </a:txBody>
+                  <a:tcPr marL="9525" marR="9525" marT="9525" marB="0" anchor="b"/>
+                </a:tc>
+                <a:tc>
+                  <a:txBody>
+                    <a:bodyPr/>
+                    <a:lstStyle/>
+                    <a:p>
+                      <a:pPr algn="l" fontAlgn="b"/>
+                      <a:r>
+                        <a:rPr lang="en-US" sz="2400" u="none" strike="noStrike" dirty="0">
+                          <a:effectLst/>
+                        </a:rPr>
+                        <a:t>software</a:t>
+                      </a:r>
+                      <a:endParaRPr lang="en-US" sz="2400" b="0" i="0" u="none" strike="noStrike" dirty="0">
+                        <a:solidFill>
+                          <a:srgbClr val="000000"/>
+                        </a:solidFill>
+                        <a:effectLst/>
+                        <a:latin typeface="Calibri" panose="020F0502020204030204" pitchFamily="34" charset="0"/>
+                      </a:endParaRPr>
+                    </a:p>
+                  </a:txBody>
+                  <a:tcPr marL="9525" marR="9525" marT="9525" marB="0" anchor="b"/>
+                </a:tc>
+                <a:tc>
+                  <a:txBody>
+                    <a:bodyPr/>
+                    <a:lstStyle/>
+                    <a:p>
+                      <a:pPr algn="l" fontAlgn="b"/>
+                      <a:r>
+                        <a:rPr lang="en-US" sz="2400" u="none" strike="noStrike" dirty="0">
+                          <a:effectLst/>
+                        </a:rPr>
+                        <a:t>security</a:t>
+                      </a:r>
+                      <a:endParaRPr lang="en-US" sz="2400" b="0" i="0" u="none" strike="noStrike" dirty="0">
+                        <a:solidFill>
+                          <a:srgbClr val="000000"/>
+                        </a:solidFill>
+                        <a:effectLst/>
+                        <a:latin typeface="Calibri" panose="020F0502020204030204" pitchFamily="34" charset="0"/>
+                      </a:endParaRPr>
+                    </a:p>
+                  </a:txBody>
+                  <a:tcPr marL="9525" marR="9525" marT="9525" marB="0" anchor="b"/>
+                </a:tc>
+                <a:extLst>
+                  <a:ext uri="{0D108BD9-81ED-4DB2-BD59-A6C34878D82A}">
+                    <a16:rowId xmlns:a16="http://schemas.microsoft.com/office/drawing/2014/main" val="2276288165"/>
+                  </a:ext>
+                </a:extLst>
+              </a:tr>
+              <a:tr h="303634">
+                <a:tc>
+                  <a:txBody>
+                    <a:bodyPr/>
+                    <a:lstStyle/>
+                    <a:p>
+                      <a:pPr algn="l" fontAlgn="b"/>
+                      <a:r>
+                        <a:rPr lang="en-US" sz="2400" u="none" strike="noStrike" dirty="0">
+                          <a:effectLst/>
+                        </a:rPr>
+                        <a:t>project</a:t>
+                      </a:r>
+                      <a:endParaRPr lang="en-US" sz="2400" b="0" i="0" u="none" strike="noStrike" dirty="0">
+                        <a:solidFill>
+                          <a:srgbClr val="000000"/>
+                        </a:solidFill>
+                        <a:effectLst/>
+                        <a:latin typeface="Calibri" panose="020F0502020204030204" pitchFamily="34" charset="0"/>
+                      </a:endParaRPr>
+                    </a:p>
+                  </a:txBody>
+                  <a:tcPr marL="9525" marR="9525" marT="9525" marB="0" anchor="b"/>
+                </a:tc>
+                <a:tc>
+                  <a:txBody>
+                    <a:bodyPr/>
+                    <a:lstStyle/>
+                    <a:p>
+                      <a:pPr algn="l" fontAlgn="b"/>
+                      <a:r>
+                        <a:rPr lang="en-US" sz="2400" u="none" strike="noStrike" dirty="0">
+                          <a:effectLst/>
+                        </a:rPr>
+                        <a:t>engineering</a:t>
+                      </a:r>
+                      <a:endParaRPr lang="en-US" sz="2400" b="0" i="0" u="none" strike="noStrike" dirty="0">
+                        <a:solidFill>
+                          <a:srgbClr val="000000"/>
+                        </a:solidFill>
+                        <a:effectLst/>
+                        <a:latin typeface="Calibri" panose="020F0502020204030204" pitchFamily="34" charset="0"/>
+                      </a:endParaRPr>
+                    </a:p>
+                  </a:txBody>
+                  <a:tcPr marL="9525" marR="9525" marT="9525" marB="0" anchor="b"/>
+                </a:tc>
+                <a:tc>
+                  <a:txBody>
+                    <a:bodyPr/>
+                    <a:lstStyle/>
+                    <a:p>
+                      <a:pPr algn="l" fontAlgn="b"/>
+                      <a:r>
+                        <a:rPr lang="en-US" sz="2400" u="none" strike="noStrike" dirty="0">
+                          <a:effectLst/>
+                        </a:rPr>
+                        <a:t>home</a:t>
+                      </a:r>
+                      <a:endParaRPr lang="en-US" sz="2400" b="0" i="0" u="none" strike="noStrike" dirty="0">
+                        <a:solidFill>
+                          <a:srgbClr val="000000"/>
+                        </a:solidFill>
+                        <a:effectLst/>
+                        <a:latin typeface="Calibri" panose="020F0502020204030204" pitchFamily="34" charset="0"/>
+                      </a:endParaRPr>
+                    </a:p>
+                  </a:txBody>
+                  <a:tcPr marL="9525" marR="9525" marT="9525" marB="0" anchor="b"/>
+                </a:tc>
+                <a:tc>
+                  <a:txBody>
+                    <a:bodyPr/>
+                    <a:lstStyle/>
+                    <a:p>
+                      <a:pPr algn="l" fontAlgn="b"/>
+                      <a:r>
+                        <a:rPr lang="en-US" sz="2400" u="none" strike="noStrike" dirty="0">
+                          <a:effectLst/>
+                        </a:rPr>
+                        <a:t>systems</a:t>
+                      </a:r>
+                      <a:endParaRPr lang="en-US" sz="2400" b="0" i="0" u="none" strike="noStrike" dirty="0">
+                        <a:solidFill>
+                          <a:srgbClr val="000000"/>
+                        </a:solidFill>
+                        <a:effectLst/>
+                        <a:latin typeface="Calibri" panose="020F0502020204030204" pitchFamily="34" charset="0"/>
+                      </a:endParaRPr>
+                    </a:p>
+                  </a:txBody>
+                  <a:tcPr marL="9525" marR="9525" marT="9525" marB="0" anchor="b"/>
+                </a:tc>
+                <a:tc>
+                  <a:txBody>
+                    <a:bodyPr/>
+                    <a:lstStyle/>
+                    <a:p>
+                      <a:pPr algn="l" fontAlgn="b"/>
+                      <a:r>
+                        <a:rPr lang="en-US" sz="2400" u="none" strike="noStrike" dirty="0">
+                          <a:effectLst/>
+                        </a:rPr>
+                        <a:t>information</a:t>
+                      </a:r>
+                      <a:endParaRPr lang="en-US" sz="2400" b="0" i="0" u="none" strike="noStrike" dirty="0">
+                        <a:solidFill>
+                          <a:srgbClr val="000000"/>
+                        </a:solidFill>
+                        <a:effectLst/>
+                        <a:latin typeface="Calibri" panose="020F0502020204030204" pitchFamily="34" charset="0"/>
+                      </a:endParaRPr>
+                    </a:p>
+                  </a:txBody>
+                  <a:tcPr marL="9525" marR="9525" marT="9525" marB="0" anchor="b"/>
+                </a:tc>
+                <a:extLst>
+                  <a:ext uri="{0D108BD9-81ED-4DB2-BD59-A6C34878D82A}">
+                    <a16:rowId xmlns:a16="http://schemas.microsoft.com/office/drawing/2014/main" val="1913292412"/>
+                  </a:ext>
+                </a:extLst>
+              </a:tr>
+              <a:tr h="303634">
+                <a:tc>
+                  <a:txBody>
+                    <a:bodyPr/>
+                    <a:lstStyle/>
+                    <a:p>
+                      <a:pPr algn="l" fontAlgn="b"/>
+                      <a:r>
+                        <a:rPr lang="en-US" sz="2400" u="none" strike="noStrike" dirty="0">
+                          <a:effectLst/>
+                        </a:rPr>
+                        <a:t>support</a:t>
+                      </a:r>
+                      <a:endParaRPr lang="en-US" sz="2400" b="0" i="0" u="none" strike="noStrike" dirty="0">
+                        <a:solidFill>
+                          <a:srgbClr val="000000"/>
+                        </a:solidFill>
+                        <a:effectLst/>
+                        <a:latin typeface="Calibri" panose="020F0502020204030204" pitchFamily="34" charset="0"/>
+                      </a:endParaRPr>
+                    </a:p>
+                  </a:txBody>
+                  <a:tcPr marL="9525" marR="9525" marT="9525" marB="0" anchor="b"/>
+                </a:tc>
+                <a:tc>
+                  <a:txBody>
+                    <a:bodyPr/>
+                    <a:lstStyle/>
+                    <a:p>
+                      <a:pPr algn="l" fontAlgn="b"/>
+                      <a:r>
+                        <a:rPr lang="en-US" sz="2400" u="none" strike="noStrike" dirty="0">
+                          <a:effectLst/>
+                        </a:rPr>
+                        <a:t>development</a:t>
+                      </a:r>
+                      <a:endParaRPr lang="en-US" sz="2400" b="0" i="0" u="none" strike="noStrike" dirty="0">
+                        <a:solidFill>
+                          <a:srgbClr val="000000"/>
+                        </a:solidFill>
+                        <a:effectLst/>
+                        <a:latin typeface="Calibri" panose="020F0502020204030204" pitchFamily="34" charset="0"/>
+                      </a:endParaRPr>
+                    </a:p>
+                  </a:txBody>
+                  <a:tcPr marL="9525" marR="9525" marT="9525" marB="0" anchor="b"/>
+                </a:tc>
+                <a:tc>
+                  <a:txBody>
+                    <a:bodyPr/>
+                    <a:lstStyle/>
+                    <a:p>
+                      <a:pPr marL="0" marR="0" lvl="0" indent="0" algn="l" defTabSz="914400" rtl="0" eaLnBrk="1" fontAlgn="auto" latinLnBrk="0" hangingPunct="1">
+                        <a:lnSpc>
+                          <a:spcPct val="100000"/>
+                        </a:lnSpc>
+                        <a:spcBef>
+                          <a:spcPts val="0"/>
+                        </a:spcBef>
+                        <a:spcAft>
+                          <a:spcPts val="0"/>
+                        </a:spcAft>
+                        <a:buClrTx/>
+                        <a:buSzTx/>
+                        <a:buFontTx/>
+                        <a:buNone/>
+                        <a:tabLst/>
+                        <a:defRPr/>
+                      </a:pPr>
+                      <a:r>
+                        <a:rPr lang="en-US" sz="2400" u="none" strike="noStrike" dirty="0">
+                          <a:effectLst/>
+                        </a:rPr>
+                        <a:t>hours</a:t>
+                      </a:r>
+                      <a:endParaRPr lang="en-US" sz="2400" b="0" i="0" u="none" strike="noStrike" dirty="0">
+                        <a:solidFill>
+                          <a:srgbClr val="000000"/>
+                        </a:solidFill>
+                        <a:effectLst/>
+                        <a:latin typeface="Calibri" panose="020F0502020204030204" pitchFamily="34" charset="0"/>
+                      </a:endParaRPr>
+                    </a:p>
+                  </a:txBody>
+                  <a:tcPr marL="9525" marR="9525" marT="9525" marB="0" anchor="b"/>
+                </a:tc>
+                <a:tc>
+                  <a:txBody>
+                    <a:bodyPr/>
+                    <a:lstStyle/>
+                    <a:p>
+                      <a:pPr algn="l" fontAlgn="b"/>
+                      <a:r>
+                        <a:rPr lang="en-US" sz="2400" u="none" strike="noStrike" dirty="0">
+                          <a:effectLst/>
+                        </a:rPr>
+                        <a:t>computer</a:t>
+                      </a:r>
+                      <a:endParaRPr lang="en-US" sz="2400" b="0" i="0" u="none" strike="noStrike" dirty="0">
+                        <a:solidFill>
+                          <a:srgbClr val="000000"/>
+                        </a:solidFill>
+                        <a:effectLst/>
+                        <a:latin typeface="Calibri" panose="020F0502020204030204" pitchFamily="34" charset="0"/>
+                      </a:endParaRPr>
+                    </a:p>
+                  </a:txBody>
+                  <a:tcPr marL="9525" marR="9525" marT="9525" marB="0" anchor="b"/>
+                </a:tc>
+                <a:tc>
+                  <a:txBody>
+                    <a:bodyPr/>
+                    <a:lstStyle/>
+                    <a:p>
+                      <a:pPr algn="l" fontAlgn="b"/>
+                      <a:r>
+                        <a:rPr lang="en-US" sz="2400" u="none" strike="noStrike" dirty="0">
+                          <a:effectLst/>
+                        </a:rPr>
+                        <a:t>analytics</a:t>
+                      </a:r>
+                      <a:endParaRPr lang="en-US" sz="2400" b="0" i="0" u="none" strike="noStrike" dirty="0">
+                        <a:solidFill>
+                          <a:srgbClr val="000000"/>
+                        </a:solidFill>
+                        <a:effectLst/>
+                        <a:latin typeface="Calibri" panose="020F0502020204030204" pitchFamily="34" charset="0"/>
+                      </a:endParaRPr>
+                    </a:p>
+                  </a:txBody>
+                  <a:tcPr marL="9525" marR="9525" marT="9525" marB="0" anchor="b"/>
+                </a:tc>
+                <a:extLst>
+                  <a:ext uri="{0D108BD9-81ED-4DB2-BD59-A6C34878D82A}">
+                    <a16:rowId xmlns:a16="http://schemas.microsoft.com/office/drawing/2014/main" val="330431423"/>
+                  </a:ext>
+                </a:extLst>
+              </a:tr>
+              <a:tr h="303634">
+                <a:tc>
+                  <a:txBody>
+                    <a:bodyPr/>
+                    <a:lstStyle/>
+                    <a:p>
+                      <a:pPr algn="l" fontAlgn="b"/>
+                      <a:r>
+                        <a:rPr lang="en-US" sz="2400" u="none" strike="noStrike" dirty="0">
+                          <a:effectLst/>
+                        </a:rPr>
+                        <a:t>team</a:t>
+                      </a:r>
+                      <a:endParaRPr lang="en-US" sz="2400" b="0" i="0" u="none" strike="noStrike" dirty="0">
+                        <a:solidFill>
+                          <a:srgbClr val="000000"/>
+                        </a:solidFill>
+                        <a:effectLst/>
+                        <a:latin typeface="Calibri" panose="020F0502020204030204" pitchFamily="34" charset="0"/>
+                      </a:endParaRPr>
+                    </a:p>
+                  </a:txBody>
+                  <a:tcPr marL="9525" marR="9525" marT="9525" marB="0" anchor="b"/>
+                </a:tc>
+                <a:tc>
+                  <a:txBody>
+                    <a:bodyPr/>
+                    <a:lstStyle/>
+                    <a:p>
+                      <a:pPr algn="l" fontAlgn="b"/>
+                      <a:r>
+                        <a:rPr lang="en-US" sz="2400" u="none" strike="noStrike" dirty="0">
+                          <a:effectLst/>
+                        </a:rPr>
+                        <a:t>team</a:t>
+                      </a:r>
+                      <a:endParaRPr lang="en-US" sz="2400" b="0" i="0" u="none" strike="noStrike" dirty="0">
+                        <a:solidFill>
+                          <a:srgbClr val="000000"/>
+                        </a:solidFill>
+                        <a:effectLst/>
+                        <a:latin typeface="Calibri" panose="020F0502020204030204" pitchFamily="34" charset="0"/>
+                      </a:endParaRPr>
+                    </a:p>
+                  </a:txBody>
+                  <a:tcPr marL="9525" marR="9525" marT="9525" marB="0" anchor="b"/>
+                </a:tc>
+                <a:tc>
+                  <a:txBody>
+                    <a:bodyPr/>
+                    <a:lstStyle/>
+                    <a:p>
+                      <a:pPr algn="l" fontAlgn="b"/>
+                      <a:r>
+                        <a:rPr lang="en-US" sz="2400" u="none" strike="noStrike" dirty="0">
+                          <a:effectLst/>
+                        </a:rPr>
+                        <a:t>ability</a:t>
+                      </a:r>
+                      <a:endParaRPr lang="en-US" sz="2400" b="0" i="0" u="none" strike="noStrike" dirty="0">
+                        <a:solidFill>
+                          <a:srgbClr val="000000"/>
+                        </a:solidFill>
+                        <a:effectLst/>
+                        <a:latin typeface="Calibri" panose="020F0502020204030204" pitchFamily="34" charset="0"/>
+                      </a:endParaRPr>
+                    </a:p>
+                  </a:txBody>
+                  <a:tcPr marL="9525" marR="9525" marT="9525" marB="0" anchor="b"/>
+                </a:tc>
+                <a:tc>
+                  <a:txBody>
+                    <a:bodyPr/>
+                    <a:lstStyle/>
+                    <a:p>
+                      <a:pPr algn="l" fontAlgn="b"/>
+                      <a:r>
+                        <a:rPr lang="en-US" sz="2400" u="none" strike="noStrike" dirty="0">
+                          <a:effectLst/>
+                        </a:rPr>
+                        <a:t>science</a:t>
+                      </a:r>
+                      <a:endParaRPr lang="en-US" sz="2400" b="0" i="0" u="none" strike="noStrike" dirty="0">
+                        <a:solidFill>
+                          <a:srgbClr val="000000"/>
+                        </a:solidFill>
+                        <a:effectLst/>
+                        <a:latin typeface="Calibri" panose="020F0502020204030204" pitchFamily="34" charset="0"/>
+                      </a:endParaRPr>
+                    </a:p>
+                  </a:txBody>
+                  <a:tcPr marL="9525" marR="9525" marT="9525" marB="0" anchor="b"/>
+                </a:tc>
+                <a:tc>
+                  <a:txBody>
+                    <a:bodyPr/>
+                    <a:lstStyle/>
+                    <a:p>
+                      <a:pPr algn="l" fontAlgn="b"/>
+                      <a:r>
+                        <a:rPr lang="en-US" sz="2400" u="none" strike="noStrike" dirty="0">
+                          <a:effectLst/>
+                        </a:rPr>
+                        <a:t>team</a:t>
+                      </a:r>
+                      <a:endParaRPr lang="en-US" sz="2400" b="0" i="0" u="none" strike="noStrike" dirty="0">
+                        <a:solidFill>
+                          <a:srgbClr val="000000"/>
+                        </a:solidFill>
+                        <a:effectLst/>
+                        <a:latin typeface="Calibri" panose="020F0502020204030204" pitchFamily="34" charset="0"/>
+                      </a:endParaRPr>
+                    </a:p>
+                  </a:txBody>
+                  <a:tcPr marL="9525" marR="9525" marT="9525" marB="0" anchor="b"/>
+                </a:tc>
+                <a:extLst>
+                  <a:ext uri="{0D108BD9-81ED-4DB2-BD59-A6C34878D82A}">
+                    <a16:rowId xmlns:a16="http://schemas.microsoft.com/office/drawing/2014/main" val="2121785788"/>
+                  </a:ext>
+                </a:extLst>
+              </a:tr>
+              <a:tr h="303634">
+                <a:tc>
+                  <a:txBody>
+                    <a:bodyPr/>
+                    <a:lstStyle/>
+                    <a:p>
+                      <a:pPr algn="l" fontAlgn="b"/>
+                      <a:r>
+                        <a:rPr lang="en-US" sz="2400" u="none" strike="noStrike" dirty="0">
+                          <a:effectLst/>
+                        </a:rPr>
+                        <a:t>process</a:t>
+                      </a:r>
+                      <a:endParaRPr lang="en-US" sz="2400" b="0" i="0" u="none" strike="noStrike" dirty="0">
+                        <a:solidFill>
+                          <a:srgbClr val="000000"/>
+                        </a:solidFill>
+                        <a:effectLst/>
+                        <a:latin typeface="Calibri" panose="020F0502020204030204" pitchFamily="34" charset="0"/>
+                      </a:endParaRPr>
+                    </a:p>
+                  </a:txBody>
+                  <a:tcPr marL="9525" marR="9525" marT="9525" marB="0" anchor="b"/>
+                </a:tc>
+                <a:tc>
+                  <a:txBody>
+                    <a:bodyPr/>
+                    <a:lstStyle/>
+                    <a:p>
+                      <a:pPr algn="l" fontAlgn="b"/>
+                      <a:r>
+                        <a:rPr lang="en-US" sz="2400" u="none" strike="noStrike" dirty="0">
+                          <a:effectLst/>
+                        </a:rPr>
+                        <a:t>product</a:t>
+                      </a:r>
+                      <a:endParaRPr lang="en-US" sz="2400" b="0" i="0" u="none" strike="noStrike" dirty="0">
+                        <a:solidFill>
+                          <a:srgbClr val="000000"/>
+                        </a:solidFill>
+                        <a:effectLst/>
+                        <a:latin typeface="Calibri" panose="020F0502020204030204" pitchFamily="34" charset="0"/>
+                      </a:endParaRPr>
+                    </a:p>
+                  </a:txBody>
+                  <a:tcPr marL="9525" marR="9525" marT="9525" marB="0" anchor="b"/>
+                </a:tc>
+                <a:tc>
+                  <a:txBody>
+                    <a:bodyPr/>
+                    <a:lstStyle/>
+                    <a:p>
+                      <a:pPr algn="l" fontAlgn="b"/>
+                      <a:r>
+                        <a:rPr lang="en-US" sz="2400" u="none" strike="noStrike" dirty="0">
+                          <a:effectLst/>
+                        </a:rPr>
+                        <a:t>well</a:t>
+                      </a:r>
+                      <a:endParaRPr lang="en-US" sz="2400" b="0" i="0" u="none" strike="noStrike" dirty="0">
+                        <a:solidFill>
+                          <a:srgbClr val="000000"/>
+                        </a:solidFill>
+                        <a:effectLst/>
+                        <a:latin typeface="Calibri" panose="020F0502020204030204" pitchFamily="34" charset="0"/>
+                      </a:endParaRPr>
+                    </a:p>
+                  </a:txBody>
+                  <a:tcPr marL="9525" marR="9525" marT="9525" marB="0" anchor="b"/>
+                </a:tc>
+                <a:tc>
+                  <a:txBody>
+                    <a:bodyPr/>
+                    <a:lstStyle/>
+                    <a:p>
+                      <a:pPr algn="l" fontAlgn="b"/>
+                      <a:r>
+                        <a:rPr lang="en-US" sz="2400" u="none" strike="noStrike" dirty="0">
+                          <a:effectLst/>
+                        </a:rPr>
+                        <a:t>engineering</a:t>
+                      </a:r>
+                      <a:endParaRPr lang="en-US" sz="2400" b="0" i="0" u="none" strike="noStrike" dirty="0">
+                        <a:solidFill>
+                          <a:srgbClr val="000000"/>
+                        </a:solidFill>
+                        <a:effectLst/>
+                        <a:latin typeface="Calibri" panose="020F0502020204030204" pitchFamily="34" charset="0"/>
+                      </a:endParaRPr>
+                    </a:p>
+                  </a:txBody>
+                  <a:tcPr marL="9525" marR="9525" marT="9525" marB="0" anchor="b"/>
+                </a:tc>
+                <a:tc>
+                  <a:txBody>
+                    <a:bodyPr/>
+                    <a:lstStyle/>
+                    <a:p>
+                      <a:pPr algn="l" fontAlgn="b"/>
+                      <a:r>
+                        <a:rPr lang="en-US" sz="2400" u="none" strike="noStrike" dirty="0">
+                          <a:effectLst/>
+                        </a:rPr>
+                        <a:t>solutions</a:t>
+                      </a:r>
+                      <a:endParaRPr lang="en-US" sz="2400" b="0" i="0" u="none" strike="noStrike" dirty="0">
+                        <a:solidFill>
+                          <a:srgbClr val="000000"/>
+                        </a:solidFill>
+                        <a:effectLst/>
+                        <a:latin typeface="Calibri" panose="020F0502020204030204" pitchFamily="34" charset="0"/>
+                      </a:endParaRPr>
+                    </a:p>
+                  </a:txBody>
+                  <a:tcPr marL="9525" marR="9525" marT="9525" marB="0" anchor="b"/>
+                </a:tc>
+                <a:extLst>
+                  <a:ext uri="{0D108BD9-81ED-4DB2-BD59-A6C34878D82A}">
+                    <a16:rowId xmlns:a16="http://schemas.microsoft.com/office/drawing/2014/main" val="946385162"/>
+                  </a:ext>
+                </a:extLst>
+              </a:tr>
+              <a:tr h="303634">
+                <a:tc>
+                  <a:txBody>
+                    <a:bodyPr/>
+                    <a:lstStyle/>
+                    <a:p>
+                      <a:pPr algn="l" fontAlgn="b"/>
+                      <a:r>
+                        <a:rPr lang="en-US" sz="2400" u="none" strike="noStrike" dirty="0">
+                          <a:effectLst/>
+                        </a:rPr>
+                        <a:t>operations</a:t>
+                      </a:r>
+                      <a:endParaRPr lang="en-US" sz="2400" b="0" i="0" u="none" strike="noStrike" dirty="0">
+                        <a:solidFill>
+                          <a:srgbClr val="000000"/>
+                        </a:solidFill>
+                        <a:effectLst/>
+                        <a:latin typeface="Calibri" panose="020F0502020204030204" pitchFamily="34" charset="0"/>
+                      </a:endParaRPr>
+                    </a:p>
+                  </a:txBody>
+                  <a:tcPr marL="9525" marR="9525" marT="9525" marB="0" anchor="b"/>
+                </a:tc>
+                <a:tc>
+                  <a:txBody>
+                    <a:bodyPr/>
+                    <a:lstStyle/>
+                    <a:p>
+                      <a:pPr algn="l" fontAlgn="b"/>
+                      <a:r>
+                        <a:rPr lang="en-US" sz="2400" u="none" strike="noStrike" dirty="0">
+                          <a:effectLst/>
+                        </a:rPr>
+                        <a:t>system</a:t>
+                      </a:r>
+                      <a:endParaRPr lang="en-US" sz="2400" b="0" i="0" u="none" strike="noStrike" dirty="0">
+                        <a:solidFill>
+                          <a:srgbClr val="000000"/>
+                        </a:solidFill>
+                        <a:effectLst/>
+                        <a:latin typeface="Calibri" panose="020F0502020204030204" pitchFamily="34" charset="0"/>
+                      </a:endParaRPr>
+                    </a:p>
+                  </a:txBody>
+                  <a:tcPr marL="9525" marR="9525" marT="9525" marB="0" anchor="b"/>
+                </a:tc>
+                <a:tc>
+                  <a:txBody>
+                    <a:bodyPr/>
+                    <a:lstStyle/>
+                    <a:p>
+                      <a:pPr algn="l" fontAlgn="b"/>
+                      <a:r>
+                        <a:rPr lang="en-US" sz="2400" u="none" strike="noStrike" dirty="0">
+                          <a:effectLst/>
+                        </a:rPr>
+                        <a:t>training</a:t>
+                      </a:r>
+                      <a:endParaRPr lang="en-US" sz="2400" b="0" i="0" u="none" strike="noStrike" dirty="0">
+                        <a:solidFill>
+                          <a:srgbClr val="000000"/>
+                        </a:solidFill>
+                        <a:effectLst/>
+                        <a:latin typeface="Calibri" panose="020F0502020204030204" pitchFamily="34" charset="0"/>
+                      </a:endParaRPr>
+                    </a:p>
+                  </a:txBody>
+                  <a:tcPr marL="9525" marR="9525" marT="9525" marB="0" anchor="b"/>
+                </a:tc>
+                <a:tc>
+                  <a:txBody>
+                    <a:bodyPr/>
+                    <a:lstStyle/>
+                    <a:p>
+                      <a:pPr algn="l" fontAlgn="b"/>
+                      <a:r>
+                        <a:rPr lang="en-US" sz="2400" u="none" strike="noStrike" dirty="0">
+                          <a:effectLst/>
+                        </a:rPr>
+                        <a:t>services</a:t>
+                      </a:r>
+                      <a:endParaRPr lang="en-US" sz="2400" b="0" i="0" u="none" strike="noStrike" dirty="0">
+                        <a:solidFill>
+                          <a:srgbClr val="000000"/>
+                        </a:solidFill>
+                        <a:effectLst/>
+                        <a:latin typeface="Calibri" panose="020F0502020204030204" pitchFamily="34" charset="0"/>
+                      </a:endParaRPr>
+                    </a:p>
+                  </a:txBody>
+                  <a:tcPr marL="9525" marR="9525" marT="9525" marB="0" anchor="b"/>
+                </a:tc>
+                <a:tc>
+                  <a:txBody>
+                    <a:bodyPr/>
+                    <a:lstStyle/>
+                    <a:p>
+                      <a:pPr algn="l" fontAlgn="b"/>
+                      <a:r>
+                        <a:rPr lang="en-US" sz="2400" u="none" strike="noStrike" dirty="0">
+                          <a:effectLst/>
+                        </a:rPr>
+                        <a:t>services</a:t>
+                      </a:r>
+                      <a:endParaRPr lang="en-US" sz="2400" b="0" i="0" u="none" strike="noStrike" dirty="0">
+                        <a:solidFill>
+                          <a:srgbClr val="000000"/>
+                        </a:solidFill>
+                        <a:effectLst/>
+                        <a:latin typeface="Calibri" panose="020F0502020204030204" pitchFamily="34" charset="0"/>
+                      </a:endParaRPr>
+                    </a:p>
+                  </a:txBody>
+                  <a:tcPr marL="9525" marR="9525" marT="9525" marB="0" anchor="b"/>
+                </a:tc>
+                <a:extLst>
+                  <a:ext uri="{0D108BD9-81ED-4DB2-BD59-A6C34878D82A}">
+                    <a16:rowId xmlns:a16="http://schemas.microsoft.com/office/drawing/2014/main" val="2540218499"/>
+                  </a:ext>
+                </a:extLst>
+              </a:tr>
+              <a:tr h="303634">
+                <a:tc>
+                  <a:txBody>
+                    <a:bodyPr/>
+                    <a:lstStyle/>
+                    <a:p>
+                      <a:pPr algn="l" fontAlgn="b"/>
+                      <a:r>
+                        <a:rPr lang="en-US" sz="2400" u="none" strike="noStrike" dirty="0">
+                          <a:effectLst/>
+                        </a:rPr>
+                        <a:t>ability</a:t>
+                      </a:r>
+                      <a:endParaRPr lang="en-US" sz="2400" b="0" i="0" u="none" strike="noStrike" dirty="0">
+                        <a:solidFill>
+                          <a:srgbClr val="000000"/>
+                        </a:solidFill>
+                        <a:effectLst/>
+                        <a:latin typeface="Calibri" panose="020F0502020204030204" pitchFamily="34" charset="0"/>
+                      </a:endParaRPr>
+                    </a:p>
+                  </a:txBody>
+                  <a:tcPr marL="9525" marR="9525" marT="9525" marB="0" anchor="b"/>
+                </a:tc>
+                <a:tc>
+                  <a:txBody>
+                    <a:bodyPr/>
+                    <a:lstStyle/>
+                    <a:p>
+                      <a:pPr algn="l" fontAlgn="b"/>
+                      <a:r>
+                        <a:rPr lang="en-US" sz="2400" u="none" strike="noStrike" dirty="0">
+                          <a:effectLst/>
+                        </a:rPr>
+                        <a:t>quality</a:t>
+                      </a:r>
+                      <a:endParaRPr lang="en-US" sz="2400" b="0" i="0" u="none" strike="noStrike" dirty="0">
+                        <a:solidFill>
+                          <a:srgbClr val="000000"/>
+                        </a:solidFill>
+                        <a:effectLst/>
+                        <a:latin typeface="Calibri" panose="020F0502020204030204" pitchFamily="34" charset="0"/>
+                      </a:endParaRPr>
+                    </a:p>
+                  </a:txBody>
+                  <a:tcPr marL="9525" marR="9525" marT="9525" marB="0" anchor="b"/>
+                </a:tc>
+                <a:tc>
+                  <a:txBody>
+                    <a:bodyPr/>
+                    <a:lstStyle/>
+                    <a:p>
+                      <a:pPr algn="l" fontAlgn="b"/>
+                      <a:r>
+                        <a:rPr lang="en-US" sz="2400" u="none" strike="noStrike" dirty="0">
+                          <a:effectLst/>
+                        </a:rPr>
+                        <a:t>advisor</a:t>
+                      </a:r>
+                      <a:endParaRPr lang="en-US" sz="2400" b="0" i="0" u="none" strike="noStrike" dirty="0">
+                        <a:solidFill>
+                          <a:srgbClr val="000000"/>
+                        </a:solidFill>
+                        <a:effectLst/>
+                        <a:latin typeface="Calibri" panose="020F0502020204030204" pitchFamily="34" charset="0"/>
+                      </a:endParaRPr>
+                    </a:p>
+                  </a:txBody>
+                  <a:tcPr marL="9525" marR="9525" marT="9525" marB="0" anchor="b"/>
+                </a:tc>
+                <a:tc>
+                  <a:txBody>
+                    <a:bodyPr/>
+                    <a:lstStyle/>
+                    <a:p>
+                      <a:pPr algn="l" fontAlgn="b"/>
+                      <a:r>
+                        <a:rPr lang="en-US" sz="2400" u="none" strike="noStrike" dirty="0">
+                          <a:effectLst/>
+                        </a:rPr>
+                        <a:t>design</a:t>
+                      </a:r>
+                      <a:endParaRPr lang="en-US" sz="2400" b="0" i="0" u="none" strike="noStrike" dirty="0">
+                        <a:solidFill>
+                          <a:srgbClr val="000000"/>
+                        </a:solidFill>
+                        <a:effectLst/>
+                        <a:latin typeface="Calibri" panose="020F0502020204030204" pitchFamily="34" charset="0"/>
+                      </a:endParaRPr>
+                    </a:p>
+                  </a:txBody>
+                  <a:tcPr marL="9525" marR="9525" marT="9525" marB="0" anchor="b"/>
+                </a:tc>
+                <a:tc>
+                  <a:txBody>
+                    <a:bodyPr/>
+                    <a:lstStyle/>
+                    <a:p>
+                      <a:pPr algn="l" fontAlgn="b"/>
+                      <a:r>
+                        <a:rPr lang="en-US" sz="2400" u="none" strike="noStrike" dirty="0">
+                          <a:effectLst/>
+                        </a:rPr>
+                        <a:t>product</a:t>
+                      </a:r>
+                      <a:endParaRPr lang="en-US" sz="2400" b="0" i="0" u="none" strike="noStrike" dirty="0">
+                        <a:solidFill>
+                          <a:srgbClr val="000000"/>
+                        </a:solidFill>
+                        <a:effectLst/>
+                        <a:latin typeface="Calibri" panose="020F0502020204030204" pitchFamily="34" charset="0"/>
+                      </a:endParaRPr>
+                    </a:p>
+                  </a:txBody>
+                  <a:tcPr marL="9525" marR="9525" marT="9525" marB="0" anchor="b"/>
+                </a:tc>
+                <a:extLst>
+                  <a:ext uri="{0D108BD9-81ED-4DB2-BD59-A6C34878D82A}">
+                    <a16:rowId xmlns:a16="http://schemas.microsoft.com/office/drawing/2014/main" val="3238101484"/>
+                  </a:ext>
+                </a:extLst>
+              </a:tr>
+              <a:tr h="303634">
+                <a:tc>
+                  <a:txBody>
+                    <a:bodyPr/>
+                    <a:lstStyle/>
+                    <a:p>
+                      <a:pPr algn="l" fontAlgn="b"/>
+                      <a:r>
+                        <a:rPr lang="en-US" sz="2400" u="none" strike="noStrike" dirty="0">
+                          <a:effectLst/>
+                        </a:rPr>
+                        <a:t>manage</a:t>
+                      </a:r>
+                      <a:endParaRPr lang="en-US" sz="2400" b="0" i="0" u="none" strike="noStrike" dirty="0">
+                        <a:solidFill>
+                          <a:srgbClr val="000000"/>
+                        </a:solidFill>
+                        <a:effectLst/>
+                        <a:latin typeface="Calibri" panose="020F0502020204030204" pitchFamily="34" charset="0"/>
+                      </a:endParaRPr>
+                    </a:p>
+                  </a:txBody>
+                  <a:tcPr marL="9525" marR="9525" marT="9525" marB="0" anchor="b"/>
+                </a:tc>
+                <a:tc>
+                  <a:txBody>
+                    <a:bodyPr/>
+                    <a:lstStyle/>
+                    <a:p>
+                      <a:pPr algn="l" fontAlgn="b"/>
+                      <a:r>
+                        <a:rPr lang="en-US" sz="2400" u="none" strike="noStrike" dirty="0">
+                          <a:effectLst/>
+                        </a:rPr>
+                        <a:t>new</a:t>
+                      </a:r>
+                      <a:endParaRPr lang="en-US" sz="2400" b="0" i="0" u="none" strike="noStrike" dirty="0">
+                        <a:solidFill>
+                          <a:srgbClr val="000000"/>
+                        </a:solidFill>
+                        <a:effectLst/>
+                        <a:latin typeface="Calibri" panose="020F0502020204030204" pitchFamily="34" charset="0"/>
+                      </a:endParaRPr>
+                    </a:p>
+                  </a:txBody>
+                  <a:tcPr marL="9525" marR="9525" marT="9525" marB="0" anchor="b"/>
+                </a:tc>
+                <a:tc>
+                  <a:txBody>
+                    <a:bodyPr/>
+                    <a:lstStyle/>
+                    <a:p>
+                      <a:pPr algn="l" fontAlgn="b"/>
+                      <a:r>
+                        <a:rPr lang="en-US" sz="2400" u="none" strike="noStrike" dirty="0">
+                          <a:effectLst/>
+                        </a:rPr>
+                        <a:t>world</a:t>
+                      </a:r>
+                      <a:endParaRPr lang="en-US" sz="2400" b="0" i="0" u="none" strike="noStrike" dirty="0">
+                        <a:solidFill>
+                          <a:srgbClr val="000000"/>
+                        </a:solidFill>
+                        <a:effectLst/>
+                        <a:latin typeface="Calibri" panose="020F0502020204030204" pitchFamily="34" charset="0"/>
+                      </a:endParaRPr>
+                    </a:p>
+                  </a:txBody>
+                  <a:tcPr marL="9525" marR="9525" marT="9525" marB="0" anchor="b"/>
+                </a:tc>
+                <a:tc>
+                  <a:txBody>
+                    <a:bodyPr/>
+                    <a:lstStyle/>
+                    <a:p>
+                      <a:pPr algn="l" fontAlgn="b"/>
+                      <a:r>
+                        <a:rPr lang="en-US" sz="2400" u="none" strike="noStrike" dirty="0">
+                          <a:effectLst/>
+                        </a:rPr>
+                        <a:t>products</a:t>
+                      </a:r>
+                      <a:endParaRPr lang="en-US" sz="2400" b="0" i="0" u="none" strike="noStrike" dirty="0">
+                        <a:solidFill>
+                          <a:srgbClr val="000000"/>
+                        </a:solidFill>
+                        <a:effectLst/>
+                        <a:latin typeface="Calibri" panose="020F0502020204030204" pitchFamily="34" charset="0"/>
+                      </a:endParaRPr>
+                    </a:p>
+                  </a:txBody>
+                  <a:tcPr marL="9525" marR="9525" marT="9525" marB="0" anchor="b"/>
+                </a:tc>
+                <a:tc>
+                  <a:txBody>
+                    <a:bodyPr/>
+                    <a:lstStyle/>
+                    <a:p>
+                      <a:pPr algn="l" fontAlgn="b"/>
+                      <a:r>
+                        <a:rPr lang="en-US" sz="2400" u="none" strike="noStrike" dirty="0">
+                          <a:effectLst/>
+                        </a:rPr>
+                        <a:t>analysis</a:t>
+                      </a:r>
+                      <a:endParaRPr lang="en-US" sz="2400" b="0" i="0" u="none" strike="noStrike" dirty="0">
+                        <a:solidFill>
+                          <a:srgbClr val="000000"/>
+                        </a:solidFill>
+                        <a:effectLst/>
+                        <a:latin typeface="Calibri" panose="020F0502020204030204" pitchFamily="34" charset="0"/>
+                      </a:endParaRPr>
+                    </a:p>
+                  </a:txBody>
+                  <a:tcPr marL="9525" marR="9525" marT="9525" marB="0" anchor="b"/>
+                </a:tc>
+                <a:extLst>
+                  <a:ext uri="{0D108BD9-81ED-4DB2-BD59-A6C34878D82A}">
+                    <a16:rowId xmlns:a16="http://schemas.microsoft.com/office/drawing/2014/main" val="3424389576"/>
+                  </a:ext>
+                </a:extLst>
+              </a:tr>
+              <a:tr h="303634">
+                <a:tc>
+                  <a:txBody>
+                    <a:bodyPr/>
+                    <a:lstStyle/>
+                    <a:p>
+                      <a:pPr algn="l" fontAlgn="b"/>
+                      <a:r>
+                        <a:rPr lang="en-US" sz="2400" u="none" strike="noStrike" dirty="0">
+                          <a:effectLst/>
+                        </a:rPr>
+                        <a:t>skills</a:t>
+                      </a:r>
+                      <a:endParaRPr lang="en-US" sz="2400" b="0" i="0" u="none" strike="noStrike" dirty="0">
+                        <a:solidFill>
+                          <a:srgbClr val="000000"/>
+                        </a:solidFill>
+                        <a:effectLst/>
+                        <a:latin typeface="Calibri" panose="020F0502020204030204" pitchFamily="34" charset="0"/>
+                      </a:endParaRPr>
+                    </a:p>
+                  </a:txBody>
+                  <a:tcPr marL="9525" marR="9525" marT="9525" marB="0" anchor="b"/>
+                </a:tc>
+                <a:tc>
+                  <a:txBody>
+                    <a:bodyPr/>
+                    <a:lstStyle/>
+                    <a:p>
+                      <a:pPr algn="l" fontAlgn="b"/>
+                      <a:r>
+                        <a:rPr lang="en-US" sz="2400" u="none" strike="noStrike" dirty="0">
+                          <a:effectLst/>
+                        </a:rPr>
+                        <a:t>develop</a:t>
+                      </a:r>
+                      <a:endParaRPr lang="en-US" sz="2400" b="0" i="0" u="none" strike="noStrike" dirty="0">
+                        <a:solidFill>
+                          <a:srgbClr val="000000"/>
+                        </a:solidFill>
+                        <a:effectLst/>
+                        <a:latin typeface="Calibri" panose="020F0502020204030204" pitchFamily="34" charset="0"/>
+                      </a:endParaRPr>
+                    </a:p>
+                  </a:txBody>
+                  <a:tcPr marL="9525" marR="9525" marT="9525" marB="0" anchor="b"/>
+                </a:tc>
+                <a:tc>
+                  <a:txBody>
+                    <a:bodyPr/>
+                    <a:lstStyle/>
+                    <a:p>
+                      <a:pPr marL="0" marR="0" lvl="0" indent="0" algn="l" defTabSz="914400" rtl="0" eaLnBrk="1" fontAlgn="b" latinLnBrk="0" hangingPunct="1">
+                        <a:lnSpc>
+                          <a:spcPct val="100000"/>
+                        </a:lnSpc>
+                        <a:spcBef>
+                          <a:spcPts val="0"/>
+                        </a:spcBef>
+                        <a:spcAft>
+                          <a:spcPts val="0"/>
+                        </a:spcAft>
+                        <a:buClrTx/>
+                        <a:buSzTx/>
+                        <a:buFontTx/>
+                        <a:buNone/>
+                        <a:tabLst/>
+                        <a:defRPr/>
+                      </a:pPr>
+                      <a:r>
+                        <a:rPr lang="en-US" sz="2400" u="none" strike="noStrike" dirty="0">
+                          <a:effectLst/>
+                        </a:rPr>
+                        <a:t>support</a:t>
+                      </a:r>
+                      <a:endParaRPr lang="en-US" sz="2400" b="0" i="0" u="none" strike="noStrike" dirty="0">
+                        <a:solidFill>
+                          <a:srgbClr val="000000"/>
+                        </a:solidFill>
+                        <a:effectLst/>
+                        <a:latin typeface="Calibri" panose="020F0502020204030204" pitchFamily="34" charset="0"/>
+                      </a:endParaRPr>
+                    </a:p>
+                  </a:txBody>
+                  <a:tcPr marL="9525" marR="9525" marT="9525" marB="0" anchor="b"/>
+                </a:tc>
+                <a:tc>
+                  <a:txBody>
+                    <a:bodyPr/>
+                    <a:lstStyle/>
+                    <a:p>
+                      <a:pPr algn="l" fontAlgn="b"/>
+                      <a:r>
+                        <a:rPr lang="en-US" sz="2400" u="none" strike="noStrike" dirty="0">
+                          <a:effectLst/>
+                        </a:rPr>
+                        <a:t>new</a:t>
+                      </a:r>
+                      <a:endParaRPr lang="en-US" sz="2400" b="0" i="0" u="none" strike="noStrike" dirty="0">
+                        <a:solidFill>
+                          <a:srgbClr val="000000"/>
+                        </a:solidFill>
+                        <a:effectLst/>
+                        <a:latin typeface="Calibri" panose="020F0502020204030204" pitchFamily="34" charset="0"/>
+                      </a:endParaRPr>
+                    </a:p>
+                  </a:txBody>
+                  <a:tcPr marL="9525" marR="9525" marT="9525" marB="0" anchor="b"/>
+                </a:tc>
+                <a:tc>
+                  <a:txBody>
+                    <a:bodyPr/>
+                    <a:lstStyle/>
+                    <a:p>
+                      <a:pPr algn="l" fontAlgn="b"/>
+                      <a:r>
+                        <a:rPr lang="en-US" sz="2400" u="none" strike="noStrike" dirty="0">
+                          <a:effectLst/>
+                        </a:rPr>
+                        <a:t>technical</a:t>
+                      </a:r>
+                      <a:endParaRPr lang="en-US" sz="2400" b="0" i="0" u="none" strike="noStrike" dirty="0">
+                        <a:solidFill>
+                          <a:srgbClr val="000000"/>
+                        </a:solidFill>
+                        <a:effectLst/>
+                        <a:latin typeface="Calibri" panose="020F0502020204030204" pitchFamily="34" charset="0"/>
+                      </a:endParaRPr>
+                    </a:p>
+                  </a:txBody>
+                  <a:tcPr marL="9525" marR="9525" marT="9525" marB="0" anchor="b"/>
+                </a:tc>
+                <a:extLst>
+                  <a:ext uri="{0D108BD9-81ED-4DB2-BD59-A6C34878D82A}">
+                    <a16:rowId xmlns:a16="http://schemas.microsoft.com/office/drawing/2014/main" val="3544599095"/>
+                  </a:ext>
+                </a:extLst>
+              </a:tr>
+            </a:tbl>
+          </a:graphicData>
+        </a:graphic>
+      </p:graphicFrame>
+    </p:spTree>
+    <p:extLst>
+      <p:ext uri="{BB962C8B-B14F-4D97-AF65-F5344CB8AC3E}">
+        <p14:creationId xmlns:p14="http://schemas.microsoft.com/office/powerpoint/2010/main" val="508303959"/>
+      </p:ext>
+    </p:extLst>
+  </p:cSld>
+  <p:clrMapOvr>
+    <a:masterClrMapping/>
+  </p:clrMapOvr>
+</p:sld>
+</file>
+
 <file path=ppt/slides/slide19.xml><?xml version="1.0" encoding="utf-8"?>
 <p:sld xmlns:a="http://schemas.openxmlformats.org/drawingml/2006/main" xmlns:r="http://schemas.openxmlformats.org/officeDocument/2006/relationships" xmlns:p="http://schemas.openxmlformats.org/presentationml/2006/main">
   <p:cSld>
@@ -12752,6 +12753,1443 @@
           <p:cNvPr id="2" name="Title 1">
             <a:extLst>
               <a:ext uri="{FF2B5EF4-FFF2-40B4-BE49-F238E27FC236}">
+                <a16:creationId xmlns:a16="http://schemas.microsoft.com/office/drawing/2014/main" id="{E8E1B2DF-8C2C-43CD-8BD5-6DADBF613F07}"/>
+              </a:ext>
+            </a:extLst>
+          </p:cNvPr>
+          <p:cNvSpPr>
+            <a:spLocks noGrp="1"/>
+          </p:cNvSpPr>
+          <p:nvPr>
+            <p:ph type="title"/>
+          </p:nvPr>
+        </p:nvSpPr>
+        <p:spPr/>
+        <p:txBody>
+          <a:bodyPr/>
+          <a:lstStyle/>
+          <a:p>
+            <a:r>
+              <a:rPr lang="en-US" dirty="0"/>
+              <a:t>LDA Top Terms by Topic (k = 50)</a:t>
+            </a:r>
+          </a:p>
+        </p:txBody>
+      </p:sp>
+      <p:graphicFrame>
+        <p:nvGraphicFramePr>
+          <p:cNvPr id="4" name="Content Placeholder 3">
+            <a:extLst>
+              <a:ext uri="{FF2B5EF4-FFF2-40B4-BE49-F238E27FC236}">
+                <a16:creationId xmlns:a16="http://schemas.microsoft.com/office/drawing/2014/main" id="{908340B6-2CC9-4B95-B2DE-D6E6155B8EAC}"/>
+              </a:ext>
+            </a:extLst>
+          </p:cNvPr>
+          <p:cNvGraphicFramePr>
+            <a:graphicFrameLocks noGrp="1"/>
+          </p:cNvGraphicFramePr>
+          <p:nvPr>
+            <p:ph idx="1"/>
+            <p:extLst>
+              <p:ext uri="{D42A27DB-BD31-4B8C-83A1-F6EECF244321}">
+                <p14:modId xmlns:p14="http://schemas.microsoft.com/office/powerpoint/2010/main" val="2073317362"/>
+              </p:ext>
+            </p:extLst>
+          </p:nvPr>
+        </p:nvGraphicFramePr>
+        <p:xfrm>
+          <a:off x="838198" y="1835020"/>
+          <a:ext cx="10515600" cy="4128135"/>
+        </p:xfrm>
+        <a:graphic>
+          <a:graphicData uri="http://schemas.openxmlformats.org/drawingml/2006/table">
+            <a:tbl>
+              <a:tblPr>
+                <a:tableStyleId>{3B4B98B0-60AC-42C2-AFA5-B58CD77FA1E5}</a:tableStyleId>
+              </a:tblPr>
+              <a:tblGrid>
+                <a:gridCol w="2103120">
+                  <a:extLst>
+                    <a:ext uri="{9D8B030D-6E8A-4147-A177-3AD203B41FA5}">
+                      <a16:colId xmlns:a16="http://schemas.microsoft.com/office/drawing/2014/main" val="3731036267"/>
+                    </a:ext>
+                  </a:extLst>
+                </a:gridCol>
+                <a:gridCol w="2103120">
+                  <a:extLst>
+                    <a:ext uri="{9D8B030D-6E8A-4147-A177-3AD203B41FA5}">
+                      <a16:colId xmlns:a16="http://schemas.microsoft.com/office/drawing/2014/main" val="2555341812"/>
+                    </a:ext>
+                  </a:extLst>
+                </a:gridCol>
+                <a:gridCol w="2103120">
+                  <a:extLst>
+                    <a:ext uri="{9D8B030D-6E8A-4147-A177-3AD203B41FA5}">
+                      <a16:colId xmlns:a16="http://schemas.microsoft.com/office/drawing/2014/main" val="1052258667"/>
+                    </a:ext>
+                  </a:extLst>
+                </a:gridCol>
+                <a:gridCol w="2103120">
+                  <a:extLst>
+                    <a:ext uri="{9D8B030D-6E8A-4147-A177-3AD203B41FA5}">
+                      <a16:colId xmlns:a16="http://schemas.microsoft.com/office/drawing/2014/main" val="2132033456"/>
+                    </a:ext>
+                  </a:extLst>
+                </a:gridCol>
+                <a:gridCol w="2103120">
+                  <a:extLst>
+                    <a:ext uri="{9D8B030D-6E8A-4147-A177-3AD203B41FA5}">
+                      <a16:colId xmlns:a16="http://schemas.microsoft.com/office/drawing/2014/main" val="1342537409"/>
+                    </a:ext>
+                  </a:extLst>
+                </a:gridCol>
+              </a:tblGrid>
+              <a:tr h="303634">
+                <a:tc>
+                  <a:txBody>
+                    <a:bodyPr/>
+                    <a:lstStyle/>
+                    <a:p>
+                      <a:pPr algn="l" fontAlgn="b"/>
+                      <a:r>
+                        <a:rPr lang="en-US" sz="2400" b="1" i="0" u="none" strike="noStrike" dirty="0">
+                          <a:solidFill>
+                            <a:srgbClr val="000000"/>
+                          </a:solidFill>
+                          <a:effectLst/>
+                          <a:latin typeface="Calibri" panose="020F0502020204030204" pitchFamily="34" charset="0"/>
+                        </a:rPr>
+                        <a:t>Topic 3</a:t>
+                      </a:r>
+                    </a:p>
+                  </a:txBody>
+                  <a:tcPr marL="9525" marR="9525" marT="9525" marB="0" anchor="b">
+                    <a:lnB w="12700" cap="flat" cmpd="sng" algn="ctr">
+                      <a:solidFill>
+                        <a:schemeClr val="accent1">
+                          <a:lumMod val="60000"/>
+                          <a:lumOff val="40000"/>
+                        </a:schemeClr>
+                      </a:solidFill>
+                      <a:prstDash val="solid"/>
+                      <a:round/>
+                      <a:headEnd type="none" w="med" len="med"/>
+                      <a:tailEnd type="none" w="med" len="med"/>
+                    </a:lnB>
+                  </a:tcPr>
+                </a:tc>
+                <a:tc>
+                  <a:txBody>
+                    <a:bodyPr/>
+                    <a:lstStyle/>
+                    <a:p>
+                      <a:pPr algn="l" fontAlgn="b"/>
+                      <a:r>
+                        <a:rPr lang="en-US" sz="2400" b="1" i="0" u="none" strike="noStrike" dirty="0">
+                          <a:solidFill>
+                            <a:srgbClr val="000000"/>
+                          </a:solidFill>
+                          <a:effectLst/>
+                          <a:latin typeface="Calibri" panose="020F0502020204030204" pitchFamily="34" charset="0"/>
+                        </a:rPr>
+                        <a:t>Topic 9</a:t>
+                      </a:r>
+                    </a:p>
+                  </a:txBody>
+                  <a:tcPr marL="9525" marR="9525" marT="9525" marB="0" anchor="b">
+                    <a:lnB w="12700" cap="flat" cmpd="sng" algn="ctr">
+                      <a:solidFill>
+                        <a:schemeClr val="accent1">
+                          <a:lumMod val="60000"/>
+                          <a:lumOff val="40000"/>
+                        </a:schemeClr>
+                      </a:solidFill>
+                      <a:prstDash val="solid"/>
+                      <a:round/>
+                      <a:headEnd type="none" w="med" len="med"/>
+                      <a:tailEnd type="none" w="med" len="med"/>
+                    </a:lnB>
+                  </a:tcPr>
+                </a:tc>
+                <a:tc>
+                  <a:txBody>
+                    <a:bodyPr/>
+                    <a:lstStyle/>
+                    <a:p>
+                      <a:pPr algn="l" fontAlgn="b"/>
+                      <a:r>
+                        <a:rPr lang="en-US" sz="2400" b="1" i="0" u="none" strike="noStrike" dirty="0">
+                          <a:solidFill>
+                            <a:srgbClr val="000000"/>
+                          </a:solidFill>
+                          <a:effectLst/>
+                          <a:latin typeface="Calibri" panose="020F0502020204030204" pitchFamily="34" charset="0"/>
+                        </a:rPr>
+                        <a:t>Topic 46</a:t>
+                      </a:r>
+                    </a:p>
+                  </a:txBody>
+                  <a:tcPr marL="9525" marR="9525" marT="9525" marB="0" anchor="b">
+                    <a:lnB w="12700" cap="flat" cmpd="sng" algn="ctr">
+                      <a:solidFill>
+                        <a:schemeClr val="accent1">
+                          <a:lumMod val="60000"/>
+                          <a:lumOff val="40000"/>
+                        </a:schemeClr>
+                      </a:solidFill>
+                      <a:prstDash val="solid"/>
+                      <a:round/>
+                      <a:headEnd type="none" w="med" len="med"/>
+                      <a:tailEnd type="none" w="med" len="med"/>
+                    </a:lnB>
+                  </a:tcPr>
+                </a:tc>
+                <a:tc>
+                  <a:txBody>
+                    <a:bodyPr/>
+                    <a:lstStyle/>
+                    <a:p>
+                      <a:pPr algn="l" fontAlgn="b"/>
+                      <a:r>
+                        <a:rPr lang="en-US" sz="2400" b="1" i="0" u="none" strike="noStrike" dirty="0">
+                          <a:solidFill>
+                            <a:srgbClr val="000000"/>
+                          </a:solidFill>
+                          <a:effectLst/>
+                          <a:latin typeface="Calibri" panose="020F0502020204030204" pitchFamily="34" charset="0"/>
+                        </a:rPr>
+                        <a:t>Topic 37</a:t>
+                      </a:r>
+                    </a:p>
+                  </a:txBody>
+                  <a:tcPr marL="9525" marR="9525" marT="9525" marB="0" anchor="b">
+                    <a:lnB w="12700" cap="flat" cmpd="sng" algn="ctr">
+                      <a:solidFill>
+                        <a:schemeClr val="accent1">
+                          <a:lumMod val="60000"/>
+                          <a:lumOff val="40000"/>
+                        </a:schemeClr>
+                      </a:solidFill>
+                      <a:prstDash val="solid"/>
+                      <a:round/>
+                      <a:headEnd type="none" w="med" len="med"/>
+                      <a:tailEnd type="none" w="med" len="med"/>
+                    </a:lnB>
+                  </a:tcPr>
+                </a:tc>
+                <a:tc>
+                  <a:txBody>
+                    <a:bodyPr/>
+                    <a:lstStyle/>
+                    <a:p>
+                      <a:pPr algn="l" fontAlgn="b"/>
+                      <a:r>
+                        <a:rPr lang="en-US" sz="2400" b="1" i="0" u="none" strike="noStrike" dirty="0">
+                          <a:solidFill>
+                            <a:srgbClr val="000000"/>
+                          </a:solidFill>
+                          <a:effectLst/>
+                          <a:latin typeface="Calibri" panose="020F0502020204030204" pitchFamily="34" charset="0"/>
+                        </a:rPr>
+                        <a:t>Topic 12</a:t>
+                      </a:r>
+                    </a:p>
+                  </a:txBody>
+                  <a:tcPr marL="9525" marR="9525" marT="9525" marB="0" anchor="b">
+                    <a:lnB w="12700" cap="flat" cmpd="sng" algn="ctr">
+                      <a:solidFill>
+                        <a:schemeClr val="accent1">
+                          <a:lumMod val="60000"/>
+                          <a:lumOff val="40000"/>
+                        </a:schemeClr>
+                      </a:solidFill>
+                      <a:prstDash val="solid"/>
+                      <a:round/>
+                      <a:headEnd type="none" w="med" len="med"/>
+                      <a:tailEnd type="none" w="med" len="med"/>
+                    </a:lnB>
+                  </a:tcPr>
+                </a:tc>
+                <a:extLst>
+                  <a:ext uri="{0D108BD9-81ED-4DB2-BD59-A6C34878D82A}">
+                    <a16:rowId xmlns:a16="http://schemas.microsoft.com/office/drawing/2014/main" val="2827662962"/>
+                  </a:ext>
+                </a:extLst>
+              </a:tr>
+              <a:tr h="303634">
+                <a:tc>
+                  <a:txBody>
+                    <a:bodyPr/>
+                    <a:lstStyle/>
+                    <a:p>
+                      <a:pPr algn="l" fontAlgn="b"/>
+                      <a:r>
+                        <a:rPr lang="en-US" sz="2400" b="0" i="0" u="none" strike="noStrike">
+                          <a:solidFill>
+                            <a:srgbClr val="000000"/>
+                          </a:solidFill>
+                          <a:effectLst/>
+                          <a:latin typeface="Calibri" panose="020F0502020204030204" pitchFamily="34" charset="0"/>
+                        </a:rPr>
+                        <a:t>data</a:t>
+                      </a:r>
+                    </a:p>
+                  </a:txBody>
+                  <a:tcPr marL="9525" marR="9525" marT="9525" marB="0" anchor="b">
+                    <a:lnT w="12700" cap="flat" cmpd="sng" algn="ctr">
+                      <a:solidFill>
+                        <a:schemeClr val="accent1">
+                          <a:lumMod val="60000"/>
+                          <a:lumOff val="40000"/>
+                        </a:schemeClr>
+                      </a:solidFill>
+                      <a:prstDash val="solid"/>
+                      <a:round/>
+                      <a:headEnd type="none" w="med" len="med"/>
+                      <a:tailEnd type="none" w="med" len="med"/>
+                    </a:lnT>
+                  </a:tcPr>
+                </a:tc>
+                <a:tc>
+                  <a:txBody>
+                    <a:bodyPr/>
+                    <a:lstStyle/>
+                    <a:p>
+                      <a:pPr algn="l" fontAlgn="b"/>
+                      <a:r>
+                        <a:rPr lang="en-US" sz="2400" b="0" i="0" u="none" strike="noStrike">
+                          <a:solidFill>
+                            <a:srgbClr val="000000"/>
+                          </a:solidFill>
+                          <a:effectLst/>
+                          <a:latin typeface="Calibri" panose="020F0502020204030204" pitchFamily="34" charset="0"/>
+                        </a:rPr>
+                        <a:t>business</a:t>
+                      </a:r>
+                    </a:p>
+                  </a:txBody>
+                  <a:tcPr marL="9525" marR="9525" marT="9525" marB="0" anchor="b">
+                    <a:lnT w="12700" cap="flat" cmpd="sng" algn="ctr">
+                      <a:solidFill>
+                        <a:schemeClr val="accent1">
+                          <a:lumMod val="60000"/>
+                          <a:lumOff val="40000"/>
+                        </a:schemeClr>
+                      </a:solidFill>
+                      <a:prstDash val="solid"/>
+                      <a:round/>
+                      <a:headEnd type="none" w="med" len="med"/>
+                      <a:tailEnd type="none" w="med" len="med"/>
+                    </a:lnT>
+                  </a:tcPr>
+                </a:tc>
+                <a:tc>
+                  <a:txBody>
+                    <a:bodyPr/>
+                    <a:lstStyle/>
+                    <a:p>
+                      <a:pPr algn="l" fontAlgn="b"/>
+                      <a:r>
+                        <a:rPr lang="en-US" sz="2400" b="0" i="0" u="none" strike="noStrike">
+                          <a:solidFill>
+                            <a:srgbClr val="000000"/>
+                          </a:solidFill>
+                          <a:effectLst/>
+                          <a:latin typeface="Calibri" panose="020F0502020204030204" pitchFamily="34" charset="0"/>
+                        </a:rPr>
+                        <a:t>care</a:t>
+                      </a:r>
+                    </a:p>
+                  </a:txBody>
+                  <a:tcPr marL="9525" marR="9525" marT="9525" marB="0" anchor="b">
+                    <a:lnT w="12700" cap="flat" cmpd="sng" algn="ctr">
+                      <a:solidFill>
+                        <a:schemeClr val="accent1">
+                          <a:lumMod val="60000"/>
+                          <a:lumOff val="40000"/>
+                        </a:schemeClr>
+                      </a:solidFill>
+                      <a:prstDash val="solid"/>
+                      <a:round/>
+                      <a:headEnd type="none" w="med" len="med"/>
+                      <a:tailEnd type="none" w="med" len="med"/>
+                    </a:lnT>
+                  </a:tcPr>
+                </a:tc>
+                <a:tc>
+                  <a:txBody>
+                    <a:bodyPr/>
+                    <a:lstStyle/>
+                    <a:p>
+                      <a:pPr algn="l" fontAlgn="b"/>
+                      <a:r>
+                        <a:rPr lang="en-US" sz="2400" b="0" i="0" u="none" strike="noStrike">
+                          <a:solidFill>
+                            <a:srgbClr val="000000"/>
+                          </a:solidFill>
+                          <a:effectLst/>
+                          <a:latin typeface="Calibri" panose="020F0502020204030204" pitchFamily="34" charset="0"/>
+                        </a:rPr>
+                        <a:t>finance</a:t>
+                      </a:r>
+                    </a:p>
+                  </a:txBody>
+                  <a:tcPr marL="9525" marR="9525" marT="9525" marB="0" anchor="b">
+                    <a:lnT w="12700" cap="flat" cmpd="sng" algn="ctr">
+                      <a:solidFill>
+                        <a:schemeClr val="accent1">
+                          <a:lumMod val="60000"/>
+                          <a:lumOff val="40000"/>
+                        </a:schemeClr>
+                      </a:solidFill>
+                      <a:prstDash val="solid"/>
+                      <a:round/>
+                      <a:headEnd type="none" w="med" len="med"/>
+                      <a:tailEnd type="none" w="med" len="med"/>
+                    </a:lnT>
+                  </a:tcPr>
+                </a:tc>
+                <a:tc>
+                  <a:txBody>
+                    <a:bodyPr/>
+                    <a:lstStyle/>
+                    <a:p>
+                      <a:pPr algn="l" fontAlgn="b"/>
+                      <a:r>
+                        <a:rPr lang="en-US" sz="2400" b="0" i="0" u="none" strike="noStrike">
+                          <a:solidFill>
+                            <a:srgbClr val="000000"/>
+                          </a:solidFill>
+                          <a:effectLst/>
+                          <a:latin typeface="Calibri" panose="020F0502020204030204" pitchFamily="34" charset="0"/>
+                        </a:rPr>
+                        <a:t>data</a:t>
+                      </a:r>
+                    </a:p>
+                  </a:txBody>
+                  <a:tcPr marL="9525" marR="9525" marT="9525" marB="0" anchor="b">
+                    <a:lnT w="12700" cap="flat" cmpd="sng" algn="ctr">
+                      <a:solidFill>
+                        <a:schemeClr val="accent1">
+                          <a:lumMod val="60000"/>
+                          <a:lumOff val="40000"/>
+                        </a:schemeClr>
+                      </a:solidFill>
+                      <a:prstDash val="solid"/>
+                      <a:round/>
+                      <a:headEnd type="none" w="med" len="med"/>
+                      <a:tailEnd type="none" w="med" len="med"/>
+                    </a:lnT>
+                  </a:tcPr>
+                </a:tc>
+                <a:extLst>
+                  <a:ext uri="{0D108BD9-81ED-4DB2-BD59-A6C34878D82A}">
+                    <a16:rowId xmlns:a16="http://schemas.microsoft.com/office/drawing/2014/main" val="2894263183"/>
+                  </a:ext>
+                </a:extLst>
+              </a:tr>
+              <a:tr h="303634">
+                <a:tc>
+                  <a:txBody>
+                    <a:bodyPr/>
+                    <a:lstStyle/>
+                    <a:p>
+                      <a:pPr algn="l" fontAlgn="b"/>
+                      <a:r>
+                        <a:rPr lang="en-US" sz="2400" b="0" i="0" u="none" strike="noStrike">
+                          <a:solidFill>
+                            <a:srgbClr val="000000"/>
+                          </a:solidFill>
+                          <a:effectLst/>
+                          <a:latin typeface="Calibri" panose="020F0502020204030204" pitchFamily="34" charset="0"/>
+                        </a:rPr>
+                        <a:t>business</a:t>
+                      </a:r>
+                    </a:p>
+                  </a:txBody>
+                  <a:tcPr marL="9525" marR="9525" marT="9525" marB="0" anchor="b"/>
+                </a:tc>
+                <a:tc>
+                  <a:txBody>
+                    <a:bodyPr/>
+                    <a:lstStyle/>
+                    <a:p>
+                      <a:pPr algn="l" fontAlgn="b"/>
+                      <a:r>
+                        <a:rPr lang="en-US" sz="2400" b="0" i="0" u="none" strike="noStrike">
+                          <a:solidFill>
+                            <a:srgbClr val="000000"/>
+                          </a:solidFill>
+                          <a:effectLst/>
+                          <a:latin typeface="Calibri" panose="020F0502020204030204" pitchFamily="34" charset="0"/>
+                        </a:rPr>
+                        <a:t>finance</a:t>
+                      </a:r>
+                    </a:p>
+                  </a:txBody>
+                  <a:tcPr marL="9525" marR="9525" marT="9525" marB="0" anchor="b"/>
+                </a:tc>
+                <a:tc>
+                  <a:txBody>
+                    <a:bodyPr/>
+                    <a:lstStyle/>
+                    <a:p>
+                      <a:pPr algn="l" fontAlgn="b"/>
+                      <a:r>
+                        <a:rPr lang="en-US" sz="2400" b="0" i="0" u="none" strike="noStrike">
+                          <a:solidFill>
+                            <a:srgbClr val="000000"/>
+                          </a:solidFill>
+                          <a:effectLst/>
+                          <a:latin typeface="Calibri" panose="020F0502020204030204" pitchFamily="34" charset="0"/>
+                        </a:rPr>
+                        <a:t>health</a:t>
+                      </a:r>
+                    </a:p>
+                  </a:txBody>
+                  <a:tcPr marL="9525" marR="9525" marT="9525" marB="0" anchor="b"/>
+                </a:tc>
+                <a:tc>
+                  <a:txBody>
+                    <a:bodyPr/>
+                    <a:lstStyle/>
+                    <a:p>
+                      <a:pPr algn="l" fontAlgn="b"/>
+                      <a:r>
+                        <a:rPr lang="en-US" sz="2400" b="0" i="0" u="none" strike="noStrike">
+                          <a:solidFill>
+                            <a:srgbClr val="000000"/>
+                          </a:solidFill>
+                          <a:effectLst/>
+                          <a:latin typeface="Calibri" panose="020F0502020204030204" pitchFamily="34" charset="0"/>
+                        </a:rPr>
+                        <a:t>team</a:t>
+                      </a:r>
+                    </a:p>
+                  </a:txBody>
+                  <a:tcPr marL="9525" marR="9525" marT="9525" marB="0" anchor="b"/>
+                </a:tc>
+                <a:tc>
+                  <a:txBody>
+                    <a:bodyPr/>
+                    <a:lstStyle/>
+                    <a:p>
+                      <a:pPr algn="l" fontAlgn="b"/>
+                      <a:r>
+                        <a:rPr lang="en-US" sz="2400" b="0" i="0" u="none" strike="noStrike">
+                          <a:solidFill>
+                            <a:srgbClr val="000000"/>
+                          </a:solidFill>
+                          <a:effectLst/>
+                          <a:latin typeface="Calibri" panose="020F0502020204030204" pitchFamily="34" charset="0"/>
+                        </a:rPr>
+                        <a:t>status</a:t>
+                      </a:r>
+                    </a:p>
+                  </a:txBody>
+                  <a:tcPr marL="9525" marR="9525" marT="9525" marB="0" anchor="b"/>
+                </a:tc>
+                <a:extLst>
+                  <a:ext uri="{0D108BD9-81ED-4DB2-BD59-A6C34878D82A}">
+                    <a16:rowId xmlns:a16="http://schemas.microsoft.com/office/drawing/2014/main" val="2276288165"/>
+                  </a:ext>
+                </a:extLst>
+              </a:tr>
+              <a:tr h="303634">
+                <a:tc>
+                  <a:txBody>
+                    <a:bodyPr/>
+                    <a:lstStyle/>
+                    <a:p>
+                      <a:pPr algn="l" fontAlgn="b"/>
+                      <a:r>
+                        <a:rPr lang="en-US" sz="2400" b="0" i="0" u="none" strike="noStrike">
+                          <a:solidFill>
+                            <a:srgbClr val="000000"/>
+                          </a:solidFill>
+                          <a:effectLst/>
+                          <a:latin typeface="Calibri" panose="020F0502020204030204" pitchFamily="34" charset="0"/>
+                        </a:rPr>
+                        <a:t>information</a:t>
+                      </a:r>
+                    </a:p>
+                  </a:txBody>
+                  <a:tcPr marL="9525" marR="9525" marT="9525" marB="0" anchor="b"/>
+                </a:tc>
+                <a:tc>
+                  <a:txBody>
+                    <a:bodyPr/>
+                    <a:lstStyle/>
+                    <a:p>
+                      <a:pPr algn="l" fontAlgn="b"/>
+                      <a:r>
+                        <a:rPr lang="en-US" sz="2400" b="0" i="0" u="none" strike="noStrike">
+                          <a:solidFill>
+                            <a:srgbClr val="000000"/>
+                          </a:solidFill>
+                          <a:effectLst/>
+                          <a:latin typeface="Calibri" panose="020F0502020204030204" pitchFamily="34" charset="0"/>
+                        </a:rPr>
+                        <a:t>operations</a:t>
+                      </a:r>
+                    </a:p>
+                  </a:txBody>
+                  <a:tcPr marL="9525" marR="9525" marT="9525" marB="0" anchor="b"/>
+                </a:tc>
+                <a:tc>
+                  <a:txBody>
+                    <a:bodyPr/>
+                    <a:lstStyle/>
+                    <a:p>
+                      <a:pPr algn="l" fontAlgn="b"/>
+                      <a:r>
+                        <a:rPr lang="en-US" sz="2400" b="0" i="0" u="none" strike="noStrike">
+                          <a:solidFill>
+                            <a:srgbClr val="000000"/>
+                          </a:solidFill>
+                          <a:effectLst/>
+                          <a:latin typeface="Calibri" panose="020F0502020204030204" pitchFamily="34" charset="0"/>
+                        </a:rPr>
+                        <a:t>role</a:t>
+                      </a:r>
+                    </a:p>
+                  </a:txBody>
+                  <a:tcPr marL="9525" marR="9525" marT="9525" marB="0" anchor="b"/>
+                </a:tc>
+                <a:tc>
+                  <a:txBody>
+                    <a:bodyPr/>
+                    <a:lstStyle/>
+                    <a:p>
+                      <a:pPr algn="l" fontAlgn="b"/>
+                      <a:r>
+                        <a:rPr lang="en-US" sz="2400" b="0" i="0" u="none" strike="noStrike">
+                          <a:solidFill>
+                            <a:srgbClr val="000000"/>
+                          </a:solidFill>
+                          <a:effectLst/>
+                          <a:latin typeface="Calibri" panose="020F0502020204030204" pitchFamily="34" charset="0"/>
+                        </a:rPr>
+                        <a:t>customers</a:t>
+                      </a:r>
+                    </a:p>
+                  </a:txBody>
+                  <a:tcPr marL="9525" marR="9525" marT="9525" marB="0" anchor="b"/>
+                </a:tc>
+                <a:tc>
+                  <a:txBody>
+                    <a:bodyPr/>
+                    <a:lstStyle/>
+                    <a:p>
+                      <a:pPr algn="l" fontAlgn="b"/>
+                      <a:r>
+                        <a:rPr lang="en-US" sz="2400" b="0" i="0" u="none" strike="noStrike">
+                          <a:solidFill>
+                            <a:srgbClr val="000000"/>
+                          </a:solidFill>
+                          <a:effectLst/>
+                          <a:latin typeface="Calibri" panose="020F0502020204030204" pitchFamily="34" charset="0"/>
+                        </a:rPr>
+                        <a:t>protected</a:t>
+                      </a:r>
+                    </a:p>
+                  </a:txBody>
+                  <a:tcPr marL="9525" marR="9525" marT="9525" marB="0" anchor="b"/>
+                </a:tc>
+                <a:extLst>
+                  <a:ext uri="{0D108BD9-81ED-4DB2-BD59-A6C34878D82A}">
+                    <a16:rowId xmlns:a16="http://schemas.microsoft.com/office/drawing/2014/main" val="1913292412"/>
+                  </a:ext>
+                </a:extLst>
+              </a:tr>
+              <a:tr h="303634">
+                <a:tc>
+                  <a:txBody>
+                    <a:bodyPr/>
+                    <a:lstStyle/>
+                    <a:p>
+                      <a:pPr algn="l" fontAlgn="b"/>
+                      <a:r>
+                        <a:rPr lang="en-US" sz="2400" b="0" i="0" u="none" strike="noStrike">
+                          <a:solidFill>
+                            <a:srgbClr val="000000"/>
+                          </a:solidFill>
+                          <a:effectLst/>
+                          <a:latin typeface="Calibri" panose="020F0502020204030204" pitchFamily="34" charset="0"/>
+                        </a:rPr>
+                        <a:t>years</a:t>
+                      </a:r>
+                    </a:p>
+                  </a:txBody>
+                  <a:tcPr marL="9525" marR="9525" marT="9525" marB="0" anchor="b"/>
+                </a:tc>
+                <a:tc>
+                  <a:txBody>
+                    <a:bodyPr/>
+                    <a:lstStyle/>
+                    <a:p>
+                      <a:pPr algn="l" fontAlgn="b"/>
+                      <a:r>
+                        <a:rPr lang="en-US" sz="2400" b="0" i="0" u="none" strike="noStrike" dirty="0">
+                          <a:solidFill>
+                            <a:srgbClr val="000000"/>
+                          </a:solidFill>
+                          <a:effectLst/>
+                          <a:latin typeface="Calibri" panose="020F0502020204030204" pitchFamily="34" charset="0"/>
+                        </a:rPr>
+                        <a:t>accounting</a:t>
+                      </a:r>
+                    </a:p>
+                  </a:txBody>
+                  <a:tcPr marL="9525" marR="9525" marT="9525" marB="0" anchor="b"/>
+                </a:tc>
+                <a:tc>
+                  <a:txBody>
+                    <a:bodyPr/>
+                    <a:lstStyle/>
+                    <a:p>
+                      <a:pPr algn="l" fontAlgn="b"/>
+                      <a:r>
+                        <a:rPr lang="en-US" sz="2400" b="0" i="0" u="none" strike="noStrike">
+                          <a:solidFill>
+                            <a:srgbClr val="000000"/>
+                          </a:solidFill>
+                          <a:effectLst/>
+                          <a:latin typeface="Calibri" panose="020F0502020204030204" pitchFamily="34" charset="0"/>
+                        </a:rPr>
+                        <a:t>skills</a:t>
+                      </a:r>
+                    </a:p>
+                  </a:txBody>
+                  <a:tcPr marL="9525" marR="9525" marT="9525" marB="0" anchor="b"/>
+                </a:tc>
+                <a:tc>
+                  <a:txBody>
+                    <a:bodyPr/>
+                    <a:lstStyle/>
+                    <a:p>
+                      <a:pPr algn="l" fontAlgn="b"/>
+                      <a:r>
+                        <a:rPr lang="en-US" sz="2400" b="0" i="0" u="none" strike="noStrike">
+                          <a:solidFill>
+                            <a:srgbClr val="000000"/>
+                          </a:solidFill>
+                          <a:effectLst/>
+                          <a:latin typeface="Calibri" panose="020F0502020204030204" pitchFamily="34" charset="0"/>
+                        </a:rPr>
+                        <a:t>shipping</a:t>
+                      </a:r>
+                    </a:p>
+                  </a:txBody>
+                  <a:tcPr marL="9525" marR="9525" marT="9525" marB="0" anchor="b"/>
+                </a:tc>
+                <a:tc>
+                  <a:txBody>
+                    <a:bodyPr/>
+                    <a:lstStyle/>
+                    <a:p>
+                      <a:pPr algn="l" fontAlgn="b"/>
+                      <a:r>
+                        <a:rPr lang="en-US" sz="2400" b="0" i="0" u="none" strike="noStrike">
+                          <a:solidFill>
+                            <a:srgbClr val="000000"/>
+                          </a:solidFill>
+                          <a:effectLst/>
+                          <a:latin typeface="Calibri" panose="020F0502020204030204" pitchFamily="34" charset="0"/>
+                        </a:rPr>
+                        <a:t>cloud</a:t>
+                      </a:r>
+                    </a:p>
+                  </a:txBody>
+                  <a:tcPr marL="9525" marR="9525" marT="9525" marB="0" anchor="b"/>
+                </a:tc>
+                <a:extLst>
+                  <a:ext uri="{0D108BD9-81ED-4DB2-BD59-A6C34878D82A}">
+                    <a16:rowId xmlns:a16="http://schemas.microsoft.com/office/drawing/2014/main" val="330431423"/>
+                  </a:ext>
+                </a:extLst>
+              </a:tr>
+              <a:tr h="303634">
+                <a:tc>
+                  <a:txBody>
+                    <a:bodyPr/>
+                    <a:lstStyle/>
+                    <a:p>
+                      <a:pPr algn="l" fontAlgn="b"/>
+                      <a:r>
+                        <a:rPr lang="en-US" sz="2400" b="0" i="0" u="none" strike="noStrike">
+                          <a:solidFill>
+                            <a:srgbClr val="000000"/>
+                          </a:solidFill>
+                          <a:effectLst/>
+                          <a:latin typeface="Calibri" panose="020F0502020204030204" pitchFamily="34" charset="0"/>
+                        </a:rPr>
+                        <a:t>management</a:t>
+                      </a:r>
+                    </a:p>
+                  </a:txBody>
+                  <a:tcPr marL="9525" marR="9525" marT="9525" marB="0" anchor="b"/>
+                </a:tc>
+                <a:tc>
+                  <a:txBody>
+                    <a:bodyPr/>
+                    <a:lstStyle/>
+                    <a:p>
+                      <a:pPr algn="l" fontAlgn="b"/>
+                      <a:r>
+                        <a:rPr lang="en-US" sz="2400" b="0" i="0" u="none" strike="noStrike">
+                          <a:solidFill>
+                            <a:srgbClr val="000000"/>
+                          </a:solidFill>
+                          <a:effectLst/>
+                          <a:latin typeface="Calibri" panose="020F0502020204030204" pitchFamily="34" charset="0"/>
+                        </a:rPr>
+                        <a:t>support</a:t>
+                      </a:r>
+                    </a:p>
+                  </a:txBody>
+                  <a:tcPr marL="9525" marR="9525" marT="9525" marB="0" anchor="b"/>
+                </a:tc>
+                <a:tc>
+                  <a:txBody>
+                    <a:bodyPr/>
+                    <a:lstStyle/>
+                    <a:p>
+                      <a:pPr algn="l" fontAlgn="b"/>
+                      <a:r>
+                        <a:rPr lang="en-US" sz="2400" b="0" i="0" u="none" strike="noStrike">
+                          <a:solidFill>
+                            <a:srgbClr val="000000"/>
+                          </a:solidFill>
+                          <a:effectLst/>
+                          <a:latin typeface="Calibri" panose="020F0502020204030204" pitchFamily="34" charset="0"/>
+                        </a:rPr>
+                        <a:t>home</a:t>
+                      </a:r>
+                    </a:p>
+                  </a:txBody>
+                  <a:tcPr marL="9525" marR="9525" marT="9525" marB="0" anchor="b"/>
+                </a:tc>
+                <a:tc>
+                  <a:txBody>
+                    <a:bodyPr/>
+                    <a:lstStyle/>
+                    <a:p>
+                      <a:pPr algn="l" fontAlgn="b"/>
+                      <a:r>
+                        <a:rPr lang="en-US" sz="2400" b="0" i="0" u="none" strike="noStrike">
+                          <a:solidFill>
+                            <a:srgbClr val="000000"/>
+                          </a:solidFill>
+                          <a:effectLst/>
+                          <a:latin typeface="Calibri" panose="020F0502020204030204" pitchFamily="34" charset="0"/>
+                        </a:rPr>
+                        <a:t>products</a:t>
+                      </a:r>
+                    </a:p>
+                  </a:txBody>
+                  <a:tcPr marL="9525" marR="9525" marT="9525" marB="0" anchor="b"/>
+                </a:tc>
+                <a:tc>
+                  <a:txBody>
+                    <a:bodyPr/>
+                    <a:lstStyle/>
+                    <a:p>
+                      <a:pPr algn="l" fontAlgn="b"/>
+                      <a:r>
+                        <a:rPr lang="en-US" sz="2400" b="0" i="0" u="none" strike="noStrike">
+                          <a:solidFill>
+                            <a:srgbClr val="000000"/>
+                          </a:solidFill>
+                          <a:effectLst/>
+                          <a:latin typeface="Calibri" panose="020F0502020204030204" pitchFamily="34" charset="0"/>
+                        </a:rPr>
+                        <a:t>disability</a:t>
+                      </a:r>
+                    </a:p>
+                  </a:txBody>
+                  <a:tcPr marL="9525" marR="9525" marT="9525" marB="0" anchor="b"/>
+                </a:tc>
+                <a:extLst>
+                  <a:ext uri="{0D108BD9-81ED-4DB2-BD59-A6C34878D82A}">
+                    <a16:rowId xmlns:a16="http://schemas.microsoft.com/office/drawing/2014/main" val="2121785788"/>
+                  </a:ext>
+                </a:extLst>
+              </a:tr>
+              <a:tr h="303634">
+                <a:tc>
+                  <a:txBody>
+                    <a:bodyPr/>
+                    <a:lstStyle/>
+                    <a:p>
+                      <a:pPr algn="l" fontAlgn="b"/>
+                      <a:r>
+                        <a:rPr lang="en-US" sz="2400" b="0" i="0" u="none" strike="noStrike">
+                          <a:solidFill>
+                            <a:srgbClr val="000000"/>
+                          </a:solidFill>
+                          <a:effectLst/>
+                          <a:latin typeface="Calibri" panose="020F0502020204030204" pitchFamily="34" charset="0"/>
+                        </a:rPr>
+                        <a:t>technology</a:t>
+                      </a:r>
+                    </a:p>
+                  </a:txBody>
+                  <a:tcPr marL="9525" marR="9525" marT="9525" marB="0" anchor="b"/>
+                </a:tc>
+                <a:tc>
+                  <a:txBody>
+                    <a:bodyPr/>
+                    <a:lstStyle/>
+                    <a:p>
+                      <a:pPr algn="l" fontAlgn="b"/>
+                      <a:r>
+                        <a:rPr lang="en-US" sz="2400" b="0" i="0" u="none" strike="noStrike">
+                          <a:solidFill>
+                            <a:srgbClr val="000000"/>
+                          </a:solidFill>
+                          <a:effectLst/>
+                          <a:latin typeface="Calibri" panose="020F0502020204030204" pitchFamily="34" charset="0"/>
+                        </a:rPr>
+                        <a:t>forecast</a:t>
+                      </a:r>
+                    </a:p>
+                  </a:txBody>
+                  <a:tcPr marL="9525" marR="9525" marT="9525" marB="0" anchor="b"/>
+                </a:tc>
+                <a:tc>
+                  <a:txBody>
+                    <a:bodyPr/>
+                    <a:lstStyle/>
+                    <a:p>
+                      <a:pPr algn="l" fontAlgn="b"/>
+                      <a:r>
+                        <a:rPr lang="en-US" sz="2400" b="0" i="0" u="none" strike="noStrike">
+                          <a:solidFill>
+                            <a:srgbClr val="000000"/>
+                          </a:solidFill>
+                          <a:effectLst/>
+                          <a:latin typeface="Calibri" panose="020F0502020204030204" pitchFamily="34" charset="0"/>
+                        </a:rPr>
+                        <a:t>members</a:t>
+                      </a:r>
+                    </a:p>
+                  </a:txBody>
+                  <a:tcPr marL="9525" marR="9525" marT="9525" marB="0" anchor="b"/>
+                </a:tc>
+                <a:tc>
+                  <a:txBody>
+                    <a:bodyPr/>
+                    <a:lstStyle/>
+                    <a:p>
+                      <a:pPr algn="l" fontAlgn="b"/>
+                      <a:r>
+                        <a:rPr lang="en-US" sz="2400" b="0" i="0" u="none" strike="noStrike">
+                          <a:solidFill>
+                            <a:srgbClr val="000000"/>
+                          </a:solidFill>
+                          <a:effectLst/>
+                          <a:latin typeface="Calibri" panose="020F0502020204030204" pitchFamily="34" charset="0"/>
+                        </a:rPr>
+                        <a:t>support</a:t>
+                      </a:r>
+                    </a:p>
+                  </a:txBody>
+                  <a:tcPr marL="9525" marR="9525" marT="9525" marB="0" anchor="b"/>
+                </a:tc>
+                <a:tc>
+                  <a:txBody>
+                    <a:bodyPr/>
+                    <a:lstStyle/>
+                    <a:p>
+                      <a:pPr algn="l" fontAlgn="b"/>
+                      <a:r>
+                        <a:rPr lang="en-US" sz="2400" b="0" i="0" u="none" strike="noStrike">
+                          <a:solidFill>
+                            <a:srgbClr val="000000"/>
+                          </a:solidFill>
+                          <a:effectLst/>
+                          <a:latin typeface="Calibri" panose="020F0502020204030204" pitchFamily="34" charset="0"/>
+                        </a:rPr>
+                        <a:t>medical</a:t>
+                      </a:r>
+                    </a:p>
+                  </a:txBody>
+                  <a:tcPr marL="9525" marR="9525" marT="9525" marB="0" anchor="b"/>
+                </a:tc>
+                <a:extLst>
+                  <a:ext uri="{0D108BD9-81ED-4DB2-BD59-A6C34878D82A}">
+                    <a16:rowId xmlns:a16="http://schemas.microsoft.com/office/drawing/2014/main" val="946385162"/>
+                  </a:ext>
+                </a:extLst>
+              </a:tr>
+              <a:tr h="303634">
+                <a:tc>
+                  <a:txBody>
+                    <a:bodyPr/>
+                    <a:lstStyle/>
+                    <a:p>
+                      <a:pPr algn="l" fontAlgn="b"/>
+                      <a:r>
+                        <a:rPr lang="en-US" sz="2400" b="0" i="0" u="none" strike="noStrike">
+                          <a:solidFill>
+                            <a:srgbClr val="000000"/>
+                          </a:solidFill>
+                          <a:effectLst/>
+                          <a:latin typeface="Calibri" panose="020F0502020204030204" pitchFamily="34" charset="0"/>
+                        </a:rPr>
+                        <a:t>time</a:t>
+                      </a:r>
+                    </a:p>
+                  </a:txBody>
+                  <a:tcPr marL="9525" marR="9525" marT="9525" marB="0" anchor="b"/>
+                </a:tc>
+                <a:tc>
+                  <a:txBody>
+                    <a:bodyPr/>
+                    <a:lstStyle/>
+                    <a:p>
+                      <a:pPr algn="l" fontAlgn="b"/>
+                      <a:r>
+                        <a:rPr lang="en-US" sz="2400" b="0" i="0" u="none" strike="noStrike">
+                          <a:solidFill>
+                            <a:srgbClr val="000000"/>
+                          </a:solidFill>
+                          <a:effectLst/>
+                          <a:latin typeface="Calibri" panose="020F0502020204030204" pitchFamily="34" charset="0"/>
+                        </a:rPr>
+                        <a:t>analyst</a:t>
+                      </a:r>
+                    </a:p>
+                  </a:txBody>
+                  <a:tcPr marL="9525" marR="9525" marT="9525" marB="0" anchor="b"/>
+                </a:tc>
+                <a:tc>
+                  <a:txBody>
+                    <a:bodyPr/>
+                    <a:lstStyle/>
+                    <a:p>
+                      <a:pPr algn="l" fontAlgn="b"/>
+                      <a:r>
+                        <a:rPr lang="en-US" sz="2400" b="0" i="0" u="none" strike="noStrike">
+                          <a:solidFill>
+                            <a:srgbClr val="000000"/>
+                          </a:solidFill>
+                          <a:effectLst/>
+                          <a:latin typeface="Calibri" panose="020F0502020204030204" pitchFamily="34" charset="0"/>
+                        </a:rPr>
+                        <a:t>healthcare</a:t>
+                      </a:r>
+                    </a:p>
+                  </a:txBody>
+                  <a:tcPr marL="9525" marR="9525" marT="9525" marB="0" anchor="b"/>
+                </a:tc>
+                <a:tc>
+                  <a:txBody>
+                    <a:bodyPr/>
+                    <a:lstStyle/>
+                    <a:p>
+                      <a:pPr algn="l" fontAlgn="b"/>
+                      <a:r>
+                        <a:rPr lang="en-US" sz="2400" b="0" i="0" u="none" strike="noStrike">
+                          <a:solidFill>
+                            <a:srgbClr val="000000"/>
+                          </a:solidFill>
+                          <a:effectLst/>
+                          <a:latin typeface="Calibri" panose="020F0502020204030204" pitchFamily="34" charset="0"/>
+                        </a:rPr>
+                        <a:t>organization</a:t>
+                      </a:r>
+                    </a:p>
+                  </a:txBody>
+                  <a:tcPr marL="9525" marR="9525" marT="9525" marB="0" anchor="b"/>
+                </a:tc>
+                <a:tc>
+                  <a:txBody>
+                    <a:bodyPr/>
+                    <a:lstStyle/>
+                    <a:p>
+                      <a:pPr algn="l" fontAlgn="b"/>
+                      <a:r>
+                        <a:rPr lang="en-US" sz="2400" b="0" i="0" u="none" strike="noStrike">
+                          <a:solidFill>
+                            <a:srgbClr val="000000"/>
+                          </a:solidFill>
+                          <a:effectLst/>
+                          <a:latin typeface="Calibri" panose="020F0502020204030204" pitchFamily="34" charset="0"/>
+                        </a:rPr>
+                        <a:t>team</a:t>
+                      </a:r>
+                    </a:p>
+                  </a:txBody>
+                  <a:tcPr marL="9525" marR="9525" marT="9525" marB="0" anchor="b"/>
+                </a:tc>
+                <a:extLst>
+                  <a:ext uri="{0D108BD9-81ED-4DB2-BD59-A6C34878D82A}">
+                    <a16:rowId xmlns:a16="http://schemas.microsoft.com/office/drawing/2014/main" val="2540218499"/>
+                  </a:ext>
+                </a:extLst>
+              </a:tr>
+              <a:tr h="303634">
+                <a:tc>
+                  <a:txBody>
+                    <a:bodyPr/>
+                    <a:lstStyle/>
+                    <a:p>
+                      <a:pPr algn="l" fontAlgn="b"/>
+                      <a:r>
+                        <a:rPr lang="en-US" sz="2400" b="0" i="0" u="none" strike="noStrike">
+                          <a:solidFill>
+                            <a:srgbClr val="000000"/>
+                          </a:solidFill>
+                          <a:effectLst/>
+                          <a:latin typeface="Calibri" panose="020F0502020204030204" pitchFamily="34" charset="0"/>
+                        </a:rPr>
+                        <a:t>sql</a:t>
+                      </a:r>
+                    </a:p>
+                  </a:txBody>
+                  <a:tcPr marL="9525" marR="9525" marT="9525" marB="0" anchor="b"/>
+                </a:tc>
+                <a:tc>
+                  <a:txBody>
+                    <a:bodyPr/>
+                    <a:lstStyle/>
+                    <a:p>
+                      <a:pPr algn="l" fontAlgn="b"/>
+                      <a:r>
+                        <a:rPr lang="en-US" sz="2400" b="0" i="0" u="none" strike="noStrike">
+                          <a:solidFill>
+                            <a:srgbClr val="000000"/>
+                          </a:solidFill>
+                          <a:effectLst/>
+                          <a:latin typeface="Calibri" panose="020F0502020204030204" pitchFamily="34" charset="0"/>
+                        </a:rPr>
+                        <a:t>analysis</a:t>
+                      </a:r>
+                    </a:p>
+                  </a:txBody>
+                  <a:tcPr marL="9525" marR="9525" marT="9525" marB="0" anchor="b"/>
+                </a:tc>
+                <a:tc>
+                  <a:txBody>
+                    <a:bodyPr/>
+                    <a:lstStyle/>
+                    <a:p>
+                      <a:pPr algn="l" fontAlgn="b"/>
+                      <a:r>
+                        <a:rPr lang="en-US" sz="2400" b="0" i="0" u="none" strike="noStrike">
+                          <a:solidFill>
+                            <a:srgbClr val="000000"/>
+                          </a:solidFill>
+                          <a:effectLst/>
+                          <a:latin typeface="Calibri" panose="020F0502020204030204" pitchFamily="34" charset="0"/>
+                        </a:rPr>
+                        <a:t>knowledge</a:t>
+                      </a:r>
+                    </a:p>
+                  </a:txBody>
+                  <a:tcPr marL="9525" marR="9525" marT="9525" marB="0" anchor="b"/>
+                </a:tc>
+                <a:tc>
+                  <a:txBody>
+                    <a:bodyPr/>
+                    <a:lstStyle/>
+                    <a:p>
+                      <a:pPr algn="l" fontAlgn="b"/>
+                      <a:r>
+                        <a:rPr lang="en-US" sz="2400" b="0" i="0" u="none" strike="noStrike">
+                          <a:solidFill>
+                            <a:srgbClr val="000000"/>
+                          </a:solidFill>
+                          <a:effectLst/>
+                          <a:latin typeface="Calibri" panose="020F0502020204030204" pitchFamily="34" charset="0"/>
+                        </a:rPr>
+                        <a:t>integrity</a:t>
+                      </a:r>
+                    </a:p>
+                  </a:txBody>
+                  <a:tcPr marL="9525" marR="9525" marT="9525" marB="0" anchor="b"/>
+                </a:tc>
+                <a:tc>
+                  <a:txBody>
+                    <a:bodyPr/>
+                    <a:lstStyle/>
+                    <a:p>
+                      <a:pPr algn="l" fontAlgn="b"/>
+                      <a:r>
+                        <a:rPr lang="en-US" sz="2400" b="0" i="0" u="none" strike="noStrike">
+                          <a:solidFill>
+                            <a:srgbClr val="000000"/>
+                          </a:solidFill>
+                          <a:effectLst/>
+                          <a:latin typeface="Calibri" panose="020F0502020204030204" pitchFamily="34" charset="0"/>
+                        </a:rPr>
+                        <a:t>customers</a:t>
+                      </a:r>
+                    </a:p>
+                  </a:txBody>
+                  <a:tcPr marL="9525" marR="9525" marT="9525" marB="0" anchor="b"/>
+                </a:tc>
+                <a:extLst>
+                  <a:ext uri="{0D108BD9-81ED-4DB2-BD59-A6C34878D82A}">
+                    <a16:rowId xmlns:a16="http://schemas.microsoft.com/office/drawing/2014/main" val="3238101484"/>
+                  </a:ext>
+                </a:extLst>
+              </a:tr>
+              <a:tr h="303634">
+                <a:tc>
+                  <a:txBody>
+                    <a:bodyPr/>
+                    <a:lstStyle/>
+                    <a:p>
+                      <a:pPr algn="l" fontAlgn="b"/>
+                      <a:r>
+                        <a:rPr lang="en-US" sz="2400" b="0" i="0" u="none" strike="noStrike">
+                          <a:solidFill>
+                            <a:srgbClr val="000000"/>
+                          </a:solidFill>
+                          <a:effectLst/>
+                          <a:latin typeface="Calibri" panose="020F0502020204030204" pitchFamily="34" charset="0"/>
+                        </a:rPr>
+                        <a:t>full</a:t>
+                      </a:r>
+                    </a:p>
+                  </a:txBody>
+                  <a:tcPr marL="9525" marR="9525" marT="9525" marB="0" anchor="b"/>
+                </a:tc>
+                <a:tc>
+                  <a:txBody>
+                    <a:bodyPr/>
+                    <a:lstStyle/>
+                    <a:p>
+                      <a:pPr algn="l" fontAlgn="b"/>
+                      <a:r>
+                        <a:rPr lang="en-US" sz="2400" b="0" i="0" u="none" strike="noStrike">
+                          <a:solidFill>
+                            <a:srgbClr val="000000"/>
+                          </a:solidFill>
+                          <a:effectLst/>
+                          <a:latin typeface="Calibri" panose="020F0502020204030204" pitchFamily="34" charset="0"/>
+                        </a:rPr>
+                        <a:t>new</a:t>
+                      </a:r>
+                    </a:p>
+                  </a:txBody>
+                  <a:tcPr marL="9525" marR="9525" marT="9525" marB="0" anchor="b"/>
+                </a:tc>
+                <a:tc>
+                  <a:txBody>
+                    <a:bodyPr/>
+                    <a:lstStyle/>
+                    <a:p>
+                      <a:pPr algn="l" fontAlgn="b"/>
+                      <a:r>
+                        <a:rPr lang="en-US" sz="2400" b="0" i="0" u="none" strike="noStrike">
+                          <a:solidFill>
+                            <a:srgbClr val="000000"/>
+                          </a:solidFill>
+                          <a:effectLst/>
+                          <a:latin typeface="Calibri" panose="020F0502020204030204" pitchFamily="34" charset="0"/>
+                        </a:rPr>
+                        <a:t>patient</a:t>
+                      </a:r>
+                    </a:p>
+                  </a:txBody>
+                  <a:tcPr marL="9525" marR="9525" marT="9525" marB="0" anchor="b"/>
+                </a:tc>
+                <a:tc>
+                  <a:txBody>
+                    <a:bodyPr/>
+                    <a:lstStyle/>
+                    <a:p>
+                      <a:pPr algn="l" fontAlgn="b"/>
+                      <a:r>
+                        <a:rPr lang="en-US" sz="2400" b="0" i="0" u="none" strike="noStrike">
+                          <a:solidFill>
+                            <a:srgbClr val="000000"/>
+                          </a:solidFill>
+                          <a:effectLst/>
+                          <a:latin typeface="Calibri" panose="020F0502020204030204" pitchFamily="34" charset="0"/>
+                        </a:rPr>
+                        <a:t>share</a:t>
+                      </a:r>
+                    </a:p>
+                  </a:txBody>
+                  <a:tcPr marL="9525" marR="9525" marT="9525" marB="0" anchor="b"/>
+                </a:tc>
+                <a:tc>
+                  <a:txBody>
+                    <a:bodyPr/>
+                    <a:lstStyle/>
+                    <a:p>
+                      <a:pPr algn="l" fontAlgn="b"/>
+                      <a:r>
+                        <a:rPr lang="en-US" sz="2400" b="0" i="0" u="none" strike="noStrike">
+                          <a:solidFill>
+                            <a:srgbClr val="000000"/>
+                          </a:solidFill>
+                          <a:effectLst/>
+                          <a:latin typeface="Calibri" panose="020F0502020204030204" pitchFamily="34" charset="0"/>
+                        </a:rPr>
+                        <a:t>services</a:t>
+                      </a:r>
+                    </a:p>
+                  </a:txBody>
+                  <a:tcPr marL="9525" marR="9525" marT="9525" marB="0" anchor="b"/>
+                </a:tc>
+                <a:extLst>
+                  <a:ext uri="{0D108BD9-81ED-4DB2-BD59-A6C34878D82A}">
+                    <a16:rowId xmlns:a16="http://schemas.microsoft.com/office/drawing/2014/main" val="3424389576"/>
+                  </a:ext>
+                </a:extLst>
+              </a:tr>
+              <a:tr h="303634">
+                <a:tc>
+                  <a:txBody>
+                    <a:bodyPr/>
+                    <a:lstStyle/>
+                    <a:p>
+                      <a:pPr algn="l" fontAlgn="b"/>
+                      <a:r>
+                        <a:rPr lang="en-US" sz="2400" b="0" i="0" u="none" strike="noStrike">
+                          <a:solidFill>
+                            <a:srgbClr val="000000"/>
+                          </a:solidFill>
+                          <a:effectLst/>
+                          <a:latin typeface="Calibri" panose="020F0502020204030204" pitchFamily="34" charset="0"/>
+                        </a:rPr>
+                        <a:t>solutions</a:t>
+                      </a:r>
+                    </a:p>
+                  </a:txBody>
+                  <a:tcPr marL="9525" marR="9525" marT="9525" marB="0" anchor="b"/>
+                </a:tc>
+                <a:tc>
+                  <a:txBody>
+                    <a:bodyPr/>
+                    <a:lstStyle/>
+                    <a:p>
+                      <a:pPr algn="l" fontAlgn="b"/>
+                      <a:r>
+                        <a:rPr lang="en-US" sz="2400" b="0" i="0" u="none" strike="noStrike">
+                          <a:solidFill>
+                            <a:srgbClr val="000000"/>
+                          </a:solidFill>
+                          <a:effectLst/>
+                          <a:latin typeface="Calibri" panose="020F0502020204030204" pitchFamily="34" charset="0"/>
+                        </a:rPr>
+                        <a:t>management</a:t>
+                      </a:r>
+                    </a:p>
+                  </a:txBody>
+                  <a:tcPr marL="9525" marR="9525" marT="9525" marB="0" anchor="b"/>
+                </a:tc>
+                <a:tc>
+                  <a:txBody>
+                    <a:bodyPr/>
+                    <a:lstStyle/>
+                    <a:p>
+                      <a:pPr algn="l" fontAlgn="b"/>
+                      <a:r>
+                        <a:rPr lang="en-US" sz="2400" b="0" i="0" u="none" strike="noStrike">
+                          <a:solidFill>
+                            <a:srgbClr val="000000"/>
+                          </a:solidFill>
+                          <a:effectLst/>
+                          <a:latin typeface="Calibri" panose="020F0502020204030204" pitchFamily="34" charset="0"/>
+                        </a:rPr>
+                        <a:t>clinical</a:t>
+                      </a:r>
+                    </a:p>
+                  </a:txBody>
+                  <a:tcPr marL="9525" marR="9525" marT="9525" marB="0" anchor="b"/>
+                </a:tc>
+                <a:tc>
+                  <a:txBody>
+                    <a:bodyPr/>
+                    <a:lstStyle/>
+                    <a:p>
+                      <a:pPr algn="l" fontAlgn="b"/>
+                      <a:r>
+                        <a:rPr lang="en-US" sz="2400" b="0" i="0" u="none" strike="noStrike">
+                          <a:solidFill>
+                            <a:srgbClr val="000000"/>
+                          </a:solidFill>
+                          <a:effectLst/>
+                          <a:latin typeface="Calibri" panose="020F0502020204030204" pitchFamily="34" charset="0"/>
+                        </a:rPr>
+                        <a:t>positive</a:t>
+                      </a:r>
+                    </a:p>
+                  </a:txBody>
+                  <a:tcPr marL="9525" marR="9525" marT="9525" marB="0" anchor="b"/>
+                </a:tc>
+                <a:tc>
+                  <a:txBody>
+                    <a:bodyPr/>
+                    <a:lstStyle/>
+                    <a:p>
+                      <a:pPr algn="l" fontAlgn="b"/>
+                      <a:r>
+                        <a:rPr lang="en-US" sz="2400" b="0" i="0" u="none" strike="noStrike" dirty="0">
+                          <a:solidFill>
+                            <a:srgbClr val="000000"/>
+                          </a:solidFill>
+                          <a:effectLst/>
+                          <a:latin typeface="Calibri" panose="020F0502020204030204" pitchFamily="34" charset="0"/>
+                        </a:rPr>
+                        <a:t>azure</a:t>
+                      </a:r>
+                    </a:p>
+                  </a:txBody>
+                  <a:tcPr marL="9525" marR="9525" marT="9525" marB="0" anchor="b"/>
+                </a:tc>
+                <a:extLst>
+                  <a:ext uri="{0D108BD9-81ED-4DB2-BD59-A6C34878D82A}">
+                    <a16:rowId xmlns:a16="http://schemas.microsoft.com/office/drawing/2014/main" val="3544599095"/>
+                  </a:ext>
+                </a:extLst>
+              </a:tr>
+            </a:tbl>
+          </a:graphicData>
+        </a:graphic>
+      </p:graphicFrame>
+    </p:spTree>
+    <p:extLst>
+      <p:ext uri="{BB962C8B-B14F-4D97-AF65-F5344CB8AC3E}">
+        <p14:creationId xmlns:p14="http://schemas.microsoft.com/office/powerpoint/2010/main" val="3715044050"/>
+      </p:ext>
+    </p:extLst>
+  </p:cSld>
+  <p:clrMapOvr>
+    <a:masterClrMapping/>
+  </p:clrMapOvr>
+</p:sld>
+</file>
+
+<file path=ppt/slides/slide21.xml><?xml version="1.0" encoding="utf-8"?>
+<p:sld xmlns:a="http://schemas.openxmlformats.org/drawingml/2006/main" xmlns:r="http://schemas.openxmlformats.org/officeDocument/2006/relationships" xmlns:p="http://schemas.openxmlformats.org/presentationml/2006/main">
+  <p:cSld>
+    <p:spTree>
+      <p:nvGrpSpPr>
+        <p:cNvPr id="1" name=""/>
+        <p:cNvGrpSpPr/>
+        <p:nvPr/>
+      </p:nvGrpSpPr>
+      <p:grpSpPr>
+        <a:xfrm>
+          <a:off x="0" y="0"/>
+          <a:ext cx="0" cy="0"/>
+          <a:chOff x="0" y="0"/>
+          <a:chExt cx="0" cy="0"/>
+        </a:xfrm>
+      </p:grpSpPr>
+      <p:sp>
+        <p:nvSpPr>
+          <p:cNvPr id="2" name="Title 1">
+            <a:extLst>
+              <a:ext uri="{FF2B5EF4-FFF2-40B4-BE49-F238E27FC236}">
                 <a16:creationId xmlns:a16="http://schemas.microsoft.com/office/drawing/2014/main" id="{69EB7ECF-A088-47A2-9B6D-A520E90F0F1F}"/>
               </a:ext>
             </a:extLst>
@@ -12813,7 +14251,7 @@
 </p:sld>
 </file>
 
-<file path=ppt/slides/slide21.xml><?xml version="1.0" encoding="utf-8"?>
+<file path=ppt/slides/slide22.xml><?xml version="1.0" encoding="utf-8"?>
 <p:sld xmlns:a="http://schemas.openxmlformats.org/drawingml/2006/main" xmlns:r="http://schemas.openxmlformats.org/officeDocument/2006/relationships" xmlns:p="http://schemas.openxmlformats.org/presentationml/2006/main">
   <p:cSld>
     <p:spTree>
@@ -12893,7 +14331,7 @@
 </p:sld>
 </file>
 
-<file path=ppt/slides/slide22.xml><?xml version="1.0" encoding="utf-8"?>
+<file path=ppt/slides/slide23.xml><?xml version="1.0" encoding="utf-8"?>
 <p:sld xmlns:a="http://schemas.openxmlformats.org/drawingml/2006/main" xmlns:r="http://schemas.openxmlformats.org/officeDocument/2006/relationships" xmlns:p="http://schemas.openxmlformats.org/presentationml/2006/main">
   <p:cSld>
     <p:spTree>
@@ -12976,7 +14414,7 @@
 </p:sld>
 </file>
 
-<file path=ppt/slides/slide23.xml><?xml version="1.0" encoding="utf-8"?>
+<file path=ppt/slides/slide24.xml><?xml version="1.0" encoding="utf-8"?>
 <p:sld xmlns:a="http://schemas.openxmlformats.org/drawingml/2006/main" xmlns:r="http://schemas.openxmlformats.org/officeDocument/2006/relationships" xmlns:p="http://schemas.openxmlformats.org/presentationml/2006/main">
   <p:cSld>
     <p:spTree>

</xml_diff>